<commit_message>
Added screenshot of startup
</commit_message>
<xml_diff>
--- a/Optimization/AllineaMAP/allinea_map.pptx
+++ b/Optimization/AllineaMAP/allinea_map.pptx
@@ -5,7 +5,7 @@
     <p:sldMasterId id="2147483660" r:id="rId1"/>
   </p:sldMasterIdLst>
   <p:notesMasterIdLst>
-    <p:notesMasterId r:id="rId7"/>
+    <p:notesMasterId r:id="rId8"/>
   </p:notesMasterIdLst>
   <p:sldIdLst>
     <p:sldId id="256" r:id="rId2"/>
@@ -13,6 +13,7 @@
     <p:sldId id="259" r:id="rId4"/>
     <p:sldId id="258" r:id="rId5"/>
     <p:sldId id="260" r:id="rId6"/>
+    <p:sldId id="261" r:id="rId7"/>
   </p:sldIdLst>
   <p:sldSz cx="9144000" cy="6858000" type="screen4x3"/>
   <p:notesSz cx="6858000" cy="9144000"/>
@@ -3840,6 +3841,403 @@
   <p:clrMapOvr>
     <a:masterClrMapping/>
   </p:clrMapOvr>
+  <p:timing>
+    <p:tnLst>
+      <p:par>
+        <p:cTn id="1" dur="indefinite" restart="never" nodeType="tmRoot">
+          <p:childTnLst>
+            <p:seq concurrent="1" nextAc="seek">
+              <p:cTn id="2" dur="indefinite" nodeType="mainSeq">
+                <p:childTnLst>
+                  <p:par>
+                    <p:cTn id="3" fill="hold">
+                      <p:stCondLst>
+                        <p:cond delay="indefinite"/>
+                        <p:cond evt="onBegin" delay="0">
+                          <p:tn val="2"/>
+                        </p:cond>
+                      </p:stCondLst>
+                      <p:childTnLst>
+                        <p:par>
+                          <p:cTn id="4" fill="hold">
+                            <p:stCondLst>
+                              <p:cond delay="0"/>
+                            </p:stCondLst>
+                            <p:childTnLst>
+                              <p:par>
+                                <p:cTn id="5" presetID="1" presetClass="entr" presetSubtype="0" fill="hold" grpId="0" nodeType="withEffect">
+                                  <p:stCondLst>
+                                    <p:cond delay="0"/>
+                                  </p:stCondLst>
+                                  <p:childTnLst>
+                                    <p:set>
+                                      <p:cBhvr>
+                                        <p:cTn id="6" dur="1" fill="hold">
+                                          <p:stCondLst>
+                                            <p:cond delay="0"/>
+                                          </p:stCondLst>
+                                        </p:cTn>
+                                        <p:tgtEl>
+                                          <p:spTgt spid="3">
+                                            <p:txEl>
+                                              <p:pRg st="0" end="0"/>
+                                            </p:txEl>
+                                          </p:spTgt>
+                                        </p:tgtEl>
+                                        <p:attrNameLst>
+                                          <p:attrName>style.visibility</p:attrName>
+                                        </p:attrNameLst>
+                                      </p:cBhvr>
+                                      <p:to>
+                                        <p:strVal val="visible"/>
+                                      </p:to>
+                                    </p:set>
+                                  </p:childTnLst>
+                                </p:cTn>
+                              </p:par>
+                              <p:par>
+                                <p:cTn id="7" presetID="1" presetClass="entr" presetSubtype="0" fill="hold" grpId="0" nodeType="withEffect">
+                                  <p:stCondLst>
+                                    <p:cond delay="0"/>
+                                  </p:stCondLst>
+                                  <p:childTnLst>
+                                    <p:set>
+                                      <p:cBhvr>
+                                        <p:cTn id="8" dur="1" fill="hold">
+                                          <p:stCondLst>
+                                            <p:cond delay="0"/>
+                                          </p:stCondLst>
+                                        </p:cTn>
+                                        <p:tgtEl>
+                                          <p:spTgt spid="3">
+                                            <p:txEl>
+                                              <p:pRg st="1" end="1"/>
+                                            </p:txEl>
+                                          </p:spTgt>
+                                        </p:tgtEl>
+                                        <p:attrNameLst>
+                                          <p:attrName>style.visibility</p:attrName>
+                                        </p:attrNameLst>
+                                      </p:cBhvr>
+                                      <p:to>
+                                        <p:strVal val="visible"/>
+                                      </p:to>
+                                    </p:set>
+                                  </p:childTnLst>
+                                </p:cTn>
+                              </p:par>
+                              <p:par>
+                                <p:cTn id="9" presetID="1" presetClass="entr" presetSubtype="0" fill="hold" grpId="0" nodeType="withEffect">
+                                  <p:stCondLst>
+                                    <p:cond delay="0"/>
+                                  </p:stCondLst>
+                                  <p:childTnLst>
+                                    <p:set>
+                                      <p:cBhvr>
+                                        <p:cTn id="10" dur="1" fill="hold">
+                                          <p:stCondLst>
+                                            <p:cond delay="0"/>
+                                          </p:stCondLst>
+                                        </p:cTn>
+                                        <p:tgtEl>
+                                          <p:spTgt spid="3">
+                                            <p:txEl>
+                                              <p:pRg st="2" end="2"/>
+                                            </p:txEl>
+                                          </p:spTgt>
+                                        </p:tgtEl>
+                                        <p:attrNameLst>
+                                          <p:attrName>style.visibility</p:attrName>
+                                        </p:attrNameLst>
+                                      </p:cBhvr>
+                                      <p:to>
+                                        <p:strVal val="visible"/>
+                                      </p:to>
+                                    </p:set>
+                                  </p:childTnLst>
+                                </p:cTn>
+                              </p:par>
+                            </p:childTnLst>
+                          </p:cTn>
+                        </p:par>
+                      </p:childTnLst>
+                    </p:cTn>
+                  </p:par>
+                  <p:par>
+                    <p:cTn id="11" fill="hold">
+                      <p:stCondLst>
+                        <p:cond delay="indefinite"/>
+                      </p:stCondLst>
+                      <p:childTnLst>
+                        <p:par>
+                          <p:cTn id="12" fill="hold">
+                            <p:stCondLst>
+                              <p:cond delay="0"/>
+                            </p:stCondLst>
+                            <p:childTnLst>
+                              <p:par>
+                                <p:cTn id="13" presetID="1" presetClass="entr" presetSubtype="0" fill="hold" grpId="0" nodeType="clickEffect">
+                                  <p:stCondLst>
+                                    <p:cond delay="0"/>
+                                  </p:stCondLst>
+                                  <p:childTnLst>
+                                    <p:set>
+                                      <p:cBhvr>
+                                        <p:cTn id="14" dur="1" fill="hold">
+                                          <p:stCondLst>
+                                            <p:cond delay="0"/>
+                                          </p:stCondLst>
+                                        </p:cTn>
+                                        <p:tgtEl>
+                                          <p:spTgt spid="3">
+                                            <p:txEl>
+                                              <p:pRg st="3" end="3"/>
+                                            </p:txEl>
+                                          </p:spTgt>
+                                        </p:tgtEl>
+                                        <p:attrNameLst>
+                                          <p:attrName>style.visibility</p:attrName>
+                                        </p:attrNameLst>
+                                      </p:cBhvr>
+                                      <p:to>
+                                        <p:strVal val="visible"/>
+                                      </p:to>
+                                    </p:set>
+                                  </p:childTnLst>
+                                </p:cTn>
+                              </p:par>
+                              <p:par>
+                                <p:cTn id="15" presetID="1" presetClass="entr" presetSubtype="0" fill="hold" grpId="0" nodeType="withEffect">
+                                  <p:stCondLst>
+                                    <p:cond delay="0"/>
+                                  </p:stCondLst>
+                                  <p:childTnLst>
+                                    <p:set>
+                                      <p:cBhvr>
+                                        <p:cTn id="16" dur="1" fill="hold">
+                                          <p:stCondLst>
+                                            <p:cond delay="0"/>
+                                          </p:stCondLst>
+                                        </p:cTn>
+                                        <p:tgtEl>
+                                          <p:spTgt spid="3">
+                                            <p:txEl>
+                                              <p:pRg st="4" end="4"/>
+                                            </p:txEl>
+                                          </p:spTgt>
+                                        </p:tgtEl>
+                                        <p:attrNameLst>
+                                          <p:attrName>style.visibility</p:attrName>
+                                        </p:attrNameLst>
+                                      </p:cBhvr>
+                                      <p:to>
+                                        <p:strVal val="visible"/>
+                                      </p:to>
+                                    </p:set>
+                                  </p:childTnLst>
+                                </p:cTn>
+                              </p:par>
+                              <p:par>
+                                <p:cTn id="17" presetID="1" presetClass="entr" presetSubtype="0" fill="hold" grpId="0" nodeType="withEffect">
+                                  <p:stCondLst>
+                                    <p:cond delay="0"/>
+                                  </p:stCondLst>
+                                  <p:childTnLst>
+                                    <p:set>
+                                      <p:cBhvr>
+                                        <p:cTn id="18" dur="1" fill="hold">
+                                          <p:stCondLst>
+                                            <p:cond delay="0"/>
+                                          </p:stCondLst>
+                                        </p:cTn>
+                                        <p:tgtEl>
+                                          <p:spTgt spid="3">
+                                            <p:txEl>
+                                              <p:pRg st="5" end="5"/>
+                                            </p:txEl>
+                                          </p:spTgt>
+                                        </p:tgtEl>
+                                        <p:attrNameLst>
+                                          <p:attrName>style.visibility</p:attrName>
+                                        </p:attrNameLst>
+                                      </p:cBhvr>
+                                      <p:to>
+                                        <p:strVal val="visible"/>
+                                      </p:to>
+                                    </p:set>
+                                  </p:childTnLst>
+                                </p:cTn>
+                              </p:par>
+                              <p:par>
+                                <p:cTn id="19" presetID="1" presetClass="entr" presetSubtype="0" fill="hold" grpId="0" nodeType="withEffect">
+                                  <p:stCondLst>
+                                    <p:cond delay="0"/>
+                                  </p:stCondLst>
+                                  <p:childTnLst>
+                                    <p:set>
+                                      <p:cBhvr>
+                                        <p:cTn id="20" dur="1" fill="hold">
+                                          <p:stCondLst>
+                                            <p:cond delay="0"/>
+                                          </p:stCondLst>
+                                        </p:cTn>
+                                        <p:tgtEl>
+                                          <p:spTgt spid="3">
+                                            <p:txEl>
+                                              <p:pRg st="6" end="6"/>
+                                            </p:txEl>
+                                          </p:spTgt>
+                                        </p:tgtEl>
+                                        <p:attrNameLst>
+                                          <p:attrName>style.visibility</p:attrName>
+                                        </p:attrNameLst>
+                                      </p:cBhvr>
+                                      <p:to>
+                                        <p:strVal val="visible"/>
+                                      </p:to>
+                                    </p:set>
+                                  </p:childTnLst>
+                                </p:cTn>
+                              </p:par>
+                              <p:par>
+                                <p:cTn id="21" presetID="1" presetClass="entr" presetSubtype="0" fill="hold" grpId="0" nodeType="withEffect">
+                                  <p:stCondLst>
+                                    <p:cond delay="0"/>
+                                  </p:stCondLst>
+                                  <p:childTnLst>
+                                    <p:set>
+                                      <p:cBhvr>
+                                        <p:cTn id="22" dur="1" fill="hold">
+                                          <p:stCondLst>
+                                            <p:cond delay="0"/>
+                                          </p:stCondLst>
+                                        </p:cTn>
+                                        <p:tgtEl>
+                                          <p:spTgt spid="3">
+                                            <p:txEl>
+                                              <p:pRg st="7" end="7"/>
+                                            </p:txEl>
+                                          </p:spTgt>
+                                        </p:tgtEl>
+                                        <p:attrNameLst>
+                                          <p:attrName>style.visibility</p:attrName>
+                                        </p:attrNameLst>
+                                      </p:cBhvr>
+                                      <p:to>
+                                        <p:strVal val="visible"/>
+                                      </p:to>
+                                    </p:set>
+                                  </p:childTnLst>
+                                </p:cTn>
+                              </p:par>
+                              <p:par>
+                                <p:cTn id="23" presetID="1" presetClass="entr" presetSubtype="0" fill="hold" grpId="0" nodeType="withEffect">
+                                  <p:stCondLst>
+                                    <p:cond delay="0"/>
+                                  </p:stCondLst>
+                                  <p:childTnLst>
+                                    <p:set>
+                                      <p:cBhvr>
+                                        <p:cTn id="24" dur="1" fill="hold">
+                                          <p:stCondLst>
+                                            <p:cond delay="0"/>
+                                          </p:stCondLst>
+                                        </p:cTn>
+                                        <p:tgtEl>
+                                          <p:spTgt spid="3">
+                                            <p:txEl>
+                                              <p:pRg st="8" end="8"/>
+                                            </p:txEl>
+                                          </p:spTgt>
+                                        </p:tgtEl>
+                                        <p:attrNameLst>
+                                          <p:attrName>style.visibility</p:attrName>
+                                        </p:attrNameLst>
+                                      </p:cBhvr>
+                                      <p:to>
+                                        <p:strVal val="visible"/>
+                                      </p:to>
+                                    </p:set>
+                                  </p:childTnLst>
+                                </p:cTn>
+                              </p:par>
+                            </p:childTnLst>
+                          </p:cTn>
+                        </p:par>
+                      </p:childTnLst>
+                    </p:cTn>
+                  </p:par>
+                  <p:par>
+                    <p:cTn id="25" fill="hold">
+                      <p:stCondLst>
+                        <p:cond delay="indefinite"/>
+                      </p:stCondLst>
+                      <p:childTnLst>
+                        <p:par>
+                          <p:cTn id="26" fill="hold">
+                            <p:stCondLst>
+                              <p:cond delay="0"/>
+                            </p:stCondLst>
+                            <p:childTnLst>
+                              <p:par>
+                                <p:cTn id="27" presetID="1" presetClass="entr" presetSubtype="0" fill="hold" grpId="0" nodeType="clickEffect">
+                                  <p:stCondLst>
+                                    <p:cond delay="0"/>
+                                  </p:stCondLst>
+                                  <p:childTnLst>
+                                    <p:set>
+                                      <p:cBhvr>
+                                        <p:cTn id="28" dur="1" fill="hold">
+                                          <p:stCondLst>
+                                            <p:cond delay="0"/>
+                                          </p:stCondLst>
+                                        </p:cTn>
+                                        <p:tgtEl>
+                                          <p:spTgt spid="5"/>
+                                        </p:tgtEl>
+                                        <p:attrNameLst>
+                                          <p:attrName>style.visibility</p:attrName>
+                                        </p:attrNameLst>
+                                      </p:cBhvr>
+                                      <p:to>
+                                        <p:strVal val="visible"/>
+                                      </p:to>
+                                    </p:set>
+                                  </p:childTnLst>
+                                </p:cTn>
+                              </p:par>
+                            </p:childTnLst>
+                          </p:cTn>
+                        </p:par>
+                      </p:childTnLst>
+                    </p:cTn>
+                  </p:par>
+                </p:childTnLst>
+              </p:cTn>
+              <p:prevCondLst>
+                <p:cond evt="onPrev" delay="0">
+                  <p:tgtEl>
+                    <p:sldTgt/>
+                  </p:tgtEl>
+                </p:cond>
+              </p:prevCondLst>
+              <p:nextCondLst>
+                <p:cond evt="onNext" delay="0">
+                  <p:tgtEl>
+                    <p:sldTgt/>
+                  </p:tgtEl>
+                </p:cond>
+              </p:nextCondLst>
+            </p:seq>
+          </p:childTnLst>
+        </p:cTn>
+      </p:par>
+    </p:tnLst>
+    <p:bldLst>
+      <p:bldP spid="3" grpId="0" uiExpand="1" build="p"/>
+      <p:bldP spid="5" grpId="0" animBg="1"/>
+    </p:bldLst>
+  </p:timing>
 </p:sld>
 </file>
 
@@ -3923,8 +4321,13 @@
           <a:p>
             <a:r>
               <a:rPr lang="en-US" dirty="0"/>
-              <a:t>Distributed programming: MPI</a:t>
-            </a:r>
+              <a:t>Distributed programming: </a:t>
+            </a:r>
+            <a:r>
+              <a:rPr lang="en-US" dirty="0" smtClean="0"/>
+              <a:t>MPI, UPC</a:t>
+            </a:r>
+            <a:endParaRPr lang="en-US" dirty="0"/>
           </a:p>
           <a:p>
             <a:pPr marL="0" indent="0">
@@ -3965,7 +4368,7 @@
         </p:nvSpPr>
         <p:spPr>
           <a:xfrm>
-            <a:off x="1133911" y="4493000"/>
+            <a:off x="935504" y="5088223"/>
             <a:ext cx="6876178" cy="461665"/>
           </a:xfrm>
           <a:prstGeom prst="rect">
@@ -3992,6 +4395,65 @@
           </a:p>
         </p:txBody>
       </p:sp>
+      <p:sp>
+        <p:nvSpPr>
+          <p:cNvPr id="6" name="TextBox 5"/>
+          <p:cNvSpPr txBox="1"/>
+          <p:nvPr/>
+        </p:nvSpPr>
+        <p:spPr>
+          <a:xfrm>
+            <a:off x="1949570" y="4106103"/>
+            <a:ext cx="5011180" cy="461665"/>
+          </a:xfrm>
+          <a:prstGeom prst="rect">
+            <a:avLst/>
+          </a:prstGeom>
+          <a:noFill/>
+          <a:ln>
+            <a:solidFill>
+              <a:srgbClr val="C00000"/>
+            </a:solidFill>
+          </a:ln>
+        </p:spPr>
+        <p:txBody>
+          <a:bodyPr wrap="none" rtlCol="0">
+            <a:spAutoFit/>
+          </a:bodyPr>
+          <a:lstStyle/>
+          <a:p>
+            <a:r>
+              <a:rPr lang="en-US" sz="2400" dirty="0" smtClean="0">
+                <a:solidFill>
+                  <a:srgbClr val="C00000"/>
+                </a:solidFill>
+              </a:rPr>
+              <a:t>Weapon of choice for MPI (+ </a:t>
+            </a:r>
+            <a:r>
+              <a:rPr lang="en-US" sz="2400" dirty="0" err="1" smtClean="0">
+                <a:solidFill>
+                  <a:srgbClr val="C00000"/>
+                </a:solidFill>
+              </a:rPr>
+              <a:t>OpenMP</a:t>
+            </a:r>
+            <a:r>
+              <a:rPr lang="en-US" sz="2400" dirty="0" smtClean="0">
+                <a:solidFill>
+                  <a:srgbClr val="C00000"/>
+                </a:solidFill>
+              </a:rPr>
+              <a:t>)</a:t>
+            </a:r>
+            <a:endParaRPr lang="nl-BE" sz="2400" dirty="0">
+              <a:solidFill>
+                <a:srgbClr val="C00000"/>
+              </a:solidFill>
+            </a:endParaRPr>
+          </a:p>
+        </p:txBody>
+      </p:sp>
     </p:spTree>
     <p:extLst>
       <p:ext uri="{BB962C8B-B14F-4D97-AF65-F5344CB8AC3E}">
@@ -4002,6 +4464,130 @@
   <p:clrMapOvr>
     <a:masterClrMapping/>
   </p:clrMapOvr>
+  <p:timing>
+    <p:tnLst>
+      <p:par>
+        <p:cTn id="1" dur="indefinite" restart="never" nodeType="tmRoot">
+          <p:childTnLst>
+            <p:seq concurrent="1" nextAc="seek">
+              <p:cTn id="2" dur="indefinite" nodeType="mainSeq">
+                <p:childTnLst>
+                  <p:par>
+                    <p:cTn id="3" fill="hold">
+                      <p:stCondLst>
+                        <p:cond delay="indefinite"/>
+                      </p:stCondLst>
+                      <p:childTnLst>
+                        <p:par>
+                          <p:cTn id="4" fill="hold">
+                            <p:stCondLst>
+                              <p:cond delay="0"/>
+                            </p:stCondLst>
+                            <p:childTnLst>
+                              <p:par>
+                                <p:cTn id="5" presetID="1" presetClass="entr" presetSubtype="0" fill="hold" grpId="0" nodeType="clickEffect">
+                                  <p:stCondLst>
+                                    <p:cond delay="0"/>
+                                  </p:stCondLst>
+                                  <p:childTnLst>
+                                    <p:set>
+                                      <p:cBhvr>
+                                        <p:cTn id="6" dur="1" fill="hold">
+                                          <p:stCondLst>
+                                            <p:cond delay="0"/>
+                                          </p:stCondLst>
+                                        </p:cTn>
+                                        <p:tgtEl>
+                                          <p:spTgt spid="6"/>
+                                        </p:tgtEl>
+                                        <p:attrNameLst>
+                                          <p:attrName>style.visibility</p:attrName>
+                                        </p:attrNameLst>
+                                      </p:cBhvr>
+                                      <p:to>
+                                        <p:strVal val="visible"/>
+                                      </p:to>
+                                    </p:set>
+                                  </p:childTnLst>
+                                </p:cTn>
+                              </p:par>
+                            </p:childTnLst>
+                          </p:cTn>
+                        </p:par>
+                      </p:childTnLst>
+                    </p:cTn>
+                  </p:par>
+                  <p:par>
+                    <p:cTn id="7" fill="hold">
+                      <p:stCondLst>
+                        <p:cond delay="indefinite"/>
+                      </p:stCondLst>
+                      <p:childTnLst>
+                        <p:par>
+                          <p:cTn id="8" fill="hold">
+                            <p:stCondLst>
+                              <p:cond delay="0"/>
+                            </p:stCondLst>
+                            <p:childTnLst>
+                              <p:par>
+                                <p:cTn id="9" presetID="1" presetClass="entr" presetSubtype="0" fill="hold" grpId="0" nodeType="clickEffect">
+                                  <p:stCondLst>
+                                    <p:cond delay="0"/>
+                                  </p:stCondLst>
+                                  <p:childTnLst>
+                                    <p:set>
+                                      <p:cBhvr>
+                                        <p:cTn id="10" dur="1" fill="hold">
+                                          <p:stCondLst>
+                                            <p:cond delay="0"/>
+                                          </p:stCondLst>
+                                        </p:cTn>
+                                        <p:tgtEl>
+                                          <p:spTgt spid="5"/>
+                                        </p:tgtEl>
+                                        <p:attrNameLst>
+                                          <p:attrName>style.visibility</p:attrName>
+                                        </p:attrNameLst>
+                                      </p:cBhvr>
+                                      <p:to>
+                                        <p:strVal val="visible"/>
+                                      </p:to>
+                                    </p:set>
+                                  </p:childTnLst>
+                                </p:cTn>
+                              </p:par>
+                            </p:childTnLst>
+                          </p:cTn>
+                        </p:par>
+                      </p:childTnLst>
+                    </p:cTn>
+                  </p:par>
+                </p:childTnLst>
+              </p:cTn>
+              <p:prevCondLst>
+                <p:cond evt="onPrev" delay="0">
+                  <p:tgtEl>
+                    <p:sldTgt/>
+                  </p:tgtEl>
+                </p:cond>
+              </p:prevCondLst>
+              <p:nextCondLst>
+                <p:cond evt="onNext" delay="0">
+                  <p:tgtEl>
+                    <p:sldTgt/>
+                  </p:tgtEl>
+                </p:cond>
+              </p:nextCondLst>
+            </p:seq>
+          </p:childTnLst>
+        </p:cTn>
+      </p:par>
+    </p:tnLst>
+    <p:bldLst>
+      <p:bldP spid="5" grpId="0" animBg="1"/>
+      <p:bldP spid="6" grpId="0" animBg="1"/>
+    </p:bldLst>
+  </p:timing>
 </p:sld>
 </file>
 
@@ -4185,6 +4771,295 @@
   <p:clrMapOvr>
     <a:masterClrMapping/>
   </p:clrMapOvr>
+  <p:timing>
+    <p:tnLst>
+      <p:par>
+        <p:cTn id="1" dur="indefinite" restart="never" nodeType="tmRoot">
+          <p:childTnLst>
+            <p:seq concurrent="1" nextAc="seek">
+              <p:cTn id="2" dur="indefinite" nodeType="mainSeq">
+                <p:childTnLst>
+                  <p:par>
+                    <p:cTn id="3" fill="hold">
+                      <p:stCondLst>
+                        <p:cond delay="indefinite"/>
+                        <p:cond evt="onBegin" delay="0">
+                          <p:tn val="2"/>
+                        </p:cond>
+                      </p:stCondLst>
+                      <p:childTnLst>
+                        <p:par>
+                          <p:cTn id="4" fill="hold">
+                            <p:stCondLst>
+                              <p:cond delay="0"/>
+                            </p:stCondLst>
+                            <p:childTnLst>
+                              <p:par>
+                                <p:cTn id="5" presetID="1" presetClass="entr" presetSubtype="0" fill="hold" grpId="0" nodeType="withEffect">
+                                  <p:stCondLst>
+                                    <p:cond delay="0"/>
+                                  </p:stCondLst>
+                                  <p:childTnLst>
+                                    <p:set>
+                                      <p:cBhvr>
+                                        <p:cTn id="6" dur="1" fill="hold">
+                                          <p:stCondLst>
+                                            <p:cond delay="0"/>
+                                          </p:stCondLst>
+                                        </p:cTn>
+                                        <p:tgtEl>
+                                          <p:spTgt spid="3">
+                                            <p:txEl>
+                                              <p:pRg st="0" end="0"/>
+                                            </p:txEl>
+                                          </p:spTgt>
+                                        </p:tgtEl>
+                                        <p:attrNameLst>
+                                          <p:attrName>style.visibility</p:attrName>
+                                        </p:attrNameLst>
+                                      </p:cBhvr>
+                                      <p:to>
+                                        <p:strVal val="visible"/>
+                                      </p:to>
+                                    </p:set>
+                                  </p:childTnLst>
+                                </p:cTn>
+                              </p:par>
+                              <p:par>
+                                <p:cTn id="7" presetID="1" presetClass="entr" presetSubtype="0" fill="hold" grpId="0" nodeType="withEffect">
+                                  <p:stCondLst>
+                                    <p:cond delay="0"/>
+                                  </p:stCondLst>
+                                  <p:childTnLst>
+                                    <p:set>
+                                      <p:cBhvr>
+                                        <p:cTn id="8" dur="1" fill="hold">
+                                          <p:stCondLst>
+                                            <p:cond delay="0"/>
+                                          </p:stCondLst>
+                                        </p:cTn>
+                                        <p:tgtEl>
+                                          <p:spTgt spid="3">
+                                            <p:txEl>
+                                              <p:pRg st="1" end="1"/>
+                                            </p:txEl>
+                                          </p:spTgt>
+                                        </p:tgtEl>
+                                        <p:attrNameLst>
+                                          <p:attrName>style.visibility</p:attrName>
+                                        </p:attrNameLst>
+                                      </p:cBhvr>
+                                      <p:to>
+                                        <p:strVal val="visible"/>
+                                      </p:to>
+                                    </p:set>
+                                  </p:childTnLst>
+                                </p:cTn>
+                              </p:par>
+                              <p:par>
+                                <p:cTn id="9" presetID="1" presetClass="entr" presetSubtype="0" fill="hold" grpId="0" nodeType="withEffect">
+                                  <p:stCondLst>
+                                    <p:cond delay="0"/>
+                                  </p:stCondLst>
+                                  <p:childTnLst>
+                                    <p:set>
+                                      <p:cBhvr>
+                                        <p:cTn id="10" dur="1" fill="hold">
+                                          <p:stCondLst>
+                                            <p:cond delay="0"/>
+                                          </p:stCondLst>
+                                        </p:cTn>
+                                        <p:tgtEl>
+                                          <p:spTgt spid="3">
+                                            <p:txEl>
+                                              <p:pRg st="2" end="2"/>
+                                            </p:txEl>
+                                          </p:spTgt>
+                                        </p:tgtEl>
+                                        <p:attrNameLst>
+                                          <p:attrName>style.visibility</p:attrName>
+                                        </p:attrNameLst>
+                                      </p:cBhvr>
+                                      <p:to>
+                                        <p:strVal val="visible"/>
+                                      </p:to>
+                                    </p:set>
+                                  </p:childTnLst>
+                                </p:cTn>
+                              </p:par>
+                            </p:childTnLst>
+                          </p:cTn>
+                        </p:par>
+                      </p:childTnLst>
+                    </p:cTn>
+                  </p:par>
+                  <p:par>
+                    <p:cTn id="11" fill="hold">
+                      <p:stCondLst>
+                        <p:cond delay="indefinite"/>
+                      </p:stCondLst>
+                      <p:childTnLst>
+                        <p:par>
+                          <p:cTn id="12" fill="hold">
+                            <p:stCondLst>
+                              <p:cond delay="0"/>
+                            </p:stCondLst>
+                            <p:childTnLst>
+                              <p:par>
+                                <p:cTn id="13" presetID="1" presetClass="entr" presetSubtype="0" fill="hold" grpId="0" nodeType="clickEffect">
+                                  <p:stCondLst>
+                                    <p:cond delay="0"/>
+                                  </p:stCondLst>
+                                  <p:childTnLst>
+                                    <p:set>
+                                      <p:cBhvr>
+                                        <p:cTn id="14" dur="1" fill="hold">
+                                          <p:stCondLst>
+                                            <p:cond delay="0"/>
+                                          </p:stCondLst>
+                                        </p:cTn>
+                                        <p:tgtEl>
+                                          <p:spTgt spid="3">
+                                            <p:txEl>
+                                              <p:pRg st="3" end="3"/>
+                                            </p:txEl>
+                                          </p:spTgt>
+                                        </p:tgtEl>
+                                        <p:attrNameLst>
+                                          <p:attrName>style.visibility</p:attrName>
+                                        </p:attrNameLst>
+                                      </p:cBhvr>
+                                      <p:to>
+                                        <p:strVal val="visible"/>
+                                      </p:to>
+                                    </p:set>
+                                  </p:childTnLst>
+                                </p:cTn>
+                              </p:par>
+                              <p:par>
+                                <p:cTn id="15" presetID="1" presetClass="entr" presetSubtype="0" fill="hold" grpId="0" nodeType="withEffect">
+                                  <p:stCondLst>
+                                    <p:cond delay="0"/>
+                                  </p:stCondLst>
+                                  <p:childTnLst>
+                                    <p:set>
+                                      <p:cBhvr>
+                                        <p:cTn id="16" dur="1" fill="hold">
+                                          <p:stCondLst>
+                                            <p:cond delay="0"/>
+                                          </p:stCondLst>
+                                        </p:cTn>
+                                        <p:tgtEl>
+                                          <p:spTgt spid="3">
+                                            <p:txEl>
+                                              <p:pRg st="4" end="4"/>
+                                            </p:txEl>
+                                          </p:spTgt>
+                                        </p:tgtEl>
+                                        <p:attrNameLst>
+                                          <p:attrName>style.visibility</p:attrName>
+                                        </p:attrNameLst>
+                                      </p:cBhvr>
+                                      <p:to>
+                                        <p:strVal val="visible"/>
+                                      </p:to>
+                                    </p:set>
+                                  </p:childTnLst>
+                                </p:cTn>
+                              </p:par>
+                              <p:par>
+                                <p:cTn id="17" presetID="1" presetClass="entr" presetSubtype="0" fill="hold" grpId="0" nodeType="withEffect">
+                                  <p:stCondLst>
+                                    <p:cond delay="0"/>
+                                  </p:stCondLst>
+                                  <p:childTnLst>
+                                    <p:set>
+                                      <p:cBhvr>
+                                        <p:cTn id="18" dur="1" fill="hold">
+                                          <p:stCondLst>
+                                            <p:cond delay="0"/>
+                                          </p:stCondLst>
+                                        </p:cTn>
+                                        <p:tgtEl>
+                                          <p:spTgt spid="3">
+                                            <p:txEl>
+                                              <p:pRg st="5" end="5"/>
+                                            </p:txEl>
+                                          </p:spTgt>
+                                        </p:tgtEl>
+                                        <p:attrNameLst>
+                                          <p:attrName>style.visibility</p:attrName>
+                                        </p:attrNameLst>
+                                      </p:cBhvr>
+                                      <p:to>
+                                        <p:strVal val="visible"/>
+                                      </p:to>
+                                    </p:set>
+                                  </p:childTnLst>
+                                </p:cTn>
+                              </p:par>
+                              <p:par>
+                                <p:cTn id="19" presetID="1" presetClass="entr" presetSubtype="0" fill="hold" grpId="0" nodeType="withEffect">
+                                  <p:stCondLst>
+                                    <p:cond delay="0"/>
+                                  </p:stCondLst>
+                                  <p:childTnLst>
+                                    <p:set>
+                                      <p:cBhvr>
+                                        <p:cTn id="20" dur="1" fill="hold">
+                                          <p:stCondLst>
+                                            <p:cond delay="0"/>
+                                          </p:stCondLst>
+                                        </p:cTn>
+                                        <p:tgtEl>
+                                          <p:spTgt spid="3">
+                                            <p:txEl>
+                                              <p:pRg st="6" end="6"/>
+                                            </p:txEl>
+                                          </p:spTgt>
+                                        </p:tgtEl>
+                                        <p:attrNameLst>
+                                          <p:attrName>style.visibility</p:attrName>
+                                        </p:attrNameLst>
+                                      </p:cBhvr>
+                                      <p:to>
+                                        <p:strVal val="visible"/>
+                                      </p:to>
+                                    </p:set>
+                                  </p:childTnLst>
+                                </p:cTn>
+                              </p:par>
+                            </p:childTnLst>
+                          </p:cTn>
+                        </p:par>
+                      </p:childTnLst>
+                    </p:cTn>
+                  </p:par>
+                </p:childTnLst>
+              </p:cTn>
+              <p:prevCondLst>
+                <p:cond evt="onPrev" delay="0">
+                  <p:tgtEl>
+                    <p:sldTgt/>
+                  </p:tgtEl>
+                </p:cond>
+              </p:prevCondLst>
+              <p:nextCondLst>
+                <p:cond evt="onNext" delay="0">
+                  <p:tgtEl>
+                    <p:sldTgt/>
+                  </p:tgtEl>
+                </p:cond>
+              </p:nextCondLst>
+            </p:seq>
+          </p:childTnLst>
+        </p:cTn>
+      </p:par>
+    </p:tnLst>
+    <p:bldLst>
+      <p:bldP spid="3" grpId="0" uiExpand="1" build="p"/>
+    </p:bldLst>
+  </p:timing>
 </p:sld>
 </file>
 
@@ -4314,6 +5189,437 @@
           </a:p>
         </p:txBody>
       </p:sp>
+      <p:pic>
+        <p:nvPicPr>
+          <p:cNvPr id="7" name="Picture 6"/>
+          <p:cNvPicPr>
+            <a:picLocks noChangeAspect="1"/>
+          </p:cNvPicPr>
+          <p:nvPr/>
+        </p:nvPicPr>
+        <p:blipFill>
+          <a:blip r:embed="rId2">
+            <a:extLst>
+              <a:ext uri="{28A0092B-C50C-407E-A947-70E740481C1C}">
+                <a14:useLocalDpi xmlns:a14="http://schemas.microsoft.com/office/drawing/2010/main" val="0"/>
+              </a:ext>
+            </a:extLst>
+          </a:blip>
+          <a:stretch>
+            <a:fillRect/>
+          </a:stretch>
+        </p:blipFill>
+        <p:spPr>
+          <a:xfrm>
+            <a:off x="3075227" y="2194374"/>
+            <a:ext cx="4654041" cy="3808981"/>
+          </a:xfrm>
+          <a:prstGeom prst="rect">
+            <a:avLst/>
+          </a:prstGeom>
+        </p:spPr>
+      </p:pic>
+      <p:grpSp>
+        <p:nvGrpSpPr>
+          <p:cNvPr id="12" name="Group 11"/>
+          <p:cNvGrpSpPr/>
+          <p:nvPr/>
+        </p:nvGrpSpPr>
+        <p:grpSpPr>
+          <a:xfrm>
+            <a:off x="232912" y="2794959"/>
+            <a:ext cx="5305246" cy="802256"/>
+            <a:chOff x="232912" y="2794959"/>
+            <a:chExt cx="5305246" cy="802256"/>
+          </a:xfrm>
+        </p:grpSpPr>
+        <p:sp>
+          <p:nvSpPr>
+            <p:cNvPr id="8" name="Rectangle 7"/>
+            <p:cNvSpPr/>
+            <p:nvPr/>
+          </p:nvSpPr>
+          <p:spPr>
+            <a:xfrm>
+              <a:off x="4735902" y="3286664"/>
+              <a:ext cx="802256" cy="310551"/>
+            </a:xfrm>
+            <a:prstGeom prst="rect">
+              <a:avLst/>
+            </a:prstGeom>
+            <a:noFill/>
+            <a:ln w="19050">
+              <a:solidFill>
+                <a:srgbClr val="C00000"/>
+              </a:solidFill>
+            </a:ln>
+          </p:spPr>
+          <p:style>
+            <a:lnRef idx="2">
+              <a:schemeClr val="accent1">
+                <a:shade val="50000"/>
+              </a:schemeClr>
+            </a:lnRef>
+            <a:fillRef idx="1">
+              <a:schemeClr val="accent1"/>
+            </a:fillRef>
+            <a:effectRef idx="0">
+              <a:schemeClr val="accent1"/>
+            </a:effectRef>
+            <a:fontRef idx="minor">
+              <a:schemeClr val="lt1"/>
+            </a:fontRef>
+          </p:style>
+          <p:txBody>
+            <a:bodyPr rtlCol="0" anchor="ctr"/>
+            <a:lstStyle/>
+            <a:p>
+              <a:pPr algn="ctr"/>
+              <a:endParaRPr lang="nl-BE"/>
+            </a:p>
+          </p:txBody>
+        </p:sp>
+        <p:sp>
+          <p:nvSpPr>
+            <p:cNvPr id="9" name="TextBox 8"/>
+            <p:cNvSpPr txBox="1"/>
+            <p:nvPr/>
+          </p:nvSpPr>
+          <p:spPr>
+            <a:xfrm>
+              <a:off x="232912" y="2794959"/>
+              <a:ext cx="2668808" cy="369332"/>
+            </a:xfrm>
+            <a:prstGeom prst="rect">
+              <a:avLst/>
+            </a:prstGeom>
+            <a:noFill/>
+          </p:spPr>
+          <p:txBody>
+            <a:bodyPr wrap="none" rtlCol="0">
+              <a:spAutoFit/>
+            </a:bodyPr>
+            <a:lstStyle/>
+            <a:p>
+              <a:r>
+                <a:rPr lang="en-US" dirty="0" smtClean="0"/>
+                <a:t>Start profiling interactively</a:t>
+              </a:r>
+              <a:endParaRPr lang="nl-BE" dirty="0"/>
+            </a:p>
+          </p:txBody>
+        </p:sp>
+        <p:cxnSp>
+          <p:nvCxnSpPr>
+            <p:cNvPr id="11" name="Straight Arrow Connector 10"/>
+            <p:cNvCxnSpPr>
+              <a:stCxn id="9" idx="3"/>
+              <a:endCxn id="8" idx="1"/>
+            </p:cNvCxnSpPr>
+            <p:nvPr/>
+          </p:nvCxnSpPr>
+          <p:spPr>
+            <a:xfrm>
+              <a:off x="2901720" y="2979625"/>
+              <a:ext cx="1834182" cy="462315"/>
+            </a:xfrm>
+            <a:prstGeom prst="straightConnector1">
+              <a:avLst/>
+            </a:prstGeom>
+            <a:ln>
+              <a:solidFill>
+                <a:srgbClr val="C00000"/>
+              </a:solidFill>
+              <a:tailEnd type="stealth" w="lg" len="lg"/>
+            </a:ln>
+          </p:spPr>
+          <p:style>
+            <a:lnRef idx="1">
+              <a:schemeClr val="accent1"/>
+            </a:lnRef>
+            <a:fillRef idx="0">
+              <a:schemeClr val="accent1"/>
+            </a:fillRef>
+            <a:effectRef idx="0">
+              <a:schemeClr val="accent1"/>
+            </a:effectRef>
+            <a:fontRef idx="minor">
+              <a:schemeClr val="tx1"/>
+            </a:fontRef>
+          </p:style>
+        </p:cxnSp>
+      </p:grpSp>
+      <p:grpSp>
+        <p:nvGrpSpPr>
+          <p:cNvPr id="13" name="Group 12"/>
+          <p:cNvGrpSpPr/>
+          <p:nvPr/>
+        </p:nvGrpSpPr>
+        <p:grpSpPr>
+          <a:xfrm>
+            <a:off x="232912" y="3589892"/>
+            <a:ext cx="6281099" cy="369332"/>
+            <a:chOff x="216727" y="3227883"/>
+            <a:chExt cx="6281099" cy="369332"/>
+          </a:xfrm>
+        </p:grpSpPr>
+        <p:sp>
+          <p:nvSpPr>
+            <p:cNvPr id="14" name="Rectangle 13"/>
+            <p:cNvSpPr/>
+            <p:nvPr/>
+          </p:nvSpPr>
+          <p:spPr>
+            <a:xfrm>
+              <a:off x="4719717" y="3286664"/>
+              <a:ext cx="1778109" cy="310551"/>
+            </a:xfrm>
+            <a:prstGeom prst="rect">
+              <a:avLst/>
+            </a:prstGeom>
+            <a:noFill/>
+            <a:ln w="19050">
+              <a:solidFill>
+                <a:srgbClr val="C00000"/>
+              </a:solidFill>
+            </a:ln>
+          </p:spPr>
+          <p:style>
+            <a:lnRef idx="2">
+              <a:schemeClr val="accent1">
+                <a:shade val="50000"/>
+              </a:schemeClr>
+            </a:lnRef>
+            <a:fillRef idx="1">
+              <a:schemeClr val="accent1"/>
+            </a:fillRef>
+            <a:effectRef idx="0">
+              <a:schemeClr val="accent1"/>
+            </a:effectRef>
+            <a:fontRef idx="minor">
+              <a:schemeClr val="lt1"/>
+            </a:fontRef>
+          </p:style>
+          <p:txBody>
+            <a:bodyPr rtlCol="0" anchor="ctr"/>
+            <a:lstStyle/>
+            <a:p>
+              <a:pPr algn="ctr"/>
+              <a:r>
+                <a:rPr lang="en-US" dirty="0" smtClean="0"/>
+                <a:t>```</a:t>
+              </a:r>
+              <a:endParaRPr lang="nl-BE" dirty="0"/>
+            </a:p>
+          </p:txBody>
+        </p:sp>
+        <p:sp>
+          <p:nvSpPr>
+            <p:cNvPr id="15" name="TextBox 14"/>
+            <p:cNvSpPr txBox="1"/>
+            <p:nvPr/>
+          </p:nvSpPr>
+          <p:spPr>
+            <a:xfrm>
+              <a:off x="216727" y="3227883"/>
+              <a:ext cx="2467086" cy="369332"/>
+            </a:xfrm>
+            <a:prstGeom prst="rect">
+              <a:avLst/>
+            </a:prstGeom>
+            <a:noFill/>
+          </p:spPr>
+          <p:txBody>
+            <a:bodyPr wrap="none" rtlCol="0">
+              <a:spAutoFit/>
+            </a:bodyPr>
+            <a:lstStyle/>
+            <a:p>
+              <a:r>
+                <a:rPr lang="en-US" dirty="0" smtClean="0"/>
+                <a:t>Load a profile to analyze</a:t>
+              </a:r>
+              <a:endParaRPr lang="nl-BE" dirty="0"/>
+            </a:p>
+          </p:txBody>
+        </p:sp>
+        <p:cxnSp>
+          <p:nvCxnSpPr>
+            <p:cNvPr id="16" name="Straight Arrow Connector 15"/>
+            <p:cNvCxnSpPr>
+              <a:stCxn id="15" idx="3"/>
+              <a:endCxn id="14" idx="1"/>
+            </p:cNvCxnSpPr>
+            <p:nvPr/>
+          </p:nvCxnSpPr>
+          <p:spPr>
+            <a:xfrm>
+              <a:off x="2683813" y="3412549"/>
+              <a:ext cx="2035904" cy="29391"/>
+            </a:xfrm>
+            <a:prstGeom prst="straightConnector1">
+              <a:avLst/>
+            </a:prstGeom>
+            <a:ln>
+              <a:solidFill>
+                <a:srgbClr val="C00000"/>
+              </a:solidFill>
+              <a:tailEnd type="stealth" w="lg" len="lg"/>
+            </a:ln>
+          </p:spPr>
+          <p:style>
+            <a:lnRef idx="1">
+              <a:schemeClr val="accent1"/>
+            </a:lnRef>
+            <a:fillRef idx="0">
+              <a:schemeClr val="accent1"/>
+            </a:fillRef>
+            <a:effectRef idx="0">
+              <a:schemeClr val="accent1"/>
+            </a:effectRef>
+            <a:fontRef idx="minor">
+              <a:schemeClr val="tx1"/>
+            </a:fontRef>
+          </p:style>
+        </p:cxnSp>
+      </p:grpSp>
+      <p:grpSp>
+        <p:nvGrpSpPr>
+          <p:cNvPr id="19" name="Group 18"/>
+          <p:cNvGrpSpPr/>
+          <p:nvPr/>
+        </p:nvGrpSpPr>
+        <p:grpSpPr>
+          <a:xfrm>
+            <a:off x="232912" y="4298426"/>
+            <a:ext cx="6840748" cy="757095"/>
+            <a:chOff x="288972" y="3286664"/>
+            <a:chExt cx="6840748" cy="757095"/>
+          </a:xfrm>
+        </p:grpSpPr>
+        <p:sp>
+          <p:nvSpPr>
+            <p:cNvPr id="20" name="Rectangle 19"/>
+            <p:cNvSpPr/>
+            <p:nvPr/>
+          </p:nvSpPr>
+          <p:spPr>
+            <a:xfrm>
+              <a:off x="4735901" y="3286664"/>
+              <a:ext cx="2393819" cy="391079"/>
+            </a:xfrm>
+            <a:prstGeom prst="rect">
+              <a:avLst/>
+            </a:prstGeom>
+            <a:noFill/>
+            <a:ln w="19050">
+              <a:solidFill>
+                <a:srgbClr val="C00000"/>
+              </a:solidFill>
+            </a:ln>
+          </p:spPr>
+          <p:style>
+            <a:lnRef idx="2">
+              <a:schemeClr val="accent1">
+                <a:shade val="50000"/>
+              </a:schemeClr>
+            </a:lnRef>
+            <a:fillRef idx="1">
+              <a:schemeClr val="accent1"/>
+            </a:fillRef>
+            <a:effectRef idx="0">
+              <a:schemeClr val="accent1"/>
+            </a:effectRef>
+            <a:fontRef idx="minor">
+              <a:schemeClr val="lt1"/>
+            </a:fontRef>
+          </p:style>
+          <p:txBody>
+            <a:bodyPr rtlCol="0" anchor="ctr"/>
+            <a:lstStyle/>
+            <a:p>
+              <a:pPr algn="ctr"/>
+              <a:endParaRPr lang="nl-BE"/>
+            </a:p>
+          </p:txBody>
+        </p:sp>
+        <p:sp>
+          <p:nvSpPr>
+            <p:cNvPr id="21" name="TextBox 20"/>
+            <p:cNvSpPr txBox="1"/>
+            <p:nvPr/>
+          </p:nvSpPr>
+          <p:spPr>
+            <a:xfrm>
+              <a:off x="288972" y="3397428"/>
+              <a:ext cx="2061013" cy="646331"/>
+            </a:xfrm>
+            <a:prstGeom prst="rect">
+              <a:avLst/>
+            </a:prstGeom>
+            <a:noFill/>
+          </p:spPr>
+          <p:txBody>
+            <a:bodyPr wrap="none" rtlCol="0">
+              <a:spAutoFit/>
+            </a:bodyPr>
+            <a:lstStyle/>
+            <a:p>
+              <a:r>
+                <a:rPr lang="en-US" dirty="0" smtClean="0"/>
+                <a:t>Start a job to profile</a:t>
+              </a:r>
+              <a:br>
+                <a:rPr lang="en-US" dirty="0" smtClean="0"/>
+              </a:br>
+              <a:r>
+                <a:rPr lang="en-US" dirty="0" smtClean="0"/>
+                <a:t>interactively</a:t>
+              </a:r>
+              <a:endParaRPr lang="nl-BE" dirty="0"/>
+            </a:p>
+          </p:txBody>
+        </p:sp>
+        <p:cxnSp>
+          <p:nvCxnSpPr>
+            <p:cNvPr id="22" name="Straight Arrow Connector 21"/>
+            <p:cNvCxnSpPr>
+              <a:stCxn id="21" idx="3"/>
+              <a:endCxn id="20" idx="1"/>
+            </p:cNvCxnSpPr>
+            <p:nvPr/>
+          </p:nvCxnSpPr>
+          <p:spPr>
+            <a:xfrm flipV="1">
+              <a:off x="2349985" y="3482204"/>
+              <a:ext cx="2385916" cy="238390"/>
+            </a:xfrm>
+            <a:prstGeom prst="straightConnector1">
+              <a:avLst/>
+            </a:prstGeom>
+            <a:ln>
+              <a:solidFill>
+                <a:srgbClr val="C00000"/>
+              </a:solidFill>
+              <a:tailEnd type="stealth" w="lg" len="lg"/>
+            </a:ln>
+          </p:spPr>
+          <p:style>
+            <a:lnRef idx="1">
+              <a:schemeClr val="accent1"/>
+            </a:lnRef>
+            <a:fillRef idx="0">
+              <a:schemeClr val="accent1"/>
+            </a:fillRef>
+            <a:effectRef idx="0">
+              <a:schemeClr val="accent1"/>
+            </a:effectRef>
+            <a:fontRef idx="minor">
+              <a:schemeClr val="tx1"/>
+            </a:fontRef>
+          </p:style>
+        </p:cxnSp>
+      </p:grpSp>
     </p:spTree>
     <p:extLst>
       <p:ext uri="{BB962C8B-B14F-4D97-AF65-F5344CB8AC3E}">
@@ -4324,6 +5630,314 @@
   <p:clrMapOvr>
     <a:masterClrMapping/>
   </p:clrMapOvr>
+  <p:timing>
+    <p:tnLst>
+      <p:par>
+        <p:cTn id="1" dur="indefinite" restart="never" nodeType="tmRoot">
+          <p:childTnLst>
+            <p:seq concurrent="1" nextAc="seek">
+              <p:cTn id="2" dur="indefinite" nodeType="mainSeq">
+                <p:childTnLst>
+                  <p:par>
+                    <p:cTn id="3" fill="hold">
+                      <p:stCondLst>
+                        <p:cond delay="indefinite"/>
+                      </p:stCondLst>
+                      <p:childTnLst>
+                        <p:par>
+                          <p:cTn id="4" fill="hold">
+                            <p:stCondLst>
+                              <p:cond delay="0"/>
+                            </p:stCondLst>
+                            <p:childTnLst>
+                              <p:par>
+                                <p:cTn id="5" presetID="1" presetClass="entr" presetSubtype="0" fill="hold" nodeType="clickEffect">
+                                  <p:stCondLst>
+                                    <p:cond delay="0"/>
+                                  </p:stCondLst>
+                                  <p:childTnLst>
+                                    <p:set>
+                                      <p:cBhvr>
+                                        <p:cTn id="6" dur="1" fill="hold">
+                                          <p:stCondLst>
+                                            <p:cond delay="0"/>
+                                          </p:stCondLst>
+                                        </p:cTn>
+                                        <p:tgtEl>
+                                          <p:spTgt spid="7"/>
+                                        </p:tgtEl>
+                                        <p:attrNameLst>
+                                          <p:attrName>style.visibility</p:attrName>
+                                        </p:attrNameLst>
+                                      </p:cBhvr>
+                                      <p:to>
+                                        <p:strVal val="visible"/>
+                                      </p:to>
+                                    </p:set>
+                                  </p:childTnLst>
+                                </p:cTn>
+                              </p:par>
+                            </p:childTnLst>
+                          </p:cTn>
+                        </p:par>
+                      </p:childTnLst>
+                    </p:cTn>
+                  </p:par>
+                  <p:par>
+                    <p:cTn id="7" fill="hold">
+                      <p:stCondLst>
+                        <p:cond delay="indefinite"/>
+                      </p:stCondLst>
+                      <p:childTnLst>
+                        <p:par>
+                          <p:cTn id="8" fill="hold">
+                            <p:stCondLst>
+                              <p:cond delay="0"/>
+                            </p:stCondLst>
+                            <p:childTnLst>
+                              <p:par>
+                                <p:cTn id="9" presetID="1" presetClass="entr" presetSubtype="0" fill="hold" nodeType="clickEffect">
+                                  <p:stCondLst>
+                                    <p:cond delay="0"/>
+                                  </p:stCondLst>
+                                  <p:childTnLst>
+                                    <p:set>
+                                      <p:cBhvr>
+                                        <p:cTn id="10" dur="1" fill="hold">
+                                          <p:stCondLst>
+                                            <p:cond delay="0"/>
+                                          </p:stCondLst>
+                                        </p:cTn>
+                                        <p:tgtEl>
+                                          <p:spTgt spid="12"/>
+                                        </p:tgtEl>
+                                        <p:attrNameLst>
+                                          <p:attrName>style.visibility</p:attrName>
+                                        </p:attrNameLst>
+                                      </p:cBhvr>
+                                      <p:to>
+                                        <p:strVal val="visible"/>
+                                      </p:to>
+                                    </p:set>
+                                  </p:childTnLst>
+                                </p:cTn>
+                              </p:par>
+                            </p:childTnLst>
+                          </p:cTn>
+                        </p:par>
+                      </p:childTnLst>
+                    </p:cTn>
+                  </p:par>
+                  <p:par>
+                    <p:cTn id="11" fill="hold">
+                      <p:stCondLst>
+                        <p:cond delay="indefinite"/>
+                      </p:stCondLst>
+                      <p:childTnLst>
+                        <p:par>
+                          <p:cTn id="12" fill="hold">
+                            <p:stCondLst>
+                              <p:cond delay="0"/>
+                            </p:stCondLst>
+                            <p:childTnLst>
+                              <p:par>
+                                <p:cTn id="13" presetID="1" presetClass="entr" presetSubtype="0" fill="hold" nodeType="clickEffect">
+                                  <p:stCondLst>
+                                    <p:cond delay="0"/>
+                                  </p:stCondLst>
+                                  <p:childTnLst>
+                                    <p:set>
+                                      <p:cBhvr>
+                                        <p:cTn id="14" dur="1" fill="hold">
+                                          <p:stCondLst>
+                                            <p:cond delay="0"/>
+                                          </p:stCondLst>
+                                        </p:cTn>
+                                        <p:tgtEl>
+                                          <p:spTgt spid="13"/>
+                                        </p:tgtEl>
+                                        <p:attrNameLst>
+                                          <p:attrName>style.visibility</p:attrName>
+                                        </p:attrNameLst>
+                                      </p:cBhvr>
+                                      <p:to>
+                                        <p:strVal val="visible"/>
+                                      </p:to>
+                                    </p:set>
+                                  </p:childTnLst>
+                                </p:cTn>
+                              </p:par>
+                            </p:childTnLst>
+                          </p:cTn>
+                        </p:par>
+                      </p:childTnLst>
+                    </p:cTn>
+                  </p:par>
+                  <p:par>
+                    <p:cTn id="15" fill="hold">
+                      <p:stCondLst>
+                        <p:cond delay="indefinite"/>
+                      </p:stCondLst>
+                      <p:childTnLst>
+                        <p:par>
+                          <p:cTn id="16" fill="hold">
+                            <p:stCondLst>
+                              <p:cond delay="0"/>
+                            </p:stCondLst>
+                            <p:childTnLst>
+                              <p:par>
+                                <p:cTn id="17" presetID="1" presetClass="entr" presetSubtype="0" fill="hold" nodeType="clickEffect">
+                                  <p:stCondLst>
+                                    <p:cond delay="0"/>
+                                  </p:stCondLst>
+                                  <p:childTnLst>
+                                    <p:set>
+                                      <p:cBhvr>
+                                        <p:cTn id="18" dur="1" fill="hold">
+                                          <p:stCondLst>
+                                            <p:cond delay="0"/>
+                                          </p:stCondLst>
+                                        </p:cTn>
+                                        <p:tgtEl>
+                                          <p:spTgt spid="19"/>
+                                        </p:tgtEl>
+                                        <p:attrNameLst>
+                                          <p:attrName>style.visibility</p:attrName>
+                                        </p:attrNameLst>
+                                      </p:cBhvr>
+                                      <p:to>
+                                        <p:strVal val="visible"/>
+                                      </p:to>
+                                    </p:set>
+                                  </p:childTnLst>
+                                </p:cTn>
+                              </p:par>
+                            </p:childTnLst>
+                          </p:cTn>
+                        </p:par>
+                      </p:childTnLst>
+                    </p:cTn>
+                  </p:par>
+                </p:childTnLst>
+              </p:cTn>
+              <p:prevCondLst>
+                <p:cond evt="onPrev" delay="0">
+                  <p:tgtEl>
+                    <p:sldTgt/>
+                  </p:tgtEl>
+                </p:cond>
+              </p:prevCondLst>
+              <p:nextCondLst>
+                <p:cond evt="onNext" delay="0">
+                  <p:tgtEl>
+                    <p:sldTgt/>
+                  </p:tgtEl>
+                </p:cond>
+              </p:nextCondLst>
+            </p:seq>
+          </p:childTnLst>
+        </p:cTn>
+      </p:par>
+    </p:tnLst>
+  </p:timing>
+</p:sld>
+</file>
+
+<file path=ppt/slides/slide6.xml><?xml version="1.0" encoding="utf-8"?>
+<p:sld xmlns:a="http://schemas.openxmlformats.org/drawingml/2006/main" xmlns:r="http://schemas.openxmlformats.org/officeDocument/2006/relationships" xmlns:p="http://schemas.openxmlformats.org/presentationml/2006/main">
+  <p:cSld>
+    <p:spTree>
+      <p:nvGrpSpPr>
+        <p:cNvPr id="1" name=""/>
+        <p:cNvGrpSpPr/>
+        <p:nvPr/>
+      </p:nvGrpSpPr>
+      <p:grpSpPr>
+        <a:xfrm>
+          <a:off x="0" y="0"/>
+          <a:ext cx="0" cy="0"/>
+          <a:chOff x="0" y="0"/>
+          <a:chExt cx="0" cy="0"/>
+        </a:xfrm>
+      </p:grpSpPr>
+      <p:sp>
+        <p:nvSpPr>
+          <p:cNvPr id="2" name="Title 1"/>
+          <p:cNvSpPr>
+            <a:spLocks noGrp="1"/>
+          </p:cNvSpPr>
+          <p:nvPr>
+            <p:ph type="title"/>
+          </p:nvPr>
+        </p:nvSpPr>
+        <p:spPr/>
+        <p:txBody>
+          <a:bodyPr/>
+          <a:lstStyle/>
+          <a:p>
+            <a:endParaRPr lang="nl-BE" dirty="0"/>
+          </a:p>
+        </p:txBody>
+      </p:sp>
+      <p:sp>
+        <p:nvSpPr>
+          <p:cNvPr id="3" name="Content Placeholder 2"/>
+          <p:cNvSpPr>
+            <a:spLocks noGrp="1"/>
+          </p:cNvSpPr>
+          <p:nvPr>
+            <p:ph idx="1"/>
+          </p:nvPr>
+        </p:nvSpPr>
+        <p:spPr/>
+        <p:txBody>
+          <a:bodyPr/>
+          <a:lstStyle/>
+          <a:p>
+            <a:endParaRPr lang="nl-BE"/>
+          </a:p>
+        </p:txBody>
+      </p:sp>
+      <p:sp>
+        <p:nvSpPr>
+          <p:cNvPr id="4" name="Slide Number Placeholder 3"/>
+          <p:cNvSpPr>
+            <a:spLocks noGrp="1"/>
+          </p:cNvSpPr>
+          <p:nvPr>
+            <p:ph type="sldNum" sz="quarter" idx="12"/>
+          </p:nvPr>
+        </p:nvSpPr>
+        <p:spPr/>
+        <p:txBody>
+          <a:bodyPr/>
+          <a:lstStyle/>
+          <a:p>
+            <a:fld id="{AFF690EF-DE1B-4F48-8935-D551336ADF29}" type="slidenum">
+              <a:rPr lang="nl-BE" smtClean="0"/>
+              <a:t>6</a:t>
+            </a:fld>
+            <a:endParaRPr lang="nl-BE"/>
+          </a:p>
+        </p:txBody>
+      </p:sp>
+    </p:spTree>
+    <p:extLst>
+      <p:ext uri="{BB962C8B-B14F-4D97-AF65-F5344CB8AC3E}">
+        <p14:creationId xmlns:p14="http://schemas.microsoft.com/office/powerpoint/2010/main" val="4172699818"/>
+      </p:ext>
+    </p:extLst>
+  </p:cSld>
+  <p:clrMapOvr>
+    <a:masterClrMapping/>
+  </p:clrMapOvr>
+  <p:timing>
+    <p:tnLst>
+      <p:par>
+        <p:cTn id="1" dur="indefinite" restart="never" nodeType="tmRoot"/>
+      </p:par>
+    </p:tnLst>
+  </p:timing>
 </p:sld>
 </file>
 

</xml_diff>

<commit_message>
Added slide on complete screen; summary view; time line view
</commit_message>
<xml_diff>
--- a/Optimization/AllineaMAP/allinea_map.pptx
+++ b/Optimization/AllineaMAP/allinea_map.pptx
@@ -5,15 +5,21 @@
     <p:sldMasterId id="2147483660" r:id="rId1"/>
   </p:sldMasterIdLst>
   <p:notesMasterIdLst>
-    <p:notesMasterId r:id="rId8"/>
+    <p:notesMasterId r:id="rId14"/>
   </p:notesMasterIdLst>
   <p:sldIdLst>
     <p:sldId id="256" r:id="rId2"/>
-    <p:sldId id="257" r:id="rId3"/>
-    <p:sldId id="259" r:id="rId4"/>
-    <p:sldId id="258" r:id="rId5"/>
-    <p:sldId id="260" r:id="rId6"/>
-    <p:sldId id="261" r:id="rId7"/>
+    <p:sldId id="263" r:id="rId3"/>
+    <p:sldId id="257" r:id="rId4"/>
+    <p:sldId id="259" r:id="rId5"/>
+    <p:sldId id="258" r:id="rId6"/>
+    <p:sldId id="264" r:id="rId7"/>
+    <p:sldId id="262" r:id="rId8"/>
+    <p:sldId id="260" r:id="rId9"/>
+    <p:sldId id="261" r:id="rId10"/>
+    <p:sldId id="265" r:id="rId11"/>
+    <p:sldId id="266" r:id="rId12"/>
+    <p:sldId id="267" r:id="rId13"/>
   </p:sldIdLst>
   <p:sldSz cx="9144000" cy="6858000" type="screen4x3"/>
   <p:notesSz cx="6858000" cy="9144000"/>
@@ -112,6 +118,11 @@
       </a:defRPr>
     </a:lvl9pPr>
   </p:defaultTextStyle>
+  <p:extLst>
+    <p:ext uri="{EFAFB233-063F-42B5-8137-9DF3F51BA10A}">
+      <p15:sldGuideLst xmlns:p15="http://schemas.microsoft.com/office/powerpoint/2012/main"/>
+    </p:ext>
+  </p:extLst>
 </p:presentation>
 </file>
 
@@ -197,7 +208,7 @@
           <a:p>
             <a:fld id="{DCBCB4EF-AF11-42C5-A407-C6B5B92B4E13}" type="datetimeFigureOut">
               <a:rPr lang="nl-BE" smtClean="0"/>
-              <a:t>2017-02-06</a:t>
+              <a:t>2017-02-10</a:t>
             </a:fld>
             <a:endParaRPr lang="nl-BE"/>
           </a:p>
@@ -680,7 +691,7 @@
           <a:p>
             <a:fld id="{16EF12B4-B810-4A0E-8BE8-50A63E57FF46}" type="datetime1">
               <a:rPr lang="nl-BE" smtClean="0"/>
-              <a:t>2017-02-06</a:t>
+              <a:t>2017-02-10</a:t>
             </a:fld>
             <a:endParaRPr lang="nl-BE"/>
           </a:p>
@@ -850,7 +861,7 @@
           <a:p>
             <a:fld id="{1C4C54F0-81EA-4EDD-8D8A-D45FC20BB49D}" type="datetime1">
               <a:rPr lang="nl-BE" smtClean="0"/>
-              <a:t>2017-02-06</a:t>
+              <a:t>2017-02-10</a:t>
             </a:fld>
             <a:endParaRPr lang="nl-BE"/>
           </a:p>
@@ -1030,7 +1041,7 @@
           <a:p>
             <a:fld id="{C777687B-F7A2-4048-B084-F43AE07119BE}" type="datetime1">
               <a:rPr lang="nl-BE" smtClean="0"/>
-              <a:t>2017-02-06</a:t>
+              <a:t>2017-02-10</a:t>
             </a:fld>
             <a:endParaRPr lang="nl-BE"/>
           </a:p>
@@ -1200,7 +1211,7 @@
           <a:p>
             <a:fld id="{17D68A66-8CE0-4AE5-B09A-AFB1DA1D35B7}" type="datetime1">
               <a:rPr lang="nl-BE" smtClean="0"/>
-              <a:t>2017-02-06</a:t>
+              <a:t>2017-02-10</a:t>
             </a:fld>
             <a:endParaRPr lang="nl-BE"/>
           </a:p>
@@ -1444,7 +1455,7 @@
           <a:p>
             <a:fld id="{ACD2EF45-07D9-47DD-8D2C-044FB9A2A8C8}" type="datetime1">
               <a:rPr lang="nl-BE" smtClean="0"/>
-              <a:t>2017-02-06</a:t>
+              <a:t>2017-02-10</a:t>
             </a:fld>
             <a:endParaRPr lang="nl-BE"/>
           </a:p>
@@ -1676,7 +1687,7 @@
           <a:p>
             <a:fld id="{C1AA2C35-BB49-44DC-82C3-3BD7F8F0132B}" type="datetime1">
               <a:rPr lang="nl-BE" smtClean="0"/>
-              <a:t>2017-02-06</a:t>
+              <a:t>2017-02-10</a:t>
             </a:fld>
             <a:endParaRPr lang="nl-BE"/>
           </a:p>
@@ -2043,7 +2054,7 @@
           <a:p>
             <a:fld id="{EF292103-E950-40E9-A111-1A108610AB2D}" type="datetime1">
               <a:rPr lang="nl-BE" smtClean="0"/>
-              <a:t>2017-02-06</a:t>
+              <a:t>2017-02-10</a:t>
             </a:fld>
             <a:endParaRPr lang="nl-BE"/>
           </a:p>
@@ -2161,7 +2172,7 @@
           <a:p>
             <a:fld id="{C309520F-DE14-43BC-AF22-FA4B0586587C}" type="datetime1">
               <a:rPr lang="nl-BE" smtClean="0"/>
-              <a:t>2017-02-06</a:t>
+              <a:t>2017-02-10</a:t>
             </a:fld>
             <a:endParaRPr lang="nl-BE"/>
           </a:p>
@@ -2256,7 +2267,7 @@
           <a:p>
             <a:fld id="{89A75246-50AD-43D4-AC8F-C9CEFC06F414}" type="datetime1">
               <a:rPr lang="nl-BE" smtClean="0"/>
-              <a:t>2017-02-06</a:t>
+              <a:t>2017-02-10</a:t>
             </a:fld>
             <a:endParaRPr lang="nl-BE"/>
           </a:p>
@@ -2533,7 +2544,7 @@
           <a:p>
             <a:fld id="{8D0AC96A-CB4C-447A-BAE9-CD71E5D3E387}" type="datetime1">
               <a:rPr lang="nl-BE" smtClean="0"/>
-              <a:t>2017-02-06</a:t>
+              <a:t>2017-02-10</a:t>
             </a:fld>
             <a:endParaRPr lang="nl-BE"/>
           </a:p>
@@ -2790,7 +2801,7 @@
           <a:p>
             <a:fld id="{8EF713C0-6057-4AAB-80ED-C8B012F691C2}" type="datetime1">
               <a:rPr lang="nl-BE" smtClean="0"/>
-              <a:t>2017-02-06</a:t>
+              <a:t>2017-02-10</a:t>
             </a:fld>
             <a:endParaRPr lang="nl-BE"/>
           </a:p>
@@ -3003,7 +3014,7 @@
           <a:p>
             <a:fld id="{67CEDA06-6E27-4D36-9084-23ECECD0BA0D}" type="datetime1">
               <a:rPr lang="nl-BE" smtClean="0"/>
-              <a:t>2017-02-06</a:t>
+              <a:t>2017-02-10</a:t>
             </a:fld>
             <a:endParaRPr lang="nl-BE"/>
           </a:p>
@@ -3568,6 +3579,2404 @@
   <p:clrMapOvr>
     <a:masterClrMapping/>
   </p:clrMapOvr>
+  <p:timing>
+    <p:tnLst>
+      <p:par>
+        <p:cTn id="1" dur="indefinite" restart="never" nodeType="tmRoot"/>
+      </p:par>
+    </p:tnLst>
+  </p:timing>
+</p:sld>
+</file>
+
+<file path=ppt/slides/slide10.xml><?xml version="1.0" encoding="utf-8"?>
+<p:sld xmlns:a="http://schemas.openxmlformats.org/drawingml/2006/main" xmlns:r="http://schemas.openxmlformats.org/officeDocument/2006/relationships" xmlns:p="http://schemas.openxmlformats.org/presentationml/2006/main">
+  <p:cSld>
+    <p:spTree>
+      <p:nvGrpSpPr>
+        <p:cNvPr id="1" name=""/>
+        <p:cNvGrpSpPr/>
+        <p:nvPr/>
+      </p:nvGrpSpPr>
+      <p:grpSpPr>
+        <a:xfrm>
+          <a:off x="0" y="0"/>
+          <a:ext cx="0" cy="0"/>
+          <a:chOff x="0" y="0"/>
+          <a:chExt cx="0" cy="0"/>
+        </a:xfrm>
+      </p:grpSpPr>
+      <p:sp>
+        <p:nvSpPr>
+          <p:cNvPr id="2" name="Title 1"/>
+          <p:cNvSpPr>
+            <a:spLocks noGrp="1"/>
+          </p:cNvSpPr>
+          <p:nvPr>
+            <p:ph type="title"/>
+          </p:nvPr>
+        </p:nvSpPr>
+        <p:spPr/>
+        <p:txBody>
+          <a:bodyPr/>
+          <a:lstStyle/>
+          <a:p>
+            <a:r>
+              <a:rPr lang="en-US" dirty="0" smtClean="0"/>
+              <a:t>Results</a:t>
+            </a:r>
+            <a:endParaRPr lang="nl-BE" dirty="0"/>
+          </a:p>
+        </p:txBody>
+      </p:sp>
+      <p:sp>
+        <p:nvSpPr>
+          <p:cNvPr id="3" name="Slide Number Placeholder 2"/>
+          <p:cNvSpPr>
+            <a:spLocks noGrp="1"/>
+          </p:cNvSpPr>
+          <p:nvPr>
+            <p:ph type="sldNum" sz="quarter" idx="12"/>
+          </p:nvPr>
+        </p:nvSpPr>
+        <p:spPr/>
+        <p:txBody>
+          <a:bodyPr/>
+          <a:lstStyle/>
+          <a:p>
+            <a:fld id="{AFF690EF-DE1B-4F48-8935-D551336ADF29}" type="slidenum">
+              <a:rPr lang="nl-BE" smtClean="0"/>
+              <a:t>10</a:t>
+            </a:fld>
+            <a:endParaRPr lang="nl-BE"/>
+          </a:p>
+        </p:txBody>
+      </p:sp>
+      <p:pic>
+        <p:nvPicPr>
+          <p:cNvPr id="4" name="Picture 3"/>
+          <p:cNvPicPr>
+            <a:picLocks noChangeAspect="1"/>
+          </p:cNvPicPr>
+          <p:nvPr/>
+        </p:nvPicPr>
+        <p:blipFill>
+          <a:blip r:embed="rId2">
+            <a:extLst>
+              <a:ext uri="{28A0092B-C50C-407E-A947-70E740481C1C}">
+                <a14:useLocalDpi xmlns:a14="http://schemas.microsoft.com/office/drawing/2010/main" val="0"/>
+              </a:ext>
+            </a:extLst>
+          </a:blip>
+          <a:stretch>
+            <a:fillRect/>
+          </a:stretch>
+        </p:blipFill>
+        <p:spPr>
+          <a:xfrm>
+            <a:off x="163902" y="1572011"/>
+            <a:ext cx="8850702" cy="4856312"/>
+          </a:xfrm>
+          <a:prstGeom prst="rect">
+            <a:avLst/>
+          </a:prstGeom>
+        </p:spPr>
+      </p:pic>
+      <p:grpSp>
+        <p:nvGrpSpPr>
+          <p:cNvPr id="6" name="Group 5"/>
+          <p:cNvGrpSpPr/>
+          <p:nvPr/>
+        </p:nvGrpSpPr>
+        <p:grpSpPr>
+          <a:xfrm>
+            <a:off x="2329132" y="3229447"/>
+            <a:ext cx="4746236" cy="614931"/>
+            <a:chOff x="2329132" y="2996545"/>
+            <a:chExt cx="4746236" cy="614931"/>
+          </a:xfrm>
+        </p:grpSpPr>
+        <p:sp>
+          <p:nvSpPr>
+            <p:cNvPr id="5" name="TextBox 4"/>
+            <p:cNvSpPr txBox="1"/>
+            <p:nvPr/>
+          </p:nvSpPr>
+          <p:spPr>
+            <a:xfrm rot="19495361">
+              <a:off x="2329132" y="3088256"/>
+              <a:ext cx="4746236" cy="523220"/>
+            </a:xfrm>
+            <a:prstGeom prst="rect">
+              <a:avLst/>
+            </a:prstGeom>
+            <a:noFill/>
+          </p:spPr>
+          <p:txBody>
+            <a:bodyPr wrap="none" rtlCol="0">
+              <a:spAutoFit/>
+            </a:bodyPr>
+            <a:lstStyle/>
+            <a:p>
+              <a:r>
+                <a:rPr lang="en-US" sz="2800" b="1" dirty="0" smtClean="0">
+                  <a:solidFill>
+                    <a:srgbClr val="FF0000"/>
+                  </a:solidFill>
+                </a:rPr>
+                <a:t>Ask you boss for a large screen</a:t>
+              </a:r>
+              <a:endParaRPr lang="nl-BE" sz="2800" b="1" dirty="0">
+                <a:solidFill>
+                  <a:srgbClr val="FF0000"/>
+                </a:solidFill>
+              </a:endParaRPr>
+            </a:p>
+          </p:txBody>
+        </p:sp>
+        <p:pic>
+          <p:nvPicPr>
+            <p:cNvPr id="1026" name="Picture 2" descr="Image result for smiley face wink"/>
+            <p:cNvPicPr>
+              <a:picLocks noChangeAspect="1" noChangeArrowheads="1"/>
+            </p:cNvPicPr>
+            <p:nvPr/>
+          </p:nvPicPr>
+          <p:blipFill>
+            <a:blip r:embed="rId3" cstate="print">
+              <a:extLst>
+                <a:ext uri="{28A0092B-C50C-407E-A947-70E740481C1C}">
+                  <a14:useLocalDpi xmlns:a14="http://schemas.microsoft.com/office/drawing/2010/main" val="0"/>
+                </a:ext>
+              </a:extLst>
+            </a:blip>
+            <a:srcRect/>
+            <a:stretch>
+              <a:fillRect/>
+            </a:stretch>
+          </p:blipFill>
+          <p:spPr bwMode="auto">
+            <a:xfrm>
+              <a:off x="5557134" y="2996545"/>
+              <a:ext cx="519653" cy="519653"/>
+            </a:xfrm>
+            <a:prstGeom prst="rect">
+              <a:avLst/>
+            </a:prstGeom>
+            <a:noFill/>
+            <a:extLst>
+              <a:ext uri="{909E8E84-426E-40DD-AFC4-6F175D3DCCD1}">
+                <a14:hiddenFill xmlns:a14="http://schemas.microsoft.com/office/drawing/2010/main">
+                  <a:solidFill>
+                    <a:srgbClr val="FFFFFF"/>
+                  </a:solidFill>
+                </a14:hiddenFill>
+              </a:ext>
+            </a:extLst>
+          </p:spPr>
+        </p:pic>
+      </p:grpSp>
+    </p:spTree>
+    <p:extLst>
+      <p:ext uri="{BB962C8B-B14F-4D97-AF65-F5344CB8AC3E}">
+        <p14:creationId xmlns:p14="http://schemas.microsoft.com/office/powerpoint/2010/main" val="970892735"/>
+      </p:ext>
+    </p:extLst>
+  </p:cSld>
+  <p:clrMapOvr>
+    <a:masterClrMapping/>
+  </p:clrMapOvr>
+  <p:timing>
+    <p:tnLst>
+      <p:par>
+        <p:cTn id="1" dur="indefinite" restart="never" nodeType="tmRoot">
+          <p:childTnLst>
+            <p:seq concurrent="1" nextAc="seek">
+              <p:cTn id="2" dur="indefinite" nodeType="mainSeq">
+                <p:childTnLst>
+                  <p:par>
+                    <p:cTn id="3" fill="hold">
+                      <p:stCondLst>
+                        <p:cond delay="indefinite"/>
+                      </p:stCondLst>
+                      <p:childTnLst>
+                        <p:par>
+                          <p:cTn id="4" fill="hold">
+                            <p:stCondLst>
+                              <p:cond delay="0"/>
+                            </p:stCondLst>
+                            <p:childTnLst>
+                              <p:par>
+                                <p:cTn id="5" presetID="1" presetClass="entr" presetSubtype="0" fill="hold" nodeType="clickEffect">
+                                  <p:stCondLst>
+                                    <p:cond delay="0"/>
+                                  </p:stCondLst>
+                                  <p:childTnLst>
+                                    <p:set>
+                                      <p:cBhvr>
+                                        <p:cTn id="6" dur="1" fill="hold">
+                                          <p:stCondLst>
+                                            <p:cond delay="0"/>
+                                          </p:stCondLst>
+                                        </p:cTn>
+                                        <p:tgtEl>
+                                          <p:spTgt spid="6"/>
+                                        </p:tgtEl>
+                                        <p:attrNameLst>
+                                          <p:attrName>style.visibility</p:attrName>
+                                        </p:attrNameLst>
+                                      </p:cBhvr>
+                                      <p:to>
+                                        <p:strVal val="visible"/>
+                                      </p:to>
+                                    </p:set>
+                                  </p:childTnLst>
+                                </p:cTn>
+                              </p:par>
+                            </p:childTnLst>
+                          </p:cTn>
+                        </p:par>
+                      </p:childTnLst>
+                    </p:cTn>
+                  </p:par>
+                </p:childTnLst>
+              </p:cTn>
+              <p:prevCondLst>
+                <p:cond evt="onPrev" delay="0">
+                  <p:tgtEl>
+                    <p:sldTgt/>
+                  </p:tgtEl>
+                </p:cond>
+              </p:prevCondLst>
+              <p:nextCondLst>
+                <p:cond evt="onNext" delay="0">
+                  <p:tgtEl>
+                    <p:sldTgt/>
+                  </p:tgtEl>
+                </p:cond>
+              </p:nextCondLst>
+            </p:seq>
+          </p:childTnLst>
+        </p:cTn>
+      </p:par>
+    </p:tnLst>
+  </p:timing>
+</p:sld>
+</file>
+
+<file path=ppt/slides/slide11.xml><?xml version="1.0" encoding="utf-8"?>
+<p:sld xmlns:a="http://schemas.openxmlformats.org/drawingml/2006/main" xmlns:r="http://schemas.openxmlformats.org/officeDocument/2006/relationships" xmlns:p="http://schemas.openxmlformats.org/presentationml/2006/main">
+  <p:cSld>
+    <p:spTree>
+      <p:nvGrpSpPr>
+        <p:cNvPr id="1" name=""/>
+        <p:cNvGrpSpPr/>
+        <p:nvPr/>
+      </p:nvGrpSpPr>
+      <p:grpSpPr>
+        <a:xfrm>
+          <a:off x="0" y="0"/>
+          <a:ext cx="0" cy="0"/>
+          <a:chOff x="0" y="0"/>
+          <a:chExt cx="0" cy="0"/>
+        </a:xfrm>
+      </p:grpSpPr>
+      <p:sp>
+        <p:nvSpPr>
+          <p:cNvPr id="2" name="Title 1"/>
+          <p:cNvSpPr>
+            <a:spLocks noGrp="1"/>
+          </p:cNvSpPr>
+          <p:nvPr>
+            <p:ph type="title"/>
+          </p:nvPr>
+        </p:nvSpPr>
+        <p:spPr/>
+        <p:txBody>
+          <a:bodyPr/>
+          <a:lstStyle/>
+          <a:p>
+            <a:r>
+              <a:rPr lang="en-US" dirty="0" smtClean="0"/>
+              <a:t>Overview</a:t>
+            </a:r>
+            <a:endParaRPr lang="nl-BE" dirty="0"/>
+          </a:p>
+        </p:txBody>
+      </p:sp>
+      <p:sp>
+        <p:nvSpPr>
+          <p:cNvPr id="3" name="Slide Number Placeholder 2"/>
+          <p:cNvSpPr>
+            <a:spLocks noGrp="1"/>
+          </p:cNvSpPr>
+          <p:nvPr>
+            <p:ph type="sldNum" sz="quarter" idx="12"/>
+          </p:nvPr>
+        </p:nvSpPr>
+        <p:spPr/>
+        <p:txBody>
+          <a:bodyPr/>
+          <a:lstStyle/>
+          <a:p>
+            <a:fld id="{AFF690EF-DE1B-4F48-8935-D551336ADF29}" type="slidenum">
+              <a:rPr lang="nl-BE" smtClean="0"/>
+              <a:t>11</a:t>
+            </a:fld>
+            <a:endParaRPr lang="nl-BE"/>
+          </a:p>
+        </p:txBody>
+      </p:sp>
+      <p:pic>
+        <p:nvPicPr>
+          <p:cNvPr id="4" name="Picture 3"/>
+          <p:cNvPicPr>
+            <a:picLocks noChangeAspect="1"/>
+          </p:cNvPicPr>
+          <p:nvPr/>
+        </p:nvPicPr>
+        <p:blipFill>
+          <a:blip r:embed="rId2"/>
+          <a:stretch>
+            <a:fillRect/>
+          </a:stretch>
+        </p:blipFill>
+        <p:spPr>
+          <a:xfrm>
+            <a:off x="765638" y="1851632"/>
+            <a:ext cx="3955123" cy="2171888"/>
+          </a:xfrm>
+          <a:prstGeom prst="rect">
+            <a:avLst/>
+          </a:prstGeom>
+        </p:spPr>
+      </p:pic>
+      <p:grpSp>
+        <p:nvGrpSpPr>
+          <p:cNvPr id="9" name="Group 8"/>
+          <p:cNvGrpSpPr/>
+          <p:nvPr/>
+        </p:nvGrpSpPr>
+        <p:grpSpPr>
+          <a:xfrm>
+            <a:off x="2424023" y="2467155"/>
+            <a:ext cx="5109941" cy="715992"/>
+            <a:chOff x="2424023" y="2467155"/>
+            <a:chExt cx="5109941" cy="715992"/>
+          </a:xfrm>
+        </p:grpSpPr>
+        <p:sp>
+          <p:nvSpPr>
+            <p:cNvPr id="5" name="Rectangle 4"/>
+            <p:cNvSpPr/>
+            <p:nvPr/>
+          </p:nvSpPr>
+          <p:spPr>
+            <a:xfrm>
+              <a:off x="2424023" y="2846717"/>
+              <a:ext cx="793630" cy="336430"/>
+            </a:xfrm>
+            <a:prstGeom prst="rect">
+              <a:avLst/>
+            </a:prstGeom>
+            <a:noFill/>
+            <a:ln w="19050">
+              <a:solidFill>
+                <a:srgbClr val="00B050"/>
+              </a:solidFill>
+            </a:ln>
+          </p:spPr>
+          <p:style>
+            <a:lnRef idx="2">
+              <a:schemeClr val="accent1">
+                <a:shade val="50000"/>
+              </a:schemeClr>
+            </a:lnRef>
+            <a:fillRef idx="1">
+              <a:schemeClr val="accent1"/>
+            </a:fillRef>
+            <a:effectRef idx="0">
+              <a:schemeClr val="accent1"/>
+            </a:effectRef>
+            <a:fontRef idx="minor">
+              <a:schemeClr val="lt1"/>
+            </a:fontRef>
+          </p:style>
+          <p:txBody>
+            <a:bodyPr rtlCol="0" anchor="ctr"/>
+            <a:lstStyle/>
+            <a:p>
+              <a:pPr algn="ctr"/>
+              <a:endParaRPr lang="nl-BE"/>
+            </a:p>
+          </p:txBody>
+        </p:sp>
+        <p:sp>
+          <p:nvSpPr>
+            <p:cNvPr id="6" name="TextBox 5"/>
+            <p:cNvSpPr txBox="1"/>
+            <p:nvPr/>
+          </p:nvSpPr>
+          <p:spPr>
+            <a:xfrm>
+              <a:off x="5426015" y="2467155"/>
+              <a:ext cx="2107949" cy="369332"/>
+            </a:xfrm>
+            <a:prstGeom prst="rect">
+              <a:avLst/>
+            </a:prstGeom>
+            <a:noFill/>
+            <a:ln>
+              <a:noFill/>
+            </a:ln>
+          </p:spPr>
+          <p:txBody>
+            <a:bodyPr wrap="none" rtlCol="0">
+              <a:spAutoFit/>
+            </a:bodyPr>
+            <a:lstStyle/>
+            <a:p>
+              <a:r>
+                <a:rPr lang="en-US" dirty="0" smtClean="0">
+                  <a:solidFill>
+                    <a:srgbClr val="00B050"/>
+                  </a:solidFill>
+                </a:rPr>
+                <a:t>Vector floating point</a:t>
+              </a:r>
+              <a:endParaRPr lang="nl-BE" dirty="0">
+                <a:solidFill>
+                  <a:srgbClr val="00B050"/>
+                </a:solidFill>
+              </a:endParaRPr>
+            </a:p>
+          </p:txBody>
+        </p:sp>
+        <p:cxnSp>
+          <p:nvCxnSpPr>
+            <p:cNvPr id="8" name="Straight Arrow Connector 7"/>
+            <p:cNvCxnSpPr>
+              <a:stCxn id="6" idx="1"/>
+              <a:endCxn id="5" idx="3"/>
+            </p:cNvCxnSpPr>
+            <p:nvPr/>
+          </p:nvCxnSpPr>
+          <p:spPr>
+            <a:xfrm flipH="1">
+              <a:off x="3217653" y="2651821"/>
+              <a:ext cx="2208362" cy="363111"/>
+            </a:xfrm>
+            <a:prstGeom prst="straightConnector1">
+              <a:avLst/>
+            </a:prstGeom>
+            <a:ln w="19050">
+              <a:solidFill>
+                <a:srgbClr val="00B050"/>
+              </a:solidFill>
+              <a:tailEnd type="stealth" w="lg" len="lg"/>
+            </a:ln>
+          </p:spPr>
+          <p:style>
+            <a:lnRef idx="1">
+              <a:schemeClr val="accent1"/>
+            </a:lnRef>
+            <a:fillRef idx="0">
+              <a:schemeClr val="accent1"/>
+            </a:fillRef>
+            <a:effectRef idx="0">
+              <a:schemeClr val="accent1"/>
+            </a:effectRef>
+            <a:fontRef idx="minor">
+              <a:schemeClr val="tx1"/>
+            </a:fontRef>
+          </p:style>
+        </p:cxnSp>
+      </p:grpSp>
+      <p:pic>
+        <p:nvPicPr>
+          <p:cNvPr id="2050" name="Picture 2" descr="Image result for smiley face"/>
+          <p:cNvPicPr>
+            <a:picLocks noChangeAspect="1" noChangeArrowheads="1"/>
+          </p:cNvPicPr>
+          <p:nvPr/>
+        </p:nvPicPr>
+        <p:blipFill>
+          <a:blip r:embed="rId3" cstate="print">
+            <a:extLst>
+              <a:ext uri="{28A0092B-C50C-407E-A947-70E740481C1C}">
+                <a14:useLocalDpi xmlns:a14="http://schemas.microsoft.com/office/drawing/2010/main" val="0"/>
+              </a:ext>
+            </a:extLst>
+          </a:blip>
+          <a:srcRect/>
+          <a:stretch>
+            <a:fillRect/>
+          </a:stretch>
+        </p:blipFill>
+        <p:spPr bwMode="auto">
+          <a:xfrm>
+            <a:off x="7637834" y="2413548"/>
+            <a:ext cx="601384" cy="601384"/>
+          </a:xfrm>
+          <a:prstGeom prst="rect">
+            <a:avLst/>
+          </a:prstGeom>
+          <a:noFill/>
+          <a:extLst>
+            <a:ext uri="{909E8E84-426E-40DD-AFC4-6F175D3DCCD1}">
+              <a14:hiddenFill xmlns:a14="http://schemas.microsoft.com/office/drawing/2010/main">
+                <a:solidFill>
+                  <a:srgbClr val="FFFFFF"/>
+                </a:solidFill>
+              </a14:hiddenFill>
+            </a:ext>
+          </a:extLst>
+        </p:spPr>
+      </p:pic>
+      <p:grpSp>
+        <p:nvGrpSpPr>
+          <p:cNvPr id="11" name="Group 10"/>
+          <p:cNvGrpSpPr/>
+          <p:nvPr/>
+        </p:nvGrpSpPr>
+        <p:grpSpPr>
+          <a:xfrm>
+            <a:off x="2424023" y="3632324"/>
+            <a:ext cx="3389502" cy="1162011"/>
+            <a:chOff x="2424023" y="2987300"/>
+            <a:chExt cx="3389502" cy="1162011"/>
+          </a:xfrm>
+        </p:grpSpPr>
+        <p:sp>
+          <p:nvSpPr>
+            <p:cNvPr id="12" name="Rectangle 11"/>
+            <p:cNvSpPr/>
+            <p:nvPr/>
+          </p:nvSpPr>
+          <p:spPr>
+            <a:xfrm>
+              <a:off x="2424023" y="2987300"/>
+              <a:ext cx="517140" cy="166678"/>
+            </a:xfrm>
+            <a:prstGeom prst="rect">
+              <a:avLst/>
+            </a:prstGeom>
+            <a:noFill/>
+            <a:ln w="19050">
+              <a:solidFill>
+                <a:srgbClr val="00B050"/>
+              </a:solidFill>
+            </a:ln>
+          </p:spPr>
+          <p:style>
+            <a:lnRef idx="2">
+              <a:schemeClr val="accent1">
+                <a:shade val="50000"/>
+              </a:schemeClr>
+            </a:lnRef>
+            <a:fillRef idx="1">
+              <a:schemeClr val="accent1"/>
+            </a:fillRef>
+            <a:effectRef idx="0">
+              <a:schemeClr val="accent1"/>
+            </a:effectRef>
+            <a:fontRef idx="minor">
+              <a:schemeClr val="lt1"/>
+            </a:fontRef>
+          </p:style>
+          <p:txBody>
+            <a:bodyPr rtlCol="0" anchor="ctr"/>
+            <a:lstStyle/>
+            <a:p>
+              <a:pPr algn="ctr"/>
+              <a:endParaRPr lang="nl-BE"/>
+            </a:p>
+          </p:txBody>
+        </p:sp>
+        <p:sp>
+          <p:nvSpPr>
+            <p:cNvPr id="13" name="TextBox 12"/>
+            <p:cNvSpPr txBox="1"/>
+            <p:nvPr/>
+          </p:nvSpPr>
+          <p:spPr>
+            <a:xfrm>
+              <a:off x="4372040" y="3779979"/>
+              <a:ext cx="1441485" cy="369332"/>
+            </a:xfrm>
+            <a:prstGeom prst="rect">
+              <a:avLst/>
+            </a:prstGeom>
+            <a:noFill/>
+            <a:ln>
+              <a:noFill/>
+            </a:ln>
+          </p:spPr>
+          <p:txBody>
+            <a:bodyPr wrap="none" rtlCol="0">
+              <a:spAutoFit/>
+            </a:bodyPr>
+            <a:lstStyle/>
+            <a:p>
+              <a:r>
+                <a:rPr lang="en-US" dirty="0" smtClean="0">
+                  <a:solidFill>
+                    <a:srgbClr val="00B050"/>
+                  </a:solidFill>
+                </a:rPr>
+                <a:t>No branching</a:t>
+              </a:r>
+              <a:endParaRPr lang="nl-BE" dirty="0">
+                <a:solidFill>
+                  <a:srgbClr val="00B050"/>
+                </a:solidFill>
+              </a:endParaRPr>
+            </a:p>
+          </p:txBody>
+        </p:sp>
+        <p:cxnSp>
+          <p:nvCxnSpPr>
+            <p:cNvPr id="14" name="Straight Arrow Connector 13"/>
+            <p:cNvCxnSpPr>
+              <a:stCxn id="13" idx="1"/>
+              <a:endCxn id="12" idx="3"/>
+            </p:cNvCxnSpPr>
+            <p:nvPr/>
+          </p:nvCxnSpPr>
+          <p:spPr>
+            <a:xfrm flipH="1" flipV="1">
+              <a:off x="2941163" y="3070639"/>
+              <a:ext cx="1430877" cy="894006"/>
+            </a:xfrm>
+            <a:prstGeom prst="straightConnector1">
+              <a:avLst/>
+            </a:prstGeom>
+            <a:ln w="19050">
+              <a:solidFill>
+                <a:srgbClr val="00B050"/>
+              </a:solidFill>
+              <a:tailEnd type="stealth" w="lg" len="lg"/>
+            </a:ln>
+          </p:spPr>
+          <p:style>
+            <a:lnRef idx="1">
+              <a:schemeClr val="accent1"/>
+            </a:lnRef>
+            <a:fillRef idx="0">
+              <a:schemeClr val="accent1"/>
+            </a:fillRef>
+            <a:effectRef idx="0">
+              <a:schemeClr val="accent1"/>
+            </a:effectRef>
+            <a:fontRef idx="minor">
+              <a:schemeClr val="tx1"/>
+            </a:fontRef>
+          </p:style>
+        </p:cxnSp>
+      </p:grpSp>
+      <p:pic>
+        <p:nvPicPr>
+          <p:cNvPr id="19" name="Picture 2" descr="Image result for smiley face"/>
+          <p:cNvPicPr>
+            <a:picLocks noChangeAspect="1" noChangeArrowheads="1"/>
+          </p:cNvPicPr>
+          <p:nvPr/>
+        </p:nvPicPr>
+        <p:blipFill>
+          <a:blip r:embed="rId3" cstate="print">
+            <a:extLst>
+              <a:ext uri="{28A0092B-C50C-407E-A947-70E740481C1C}">
+                <a14:useLocalDpi xmlns:a14="http://schemas.microsoft.com/office/drawing/2010/main" val="0"/>
+              </a:ext>
+            </a:extLst>
+          </a:blip>
+          <a:srcRect/>
+          <a:stretch>
+            <a:fillRect/>
+          </a:stretch>
+        </p:blipFill>
+        <p:spPr bwMode="auto">
+          <a:xfrm>
+            <a:off x="5918810" y="4308977"/>
+            <a:ext cx="601384" cy="601384"/>
+          </a:xfrm>
+          <a:prstGeom prst="rect">
+            <a:avLst/>
+          </a:prstGeom>
+          <a:noFill/>
+          <a:extLst>
+            <a:ext uri="{909E8E84-426E-40DD-AFC4-6F175D3DCCD1}">
+              <a14:hiddenFill xmlns:a14="http://schemas.microsoft.com/office/drawing/2010/main">
+                <a:solidFill>
+                  <a:srgbClr val="FFFFFF"/>
+                </a:solidFill>
+              </a14:hiddenFill>
+            </a:ext>
+          </a:extLst>
+        </p:spPr>
+      </p:pic>
+      <p:grpSp>
+        <p:nvGrpSpPr>
+          <p:cNvPr id="20" name="Group 19"/>
+          <p:cNvGrpSpPr/>
+          <p:nvPr/>
+        </p:nvGrpSpPr>
+        <p:grpSpPr>
+          <a:xfrm>
+            <a:off x="2424023" y="3491144"/>
+            <a:ext cx="5382276" cy="532376"/>
+            <a:chOff x="2424023" y="3003610"/>
+            <a:chExt cx="5382276" cy="532376"/>
+          </a:xfrm>
+        </p:grpSpPr>
+        <p:sp>
+          <p:nvSpPr>
+            <p:cNvPr id="21" name="Rectangle 20"/>
+            <p:cNvSpPr/>
+            <p:nvPr/>
+          </p:nvSpPr>
+          <p:spPr>
+            <a:xfrm>
+              <a:off x="2424023" y="3003610"/>
+              <a:ext cx="1836892" cy="150367"/>
+            </a:xfrm>
+            <a:prstGeom prst="rect">
+              <a:avLst/>
+            </a:prstGeom>
+            <a:noFill/>
+            <a:ln w="19050">
+              <a:solidFill>
+                <a:srgbClr val="C00000"/>
+              </a:solidFill>
+            </a:ln>
+          </p:spPr>
+          <p:style>
+            <a:lnRef idx="2">
+              <a:schemeClr val="accent1">
+                <a:shade val="50000"/>
+              </a:schemeClr>
+            </a:lnRef>
+            <a:fillRef idx="1">
+              <a:schemeClr val="accent1"/>
+            </a:fillRef>
+            <a:effectRef idx="0">
+              <a:schemeClr val="accent1"/>
+            </a:effectRef>
+            <a:fontRef idx="minor">
+              <a:schemeClr val="lt1"/>
+            </a:fontRef>
+          </p:style>
+          <p:txBody>
+            <a:bodyPr rtlCol="0" anchor="ctr"/>
+            <a:lstStyle/>
+            <a:p>
+              <a:pPr algn="ctr"/>
+              <a:endParaRPr lang="nl-BE"/>
+            </a:p>
+          </p:txBody>
+        </p:sp>
+        <p:sp>
+          <p:nvSpPr>
+            <p:cNvPr id="22" name="TextBox 21"/>
+            <p:cNvSpPr txBox="1"/>
+            <p:nvPr/>
+          </p:nvSpPr>
+          <p:spPr>
+            <a:xfrm>
+              <a:off x="5658403" y="3166654"/>
+              <a:ext cx="2147896" cy="369332"/>
+            </a:xfrm>
+            <a:prstGeom prst="rect">
+              <a:avLst/>
+            </a:prstGeom>
+            <a:noFill/>
+            <a:ln>
+              <a:noFill/>
+            </a:ln>
+          </p:spPr>
+          <p:txBody>
+            <a:bodyPr wrap="none" rtlCol="0">
+              <a:spAutoFit/>
+            </a:bodyPr>
+            <a:lstStyle/>
+            <a:p>
+              <a:r>
+                <a:rPr lang="en-US" dirty="0" smtClean="0">
+                  <a:solidFill>
+                    <a:srgbClr val="C00000"/>
+                  </a:solidFill>
+                </a:rPr>
+                <a:t>Memory access 74 %</a:t>
+              </a:r>
+              <a:endParaRPr lang="nl-BE" dirty="0">
+                <a:solidFill>
+                  <a:srgbClr val="C00000"/>
+                </a:solidFill>
+              </a:endParaRPr>
+            </a:p>
+          </p:txBody>
+        </p:sp>
+        <p:cxnSp>
+          <p:nvCxnSpPr>
+            <p:cNvPr id="23" name="Straight Arrow Connector 22"/>
+            <p:cNvCxnSpPr>
+              <a:stCxn id="22" idx="1"/>
+              <a:endCxn id="21" idx="3"/>
+            </p:cNvCxnSpPr>
+            <p:nvPr/>
+          </p:nvCxnSpPr>
+          <p:spPr>
+            <a:xfrm flipH="1" flipV="1">
+              <a:off x="4260915" y="3078794"/>
+              <a:ext cx="1397488" cy="272526"/>
+            </a:xfrm>
+            <a:prstGeom prst="straightConnector1">
+              <a:avLst/>
+            </a:prstGeom>
+            <a:ln w="19050">
+              <a:solidFill>
+                <a:srgbClr val="C00000"/>
+              </a:solidFill>
+              <a:tailEnd type="stealth" w="lg" len="lg"/>
+            </a:ln>
+          </p:spPr>
+          <p:style>
+            <a:lnRef idx="1">
+              <a:schemeClr val="accent1"/>
+            </a:lnRef>
+            <a:fillRef idx="0">
+              <a:schemeClr val="accent1"/>
+            </a:fillRef>
+            <a:effectRef idx="0">
+              <a:schemeClr val="accent1"/>
+            </a:effectRef>
+            <a:fontRef idx="minor">
+              <a:schemeClr val="tx1"/>
+            </a:fontRef>
+          </p:style>
+        </p:cxnSp>
+      </p:grpSp>
+      <p:pic>
+        <p:nvPicPr>
+          <p:cNvPr id="27" name="Picture 4" descr="Image result for smiley face sad"/>
+          <p:cNvPicPr>
+            <a:picLocks noChangeAspect="1" noChangeArrowheads="1"/>
+          </p:cNvPicPr>
+          <p:nvPr/>
+        </p:nvPicPr>
+        <p:blipFill>
+          <a:blip r:embed="rId4" cstate="print">
+            <a:extLst>
+              <a:ext uri="{28A0092B-C50C-407E-A947-70E740481C1C}">
+                <a14:useLocalDpi xmlns:a14="http://schemas.microsoft.com/office/drawing/2010/main" val="0"/>
+              </a:ext>
+            </a:extLst>
+          </a:blip>
+          <a:srcRect/>
+          <a:stretch>
+            <a:fillRect/>
+          </a:stretch>
+        </p:blipFill>
+        <p:spPr bwMode="auto">
+          <a:xfrm>
+            <a:off x="7916168" y="3539263"/>
+            <a:ext cx="599182" cy="599182"/>
+          </a:xfrm>
+          <a:prstGeom prst="rect">
+            <a:avLst/>
+          </a:prstGeom>
+          <a:noFill/>
+          <a:extLst>
+            <a:ext uri="{909E8E84-426E-40DD-AFC4-6F175D3DCCD1}">
+              <a14:hiddenFill xmlns:a14="http://schemas.microsoft.com/office/drawing/2010/main">
+                <a:solidFill>
+                  <a:srgbClr val="FFFFFF"/>
+                </a:solidFill>
+              </a14:hiddenFill>
+            </a:ext>
+          </a:extLst>
+        </p:spPr>
+      </p:pic>
+    </p:spTree>
+    <p:extLst>
+      <p:ext uri="{BB962C8B-B14F-4D97-AF65-F5344CB8AC3E}">
+        <p14:creationId xmlns:p14="http://schemas.microsoft.com/office/powerpoint/2010/main" val="1812545589"/>
+      </p:ext>
+    </p:extLst>
+  </p:cSld>
+  <p:clrMapOvr>
+    <a:masterClrMapping/>
+  </p:clrMapOvr>
+  <p:timing>
+    <p:tnLst>
+      <p:par>
+        <p:cTn id="1" dur="indefinite" restart="never" nodeType="tmRoot">
+          <p:childTnLst>
+            <p:seq concurrent="1" nextAc="seek">
+              <p:cTn id="2" dur="indefinite" nodeType="mainSeq">
+                <p:childTnLst>
+                  <p:par>
+                    <p:cTn id="3" fill="hold">
+                      <p:stCondLst>
+                        <p:cond delay="indefinite"/>
+                      </p:stCondLst>
+                      <p:childTnLst>
+                        <p:par>
+                          <p:cTn id="4" fill="hold">
+                            <p:stCondLst>
+                              <p:cond delay="0"/>
+                            </p:stCondLst>
+                            <p:childTnLst>
+                              <p:par>
+                                <p:cTn id="5" presetID="1" presetClass="entr" presetSubtype="0" fill="hold" nodeType="clickEffect">
+                                  <p:stCondLst>
+                                    <p:cond delay="0"/>
+                                  </p:stCondLst>
+                                  <p:childTnLst>
+                                    <p:set>
+                                      <p:cBhvr>
+                                        <p:cTn id="6" dur="1" fill="hold">
+                                          <p:stCondLst>
+                                            <p:cond delay="0"/>
+                                          </p:stCondLst>
+                                        </p:cTn>
+                                        <p:tgtEl>
+                                          <p:spTgt spid="9"/>
+                                        </p:tgtEl>
+                                        <p:attrNameLst>
+                                          <p:attrName>style.visibility</p:attrName>
+                                        </p:attrNameLst>
+                                      </p:cBhvr>
+                                      <p:to>
+                                        <p:strVal val="visible"/>
+                                      </p:to>
+                                    </p:set>
+                                  </p:childTnLst>
+                                </p:cTn>
+                              </p:par>
+                              <p:par>
+                                <p:cTn id="7" presetID="1" presetClass="entr" presetSubtype="0" fill="hold" nodeType="withEffect">
+                                  <p:stCondLst>
+                                    <p:cond delay="0"/>
+                                  </p:stCondLst>
+                                  <p:childTnLst>
+                                    <p:set>
+                                      <p:cBhvr>
+                                        <p:cTn id="8" dur="1" fill="hold">
+                                          <p:stCondLst>
+                                            <p:cond delay="0"/>
+                                          </p:stCondLst>
+                                        </p:cTn>
+                                        <p:tgtEl>
+                                          <p:spTgt spid="2050"/>
+                                        </p:tgtEl>
+                                        <p:attrNameLst>
+                                          <p:attrName>style.visibility</p:attrName>
+                                        </p:attrNameLst>
+                                      </p:cBhvr>
+                                      <p:to>
+                                        <p:strVal val="visible"/>
+                                      </p:to>
+                                    </p:set>
+                                  </p:childTnLst>
+                                </p:cTn>
+                              </p:par>
+                            </p:childTnLst>
+                          </p:cTn>
+                        </p:par>
+                      </p:childTnLst>
+                    </p:cTn>
+                  </p:par>
+                  <p:par>
+                    <p:cTn id="9" fill="hold">
+                      <p:stCondLst>
+                        <p:cond delay="indefinite"/>
+                      </p:stCondLst>
+                      <p:childTnLst>
+                        <p:par>
+                          <p:cTn id="10" fill="hold">
+                            <p:stCondLst>
+                              <p:cond delay="0"/>
+                            </p:stCondLst>
+                            <p:childTnLst>
+                              <p:par>
+                                <p:cTn id="11" presetID="1" presetClass="entr" presetSubtype="0" fill="hold" nodeType="clickEffect">
+                                  <p:stCondLst>
+                                    <p:cond delay="0"/>
+                                  </p:stCondLst>
+                                  <p:childTnLst>
+                                    <p:set>
+                                      <p:cBhvr>
+                                        <p:cTn id="12" dur="1" fill="hold">
+                                          <p:stCondLst>
+                                            <p:cond delay="0"/>
+                                          </p:stCondLst>
+                                        </p:cTn>
+                                        <p:tgtEl>
+                                          <p:spTgt spid="11"/>
+                                        </p:tgtEl>
+                                        <p:attrNameLst>
+                                          <p:attrName>style.visibility</p:attrName>
+                                        </p:attrNameLst>
+                                      </p:cBhvr>
+                                      <p:to>
+                                        <p:strVal val="visible"/>
+                                      </p:to>
+                                    </p:set>
+                                  </p:childTnLst>
+                                </p:cTn>
+                              </p:par>
+                              <p:par>
+                                <p:cTn id="13" presetID="1" presetClass="entr" presetSubtype="0" fill="hold" nodeType="withEffect">
+                                  <p:stCondLst>
+                                    <p:cond delay="0"/>
+                                  </p:stCondLst>
+                                  <p:childTnLst>
+                                    <p:set>
+                                      <p:cBhvr>
+                                        <p:cTn id="14" dur="1" fill="hold">
+                                          <p:stCondLst>
+                                            <p:cond delay="0"/>
+                                          </p:stCondLst>
+                                        </p:cTn>
+                                        <p:tgtEl>
+                                          <p:spTgt spid="19"/>
+                                        </p:tgtEl>
+                                        <p:attrNameLst>
+                                          <p:attrName>style.visibility</p:attrName>
+                                        </p:attrNameLst>
+                                      </p:cBhvr>
+                                      <p:to>
+                                        <p:strVal val="visible"/>
+                                      </p:to>
+                                    </p:set>
+                                  </p:childTnLst>
+                                </p:cTn>
+                              </p:par>
+                            </p:childTnLst>
+                          </p:cTn>
+                        </p:par>
+                      </p:childTnLst>
+                    </p:cTn>
+                  </p:par>
+                  <p:par>
+                    <p:cTn id="15" fill="hold">
+                      <p:stCondLst>
+                        <p:cond delay="indefinite"/>
+                      </p:stCondLst>
+                      <p:childTnLst>
+                        <p:par>
+                          <p:cTn id="16" fill="hold">
+                            <p:stCondLst>
+                              <p:cond delay="0"/>
+                            </p:stCondLst>
+                            <p:childTnLst>
+                              <p:par>
+                                <p:cTn id="17" presetID="1" presetClass="entr" presetSubtype="0" fill="hold" nodeType="clickEffect">
+                                  <p:stCondLst>
+                                    <p:cond delay="0"/>
+                                  </p:stCondLst>
+                                  <p:childTnLst>
+                                    <p:set>
+                                      <p:cBhvr>
+                                        <p:cTn id="18" dur="1" fill="hold">
+                                          <p:stCondLst>
+                                            <p:cond delay="0"/>
+                                          </p:stCondLst>
+                                        </p:cTn>
+                                        <p:tgtEl>
+                                          <p:spTgt spid="20"/>
+                                        </p:tgtEl>
+                                        <p:attrNameLst>
+                                          <p:attrName>style.visibility</p:attrName>
+                                        </p:attrNameLst>
+                                      </p:cBhvr>
+                                      <p:to>
+                                        <p:strVal val="visible"/>
+                                      </p:to>
+                                    </p:set>
+                                  </p:childTnLst>
+                                </p:cTn>
+                              </p:par>
+                              <p:par>
+                                <p:cTn id="19" presetID="1" presetClass="entr" presetSubtype="0" fill="hold" nodeType="withEffect">
+                                  <p:stCondLst>
+                                    <p:cond delay="0"/>
+                                  </p:stCondLst>
+                                  <p:childTnLst>
+                                    <p:set>
+                                      <p:cBhvr>
+                                        <p:cTn id="20" dur="1" fill="hold">
+                                          <p:stCondLst>
+                                            <p:cond delay="0"/>
+                                          </p:stCondLst>
+                                        </p:cTn>
+                                        <p:tgtEl>
+                                          <p:spTgt spid="27"/>
+                                        </p:tgtEl>
+                                        <p:attrNameLst>
+                                          <p:attrName>style.visibility</p:attrName>
+                                        </p:attrNameLst>
+                                      </p:cBhvr>
+                                      <p:to>
+                                        <p:strVal val="visible"/>
+                                      </p:to>
+                                    </p:set>
+                                  </p:childTnLst>
+                                </p:cTn>
+                              </p:par>
+                            </p:childTnLst>
+                          </p:cTn>
+                        </p:par>
+                      </p:childTnLst>
+                    </p:cTn>
+                  </p:par>
+                </p:childTnLst>
+              </p:cTn>
+              <p:prevCondLst>
+                <p:cond evt="onPrev" delay="0">
+                  <p:tgtEl>
+                    <p:sldTgt/>
+                  </p:tgtEl>
+                </p:cond>
+              </p:prevCondLst>
+              <p:nextCondLst>
+                <p:cond evt="onNext" delay="0">
+                  <p:tgtEl>
+                    <p:sldTgt/>
+                  </p:tgtEl>
+                </p:cond>
+              </p:nextCondLst>
+            </p:seq>
+          </p:childTnLst>
+        </p:cTn>
+      </p:par>
+    </p:tnLst>
+  </p:timing>
+</p:sld>
+</file>
+
+<file path=ppt/slides/slide12.xml><?xml version="1.0" encoding="utf-8"?>
+<p:sld xmlns:a="http://schemas.openxmlformats.org/drawingml/2006/main" xmlns:r="http://schemas.openxmlformats.org/officeDocument/2006/relationships" xmlns:p="http://schemas.openxmlformats.org/presentationml/2006/main">
+  <p:cSld>
+    <p:spTree>
+      <p:nvGrpSpPr>
+        <p:cNvPr id="1" name=""/>
+        <p:cNvGrpSpPr/>
+        <p:nvPr/>
+      </p:nvGrpSpPr>
+      <p:grpSpPr>
+        <a:xfrm>
+          <a:off x="0" y="0"/>
+          <a:ext cx="0" cy="0"/>
+          <a:chOff x="0" y="0"/>
+          <a:chExt cx="0" cy="0"/>
+        </a:xfrm>
+      </p:grpSpPr>
+      <p:sp>
+        <p:nvSpPr>
+          <p:cNvPr id="2" name="Title 1"/>
+          <p:cNvSpPr>
+            <a:spLocks noGrp="1"/>
+          </p:cNvSpPr>
+          <p:nvPr>
+            <p:ph type="title"/>
+          </p:nvPr>
+        </p:nvSpPr>
+        <p:spPr/>
+        <p:txBody>
+          <a:bodyPr/>
+          <a:lstStyle/>
+          <a:p>
+            <a:r>
+              <a:rPr lang="en-US" dirty="0" smtClean="0"/>
+              <a:t>Time line</a:t>
+            </a:r>
+            <a:endParaRPr lang="nl-BE" dirty="0"/>
+          </a:p>
+        </p:txBody>
+      </p:sp>
+      <p:sp>
+        <p:nvSpPr>
+          <p:cNvPr id="13" name="Content Placeholder 12"/>
+          <p:cNvSpPr>
+            <a:spLocks noGrp="1"/>
+          </p:cNvSpPr>
+          <p:nvPr>
+            <p:ph idx="1"/>
+          </p:nvPr>
+        </p:nvSpPr>
+        <p:spPr>
+          <a:xfrm>
+            <a:off x="628650" y="3999093"/>
+            <a:ext cx="7886700" cy="2367831"/>
+          </a:xfrm>
+        </p:spPr>
+        <p:txBody>
+          <a:bodyPr>
+            <a:normAutofit fontScale="92500" lnSpcReduction="10000"/>
+          </a:bodyPr>
+          <a:lstStyle/>
+          <a:p>
+            <a:r>
+              <a:rPr lang="en-US" dirty="0" smtClean="0"/>
+              <a:t>Can display many metrics</a:t>
+            </a:r>
+          </a:p>
+          <a:p>
+            <a:pPr lvl="1"/>
+            <a:r>
+              <a:rPr lang="en-US" dirty="0" smtClean="0"/>
+              <a:t>CPU instructions</a:t>
+            </a:r>
+          </a:p>
+          <a:p>
+            <a:pPr lvl="1"/>
+            <a:r>
+              <a:rPr lang="en-US" dirty="0" smtClean="0"/>
+              <a:t>I/O: disk read/write</a:t>
+            </a:r>
+          </a:p>
+          <a:p>
+            <a:pPr lvl="1"/>
+            <a:r>
+              <a:rPr lang="en-US" dirty="0" smtClean="0"/>
+              <a:t>MPI</a:t>
+            </a:r>
+          </a:p>
+          <a:p>
+            <a:pPr lvl="2"/>
+            <a:r>
+              <a:rPr lang="en-US" dirty="0" smtClean="0"/>
+              <a:t>Number </a:t>
+            </a:r>
+            <a:r>
+              <a:rPr lang="en-US" dirty="0"/>
+              <a:t>c</a:t>
+            </a:r>
+            <a:r>
+              <a:rPr lang="en-US" dirty="0" smtClean="0"/>
+              <a:t>alls peer-to-peer &amp; collectives/s</a:t>
+            </a:r>
+          </a:p>
+          <a:p>
+            <a:pPr lvl="2"/>
+            <a:r>
+              <a:rPr lang="en-US" dirty="0" smtClean="0"/>
+              <a:t>Peer-to-peer &amp; collectives bandwidth</a:t>
+            </a:r>
+          </a:p>
+          <a:p>
+            <a:pPr lvl="2"/>
+            <a:r>
+              <a:rPr lang="en-US" dirty="0" smtClean="0"/>
+              <a:t>Send &amp; receive bandwidth</a:t>
+            </a:r>
+            <a:endParaRPr lang="nl-BE" dirty="0"/>
+          </a:p>
+        </p:txBody>
+      </p:sp>
+      <p:sp>
+        <p:nvSpPr>
+          <p:cNvPr id="3" name="Slide Number Placeholder 2"/>
+          <p:cNvSpPr>
+            <a:spLocks noGrp="1"/>
+          </p:cNvSpPr>
+          <p:nvPr>
+            <p:ph type="sldNum" sz="quarter" idx="12"/>
+          </p:nvPr>
+        </p:nvSpPr>
+        <p:spPr/>
+        <p:txBody>
+          <a:bodyPr/>
+          <a:lstStyle/>
+          <a:p>
+            <a:fld id="{AFF690EF-DE1B-4F48-8935-D551336ADF29}" type="slidenum">
+              <a:rPr lang="nl-BE" smtClean="0"/>
+              <a:t>12</a:t>
+            </a:fld>
+            <a:endParaRPr lang="nl-BE"/>
+          </a:p>
+        </p:txBody>
+      </p:sp>
+      <p:pic>
+        <p:nvPicPr>
+          <p:cNvPr id="4" name="Picture 3"/>
+          <p:cNvPicPr>
+            <a:picLocks noChangeAspect="1"/>
+          </p:cNvPicPr>
+          <p:nvPr/>
+        </p:nvPicPr>
+        <p:blipFill>
+          <a:blip r:embed="rId2"/>
+          <a:stretch>
+            <a:fillRect/>
+          </a:stretch>
+        </p:blipFill>
+        <p:spPr>
+          <a:xfrm>
+            <a:off x="693451" y="1690689"/>
+            <a:ext cx="7567316" cy="1745131"/>
+          </a:xfrm>
+          <a:prstGeom prst="rect">
+            <a:avLst/>
+          </a:prstGeom>
+        </p:spPr>
+      </p:pic>
+      <p:grpSp>
+        <p:nvGrpSpPr>
+          <p:cNvPr id="8" name="Group 7"/>
+          <p:cNvGrpSpPr/>
+          <p:nvPr/>
+        </p:nvGrpSpPr>
+        <p:grpSpPr>
+          <a:xfrm>
+            <a:off x="3269411" y="3612607"/>
+            <a:ext cx="1975449" cy="369332"/>
+            <a:chOff x="3269411" y="3838854"/>
+            <a:chExt cx="1975449" cy="369332"/>
+          </a:xfrm>
+        </p:grpSpPr>
+        <p:cxnSp>
+          <p:nvCxnSpPr>
+            <p:cNvPr id="6" name="Straight Arrow Connector 5"/>
+            <p:cNvCxnSpPr/>
+            <p:nvPr/>
+          </p:nvCxnSpPr>
+          <p:spPr>
+            <a:xfrm>
+              <a:off x="3269411" y="3856008"/>
+              <a:ext cx="1975449" cy="0"/>
+            </a:xfrm>
+            <a:prstGeom prst="straightConnector1">
+              <a:avLst/>
+            </a:prstGeom>
+            <a:ln w="38100">
+              <a:solidFill>
+                <a:schemeClr val="tx1"/>
+              </a:solidFill>
+              <a:tailEnd type="stealth" w="lg" len="lg"/>
+            </a:ln>
+          </p:spPr>
+          <p:style>
+            <a:lnRef idx="1">
+              <a:schemeClr val="accent1"/>
+            </a:lnRef>
+            <a:fillRef idx="0">
+              <a:schemeClr val="accent1"/>
+            </a:fillRef>
+            <a:effectRef idx="0">
+              <a:schemeClr val="accent1"/>
+            </a:effectRef>
+            <a:fontRef idx="minor">
+              <a:schemeClr val="tx1"/>
+            </a:fontRef>
+          </p:style>
+        </p:cxnSp>
+        <p:sp>
+          <p:nvSpPr>
+            <p:cNvPr id="7" name="TextBox 6"/>
+            <p:cNvSpPr txBox="1"/>
+            <p:nvPr/>
+          </p:nvSpPr>
+          <p:spPr>
+            <a:xfrm>
+              <a:off x="3862838" y="3838854"/>
+              <a:ext cx="614271" cy="369332"/>
+            </a:xfrm>
+            <a:prstGeom prst="rect">
+              <a:avLst/>
+            </a:prstGeom>
+            <a:noFill/>
+          </p:spPr>
+          <p:txBody>
+            <a:bodyPr wrap="none" rtlCol="0">
+              <a:spAutoFit/>
+            </a:bodyPr>
+            <a:lstStyle/>
+            <a:p>
+              <a:r>
+                <a:rPr lang="en-US" dirty="0" smtClean="0"/>
+                <a:t>time</a:t>
+              </a:r>
+              <a:endParaRPr lang="nl-BE" dirty="0"/>
+            </a:p>
+          </p:txBody>
+        </p:sp>
+      </p:grpSp>
+      <p:grpSp>
+        <p:nvGrpSpPr>
+          <p:cNvPr id="9" name="Group 8"/>
+          <p:cNvGrpSpPr/>
+          <p:nvPr/>
+        </p:nvGrpSpPr>
+        <p:grpSpPr>
+          <a:xfrm rot="5400000">
+            <a:off x="8091304" y="1817530"/>
+            <a:ext cx="1102674" cy="388775"/>
+            <a:chOff x="3085141" y="3467233"/>
+            <a:chExt cx="1102674" cy="388775"/>
+          </a:xfrm>
+        </p:grpSpPr>
+        <p:cxnSp>
+          <p:nvCxnSpPr>
+            <p:cNvPr id="10" name="Straight Arrow Connector 9"/>
+            <p:cNvCxnSpPr/>
+            <p:nvPr/>
+          </p:nvCxnSpPr>
+          <p:spPr>
+            <a:xfrm rot="16200000">
+              <a:off x="3640322" y="3485096"/>
+              <a:ext cx="0" cy="741823"/>
+            </a:xfrm>
+            <a:prstGeom prst="straightConnector1">
+              <a:avLst/>
+            </a:prstGeom>
+            <a:ln w="38100">
+              <a:solidFill>
+                <a:schemeClr val="tx1"/>
+              </a:solidFill>
+              <a:tailEnd type="stealth" w="lg" len="lg"/>
+            </a:ln>
+          </p:spPr>
+          <p:style>
+            <a:lnRef idx="1">
+              <a:schemeClr val="accent1"/>
+            </a:lnRef>
+            <a:fillRef idx="0">
+              <a:schemeClr val="accent1"/>
+            </a:fillRef>
+            <a:effectRef idx="0">
+              <a:schemeClr val="accent1"/>
+            </a:effectRef>
+            <a:fontRef idx="minor">
+              <a:schemeClr val="tx1"/>
+            </a:fontRef>
+          </p:style>
+        </p:cxnSp>
+        <p:sp>
+          <p:nvSpPr>
+            <p:cNvPr id="11" name="TextBox 10"/>
+            <p:cNvSpPr txBox="1"/>
+            <p:nvPr/>
+          </p:nvSpPr>
+          <p:spPr>
+            <a:xfrm>
+              <a:off x="3085141" y="3467233"/>
+              <a:ext cx="1102674" cy="369332"/>
+            </a:xfrm>
+            <a:prstGeom prst="rect">
+              <a:avLst/>
+            </a:prstGeom>
+            <a:noFill/>
+          </p:spPr>
+          <p:txBody>
+            <a:bodyPr wrap="none" rtlCol="0">
+              <a:spAutoFit/>
+            </a:bodyPr>
+            <a:lstStyle/>
+            <a:p>
+              <a:r>
+                <a:rPr lang="en-US" dirty="0" smtClean="0"/>
+                <a:t>processes</a:t>
+              </a:r>
+              <a:endParaRPr lang="nl-BE" dirty="0"/>
+            </a:p>
+          </p:txBody>
+        </p:sp>
+      </p:grpSp>
+      <p:sp>
+        <p:nvSpPr>
+          <p:cNvPr id="14" name="TextBox 13"/>
+          <p:cNvSpPr txBox="1"/>
+          <p:nvPr/>
+        </p:nvSpPr>
+        <p:spPr>
+          <a:xfrm>
+            <a:off x="5774938" y="5932455"/>
+            <a:ext cx="1961823" cy="400110"/>
+          </a:xfrm>
+          <a:prstGeom prst="rect">
+            <a:avLst/>
+          </a:prstGeom>
+          <a:noFill/>
+          <a:ln>
+            <a:solidFill>
+              <a:schemeClr val="tx1"/>
+            </a:solidFill>
+          </a:ln>
+        </p:spPr>
+        <p:txBody>
+          <a:bodyPr wrap="square" rtlCol="0">
+            <a:spAutoFit/>
+          </a:bodyPr>
+          <a:lstStyle/>
+          <a:p>
+            <a:r>
+              <a:rPr lang="en-US" sz="2000" dirty="0" smtClean="0"/>
+              <a:t>Any combination</a:t>
+            </a:r>
+            <a:endParaRPr lang="nl-BE" sz="2000" dirty="0"/>
+          </a:p>
+        </p:txBody>
+      </p:sp>
+      <p:grpSp>
+        <p:nvGrpSpPr>
+          <p:cNvPr id="33" name="Group 32"/>
+          <p:cNvGrpSpPr/>
+          <p:nvPr/>
+        </p:nvGrpSpPr>
+        <p:grpSpPr>
+          <a:xfrm>
+            <a:off x="2398144" y="776377"/>
+            <a:ext cx="5882065" cy="2350150"/>
+            <a:chOff x="2398144" y="776377"/>
+            <a:chExt cx="5882065" cy="2350150"/>
+          </a:xfrm>
+        </p:grpSpPr>
+        <p:grpSp>
+          <p:nvGrpSpPr>
+            <p:cNvPr id="31" name="Group 30"/>
+            <p:cNvGrpSpPr/>
+            <p:nvPr/>
+          </p:nvGrpSpPr>
+          <p:grpSpPr>
+            <a:xfrm>
+              <a:off x="2398144" y="1707843"/>
+              <a:ext cx="1975893" cy="1418684"/>
+              <a:chOff x="2398144" y="1707843"/>
+              <a:chExt cx="1975893" cy="1418684"/>
+            </a:xfrm>
+          </p:grpSpPr>
+          <p:sp>
+            <p:nvSpPr>
+              <p:cNvPr id="16" name="Rectangle 15"/>
+              <p:cNvSpPr/>
+              <p:nvPr/>
+            </p:nvSpPr>
+            <p:spPr>
+              <a:xfrm>
+                <a:off x="2398144" y="1707843"/>
+                <a:ext cx="1975893" cy="1418684"/>
+              </a:xfrm>
+              <a:prstGeom prst="rect">
+                <a:avLst/>
+              </a:prstGeom>
+              <a:solidFill>
+                <a:schemeClr val="bg1">
+                  <a:lumMod val="85000"/>
+                  <a:alpha val="57000"/>
+                </a:schemeClr>
+              </a:solidFill>
+              <a:ln>
+                <a:noFill/>
+              </a:ln>
+            </p:spPr>
+            <p:style>
+              <a:lnRef idx="2">
+                <a:schemeClr val="accent1">
+                  <a:shade val="50000"/>
+                </a:schemeClr>
+              </a:lnRef>
+              <a:fillRef idx="1">
+                <a:schemeClr val="accent1"/>
+              </a:fillRef>
+              <a:effectRef idx="0">
+                <a:schemeClr val="accent1"/>
+              </a:effectRef>
+              <a:fontRef idx="minor">
+                <a:schemeClr val="lt1"/>
+              </a:fontRef>
+            </p:style>
+            <p:txBody>
+              <a:bodyPr rtlCol="0" anchor="ctr"/>
+              <a:lstStyle/>
+              <a:p>
+                <a:pPr algn="ctr"/>
+                <a:endParaRPr lang="nl-BE"/>
+              </a:p>
+            </p:txBody>
+          </p:sp>
+          <p:cxnSp>
+            <p:nvCxnSpPr>
+              <p:cNvPr id="24" name="Straight Connector 23"/>
+              <p:cNvCxnSpPr/>
+              <p:nvPr/>
+            </p:nvCxnSpPr>
+            <p:spPr>
+              <a:xfrm flipH="1">
+                <a:off x="4371425" y="1739718"/>
+                <a:ext cx="2612" cy="1377422"/>
+              </a:xfrm>
+              <a:prstGeom prst="line">
+                <a:avLst/>
+              </a:prstGeom>
+              <a:ln>
+                <a:solidFill>
+                  <a:schemeClr val="tx1"/>
+                </a:solidFill>
+              </a:ln>
+            </p:spPr>
+            <p:style>
+              <a:lnRef idx="1">
+                <a:schemeClr val="accent1"/>
+              </a:lnRef>
+              <a:fillRef idx="0">
+                <a:schemeClr val="accent1"/>
+              </a:fillRef>
+              <a:effectRef idx="0">
+                <a:schemeClr val="accent1"/>
+              </a:effectRef>
+              <a:fontRef idx="minor">
+                <a:schemeClr val="tx1"/>
+              </a:fontRef>
+            </p:style>
+          </p:cxnSp>
+        </p:grpSp>
+        <p:grpSp>
+          <p:nvGrpSpPr>
+            <p:cNvPr id="32" name="Group 31"/>
+            <p:cNvGrpSpPr/>
+            <p:nvPr/>
+          </p:nvGrpSpPr>
+          <p:grpSpPr>
+            <a:xfrm>
+              <a:off x="6293289" y="1668754"/>
+              <a:ext cx="1986920" cy="1435838"/>
+              <a:chOff x="6293289" y="1668754"/>
+              <a:chExt cx="1986920" cy="1435838"/>
+            </a:xfrm>
+          </p:grpSpPr>
+          <p:sp>
+            <p:nvSpPr>
+              <p:cNvPr id="17" name="Rectangle 16"/>
+              <p:cNvSpPr/>
+              <p:nvPr/>
+            </p:nvSpPr>
+            <p:spPr>
+              <a:xfrm>
+                <a:off x="6304316" y="1668754"/>
+                <a:ext cx="1975893" cy="1435838"/>
+              </a:xfrm>
+              <a:prstGeom prst="rect">
+                <a:avLst/>
+              </a:prstGeom>
+              <a:solidFill>
+                <a:schemeClr val="bg1">
+                  <a:lumMod val="85000"/>
+                  <a:alpha val="46000"/>
+                </a:schemeClr>
+              </a:solidFill>
+              <a:ln>
+                <a:noFill/>
+              </a:ln>
+            </p:spPr>
+            <p:style>
+              <a:lnRef idx="2">
+                <a:schemeClr val="accent1">
+                  <a:shade val="50000"/>
+                </a:schemeClr>
+              </a:lnRef>
+              <a:fillRef idx="1">
+                <a:schemeClr val="accent1"/>
+              </a:fillRef>
+              <a:effectRef idx="0">
+                <a:schemeClr val="accent1"/>
+              </a:effectRef>
+              <a:fontRef idx="minor">
+                <a:schemeClr val="lt1"/>
+              </a:fontRef>
+            </p:style>
+            <p:txBody>
+              <a:bodyPr rtlCol="0" anchor="ctr"/>
+              <a:lstStyle/>
+              <a:p>
+                <a:pPr algn="ctr"/>
+                <a:endParaRPr lang="nl-BE"/>
+              </a:p>
+            </p:txBody>
+          </p:sp>
+          <p:cxnSp>
+            <p:nvCxnSpPr>
+              <p:cNvPr id="26" name="Straight Connector 25"/>
+              <p:cNvCxnSpPr/>
+              <p:nvPr/>
+            </p:nvCxnSpPr>
+            <p:spPr>
+              <a:xfrm flipH="1">
+                <a:off x="6293289" y="1727170"/>
+                <a:ext cx="2612" cy="1377422"/>
+              </a:xfrm>
+              <a:prstGeom prst="line">
+                <a:avLst/>
+              </a:prstGeom>
+              <a:ln>
+                <a:solidFill>
+                  <a:schemeClr val="tx1"/>
+                </a:solidFill>
+              </a:ln>
+            </p:spPr>
+            <p:style>
+              <a:lnRef idx="1">
+                <a:schemeClr val="accent1"/>
+              </a:lnRef>
+              <a:fillRef idx="0">
+                <a:schemeClr val="accent1"/>
+              </a:fillRef>
+              <a:effectRef idx="0">
+                <a:schemeClr val="accent1"/>
+              </a:effectRef>
+              <a:fontRef idx="minor">
+                <a:schemeClr val="tx1"/>
+              </a:fontRef>
+            </p:style>
+          </p:cxnSp>
+        </p:grpSp>
+        <p:grpSp>
+          <p:nvGrpSpPr>
+            <p:cNvPr id="30" name="Group 29"/>
+            <p:cNvGrpSpPr/>
+            <p:nvPr/>
+          </p:nvGrpSpPr>
+          <p:grpSpPr>
+            <a:xfrm>
+              <a:off x="4371425" y="776377"/>
+              <a:ext cx="3365336" cy="859371"/>
+              <a:chOff x="4371425" y="776377"/>
+              <a:chExt cx="3365336" cy="859371"/>
+            </a:xfrm>
+          </p:grpSpPr>
+          <p:sp>
+            <p:nvSpPr>
+              <p:cNvPr id="15" name="TextBox 14"/>
+              <p:cNvSpPr txBox="1"/>
+              <p:nvPr/>
+            </p:nvSpPr>
+            <p:spPr>
+              <a:xfrm>
+                <a:off x="5857336" y="776377"/>
+                <a:ext cx="1879425" cy="369332"/>
+              </a:xfrm>
+              <a:prstGeom prst="rect">
+                <a:avLst/>
+              </a:prstGeom>
+              <a:noFill/>
+            </p:spPr>
+            <p:txBody>
+              <a:bodyPr wrap="none" rtlCol="0">
+                <a:spAutoFit/>
+              </a:bodyPr>
+              <a:lstStyle/>
+              <a:p>
+                <a:r>
+                  <a:rPr lang="en-US" dirty="0" smtClean="0"/>
+                  <a:t>Zoom by selecting</a:t>
+                </a:r>
+                <a:endParaRPr lang="nl-BE" dirty="0"/>
+              </a:p>
+            </p:txBody>
+          </p:sp>
+          <p:sp>
+            <p:nvSpPr>
+              <p:cNvPr id="27" name="Right Brace 26"/>
+              <p:cNvSpPr/>
+              <p:nvPr/>
+            </p:nvSpPr>
+            <p:spPr>
+              <a:xfrm rot="16200000">
+                <a:off x="5292963" y="635420"/>
+                <a:ext cx="78790" cy="1921865"/>
+              </a:xfrm>
+              <a:prstGeom prst="rightBrace">
+                <a:avLst/>
+              </a:prstGeom>
+              <a:ln w="12700">
+                <a:solidFill>
+                  <a:schemeClr val="tx1"/>
+                </a:solidFill>
+              </a:ln>
+            </p:spPr>
+            <p:style>
+              <a:lnRef idx="1">
+                <a:schemeClr val="accent1"/>
+              </a:lnRef>
+              <a:fillRef idx="0">
+                <a:schemeClr val="accent1"/>
+              </a:fillRef>
+              <a:effectRef idx="0">
+                <a:schemeClr val="accent1"/>
+              </a:effectRef>
+              <a:fontRef idx="minor">
+                <a:schemeClr val="tx1"/>
+              </a:fontRef>
+            </p:style>
+            <p:txBody>
+              <a:bodyPr rtlCol="0" anchor="ctr"/>
+              <a:lstStyle/>
+              <a:p>
+                <a:pPr algn="ctr"/>
+                <a:endParaRPr lang="nl-BE"/>
+              </a:p>
+            </p:txBody>
+          </p:sp>
+          <p:cxnSp>
+            <p:nvCxnSpPr>
+              <p:cNvPr id="29" name="Straight Arrow Connector 28"/>
+              <p:cNvCxnSpPr>
+                <a:stCxn id="15" idx="1"/>
+                <a:endCxn id="27" idx="1"/>
+              </p:cNvCxnSpPr>
+              <p:nvPr/>
+            </p:nvCxnSpPr>
+            <p:spPr>
+              <a:xfrm flipH="1">
+                <a:off x="5332359" y="961043"/>
+                <a:ext cx="524977" cy="595915"/>
+              </a:xfrm>
+              <a:prstGeom prst="straightConnector1">
+                <a:avLst/>
+              </a:prstGeom>
+              <a:ln w="12700">
+                <a:solidFill>
+                  <a:schemeClr val="tx1"/>
+                </a:solidFill>
+                <a:tailEnd type="stealth" w="lg" len="lg"/>
+              </a:ln>
+            </p:spPr>
+            <p:style>
+              <a:lnRef idx="1">
+                <a:schemeClr val="accent1"/>
+              </a:lnRef>
+              <a:fillRef idx="0">
+                <a:schemeClr val="accent1"/>
+              </a:fillRef>
+              <a:effectRef idx="0">
+                <a:schemeClr val="accent1"/>
+              </a:effectRef>
+              <a:fontRef idx="minor">
+                <a:schemeClr val="tx1"/>
+              </a:fontRef>
+            </p:style>
+          </p:cxnSp>
+        </p:grpSp>
+      </p:grpSp>
+      <p:sp>
+        <p:nvSpPr>
+          <p:cNvPr id="34" name="TextBox 33"/>
+          <p:cNvSpPr txBox="1"/>
+          <p:nvPr/>
+        </p:nvSpPr>
+        <p:spPr>
+          <a:xfrm>
+            <a:off x="5857336" y="3796421"/>
+            <a:ext cx="1905971" cy="1200329"/>
+          </a:xfrm>
+          <a:prstGeom prst="rect">
+            <a:avLst/>
+          </a:prstGeom>
+          <a:noFill/>
+          <a:ln w="19050">
+            <a:solidFill>
+              <a:schemeClr val="tx1"/>
+            </a:solidFill>
+          </a:ln>
+        </p:spPr>
+        <p:txBody>
+          <a:bodyPr wrap="none" rtlCol="0">
+            <a:spAutoFit/>
+          </a:bodyPr>
+          <a:lstStyle/>
+          <a:p>
+            <a:r>
+              <a:rPr lang="en-US" sz="2400" dirty="0" smtClean="0"/>
+              <a:t>Very useful to</a:t>
+            </a:r>
+            <a:br>
+              <a:rPr lang="en-US" sz="2400" dirty="0" smtClean="0"/>
+            </a:br>
+            <a:r>
+              <a:rPr lang="en-US" sz="2400" dirty="0" smtClean="0"/>
+              <a:t>identify run</a:t>
+            </a:r>
+          </a:p>
+          <a:p>
+            <a:r>
+              <a:rPr lang="en-US" sz="2400" dirty="0" smtClean="0"/>
+              <a:t>phases</a:t>
+            </a:r>
+            <a:endParaRPr lang="nl-BE" sz="2400" dirty="0"/>
+          </a:p>
+        </p:txBody>
+      </p:sp>
+    </p:spTree>
+    <p:extLst>
+      <p:ext uri="{BB962C8B-B14F-4D97-AF65-F5344CB8AC3E}">
+        <p14:creationId xmlns:p14="http://schemas.microsoft.com/office/powerpoint/2010/main" val="1254430862"/>
+      </p:ext>
+    </p:extLst>
+  </p:cSld>
+  <p:clrMapOvr>
+    <a:masterClrMapping/>
+  </p:clrMapOvr>
+  <p:timing>
+    <p:tnLst>
+      <p:par>
+        <p:cTn id="1" dur="indefinite" restart="never" nodeType="tmRoot">
+          <p:childTnLst>
+            <p:seq concurrent="1" nextAc="seek">
+              <p:cTn id="2" dur="indefinite" nodeType="mainSeq">
+                <p:childTnLst>
+                  <p:par>
+                    <p:cTn id="3" fill="hold">
+                      <p:stCondLst>
+                        <p:cond delay="indefinite"/>
+                      </p:stCondLst>
+                      <p:childTnLst>
+                        <p:par>
+                          <p:cTn id="4" fill="hold">
+                            <p:stCondLst>
+                              <p:cond delay="0"/>
+                            </p:stCondLst>
+                            <p:childTnLst>
+                              <p:par>
+                                <p:cTn id="5" presetID="1" presetClass="entr" presetSubtype="0" fill="hold" grpId="0" nodeType="clickEffect">
+                                  <p:stCondLst>
+                                    <p:cond delay="0"/>
+                                  </p:stCondLst>
+                                  <p:childTnLst>
+                                    <p:set>
+                                      <p:cBhvr>
+                                        <p:cTn id="6" dur="1" fill="hold">
+                                          <p:stCondLst>
+                                            <p:cond delay="0"/>
+                                          </p:stCondLst>
+                                        </p:cTn>
+                                        <p:tgtEl>
+                                          <p:spTgt spid="13">
+                                            <p:txEl>
+                                              <p:pRg st="0" end="0"/>
+                                            </p:txEl>
+                                          </p:spTgt>
+                                        </p:tgtEl>
+                                        <p:attrNameLst>
+                                          <p:attrName>style.visibility</p:attrName>
+                                        </p:attrNameLst>
+                                      </p:cBhvr>
+                                      <p:to>
+                                        <p:strVal val="visible"/>
+                                      </p:to>
+                                    </p:set>
+                                  </p:childTnLst>
+                                </p:cTn>
+                              </p:par>
+                            </p:childTnLst>
+                          </p:cTn>
+                        </p:par>
+                      </p:childTnLst>
+                    </p:cTn>
+                  </p:par>
+                  <p:par>
+                    <p:cTn id="7" fill="hold">
+                      <p:stCondLst>
+                        <p:cond delay="indefinite"/>
+                      </p:stCondLst>
+                      <p:childTnLst>
+                        <p:par>
+                          <p:cTn id="8" fill="hold">
+                            <p:stCondLst>
+                              <p:cond delay="0"/>
+                            </p:stCondLst>
+                            <p:childTnLst>
+                              <p:par>
+                                <p:cTn id="9" presetID="1" presetClass="entr" presetSubtype="0" fill="hold" grpId="0" nodeType="clickEffect">
+                                  <p:stCondLst>
+                                    <p:cond delay="0"/>
+                                  </p:stCondLst>
+                                  <p:childTnLst>
+                                    <p:set>
+                                      <p:cBhvr>
+                                        <p:cTn id="10" dur="1" fill="hold">
+                                          <p:stCondLst>
+                                            <p:cond delay="0"/>
+                                          </p:stCondLst>
+                                        </p:cTn>
+                                        <p:tgtEl>
+                                          <p:spTgt spid="13">
+                                            <p:txEl>
+                                              <p:pRg st="1" end="1"/>
+                                            </p:txEl>
+                                          </p:spTgt>
+                                        </p:tgtEl>
+                                        <p:attrNameLst>
+                                          <p:attrName>style.visibility</p:attrName>
+                                        </p:attrNameLst>
+                                      </p:cBhvr>
+                                      <p:to>
+                                        <p:strVal val="visible"/>
+                                      </p:to>
+                                    </p:set>
+                                  </p:childTnLst>
+                                </p:cTn>
+                              </p:par>
+                            </p:childTnLst>
+                          </p:cTn>
+                        </p:par>
+                      </p:childTnLst>
+                    </p:cTn>
+                  </p:par>
+                  <p:par>
+                    <p:cTn id="11" fill="hold">
+                      <p:stCondLst>
+                        <p:cond delay="indefinite"/>
+                      </p:stCondLst>
+                      <p:childTnLst>
+                        <p:par>
+                          <p:cTn id="12" fill="hold">
+                            <p:stCondLst>
+                              <p:cond delay="0"/>
+                            </p:stCondLst>
+                            <p:childTnLst>
+                              <p:par>
+                                <p:cTn id="13" presetID="1" presetClass="entr" presetSubtype="0" fill="hold" grpId="0" nodeType="clickEffect">
+                                  <p:stCondLst>
+                                    <p:cond delay="0"/>
+                                  </p:stCondLst>
+                                  <p:childTnLst>
+                                    <p:set>
+                                      <p:cBhvr>
+                                        <p:cTn id="14" dur="1" fill="hold">
+                                          <p:stCondLst>
+                                            <p:cond delay="0"/>
+                                          </p:stCondLst>
+                                        </p:cTn>
+                                        <p:tgtEl>
+                                          <p:spTgt spid="13">
+                                            <p:txEl>
+                                              <p:pRg st="2" end="2"/>
+                                            </p:txEl>
+                                          </p:spTgt>
+                                        </p:tgtEl>
+                                        <p:attrNameLst>
+                                          <p:attrName>style.visibility</p:attrName>
+                                        </p:attrNameLst>
+                                      </p:cBhvr>
+                                      <p:to>
+                                        <p:strVal val="visible"/>
+                                      </p:to>
+                                    </p:set>
+                                  </p:childTnLst>
+                                </p:cTn>
+                              </p:par>
+                            </p:childTnLst>
+                          </p:cTn>
+                        </p:par>
+                      </p:childTnLst>
+                    </p:cTn>
+                  </p:par>
+                  <p:par>
+                    <p:cTn id="15" fill="hold">
+                      <p:stCondLst>
+                        <p:cond delay="indefinite"/>
+                      </p:stCondLst>
+                      <p:childTnLst>
+                        <p:par>
+                          <p:cTn id="16" fill="hold">
+                            <p:stCondLst>
+                              <p:cond delay="0"/>
+                            </p:stCondLst>
+                            <p:childTnLst>
+                              <p:par>
+                                <p:cTn id="17" presetID="1" presetClass="entr" presetSubtype="0" fill="hold" grpId="0" nodeType="clickEffect">
+                                  <p:stCondLst>
+                                    <p:cond delay="0"/>
+                                  </p:stCondLst>
+                                  <p:childTnLst>
+                                    <p:set>
+                                      <p:cBhvr>
+                                        <p:cTn id="18" dur="1" fill="hold">
+                                          <p:stCondLst>
+                                            <p:cond delay="0"/>
+                                          </p:stCondLst>
+                                        </p:cTn>
+                                        <p:tgtEl>
+                                          <p:spTgt spid="13">
+                                            <p:txEl>
+                                              <p:pRg st="3" end="3"/>
+                                            </p:txEl>
+                                          </p:spTgt>
+                                        </p:tgtEl>
+                                        <p:attrNameLst>
+                                          <p:attrName>style.visibility</p:attrName>
+                                        </p:attrNameLst>
+                                      </p:cBhvr>
+                                      <p:to>
+                                        <p:strVal val="visible"/>
+                                      </p:to>
+                                    </p:set>
+                                  </p:childTnLst>
+                                </p:cTn>
+                              </p:par>
+                              <p:par>
+                                <p:cTn id="19" presetID="1" presetClass="entr" presetSubtype="0" fill="hold" grpId="0" nodeType="withEffect">
+                                  <p:stCondLst>
+                                    <p:cond delay="0"/>
+                                  </p:stCondLst>
+                                  <p:childTnLst>
+                                    <p:set>
+                                      <p:cBhvr>
+                                        <p:cTn id="20" dur="1" fill="hold">
+                                          <p:stCondLst>
+                                            <p:cond delay="0"/>
+                                          </p:stCondLst>
+                                        </p:cTn>
+                                        <p:tgtEl>
+                                          <p:spTgt spid="13">
+                                            <p:txEl>
+                                              <p:pRg st="4" end="4"/>
+                                            </p:txEl>
+                                          </p:spTgt>
+                                        </p:tgtEl>
+                                        <p:attrNameLst>
+                                          <p:attrName>style.visibility</p:attrName>
+                                        </p:attrNameLst>
+                                      </p:cBhvr>
+                                      <p:to>
+                                        <p:strVal val="visible"/>
+                                      </p:to>
+                                    </p:set>
+                                  </p:childTnLst>
+                                </p:cTn>
+                              </p:par>
+                              <p:par>
+                                <p:cTn id="21" presetID="1" presetClass="entr" presetSubtype="0" fill="hold" grpId="0" nodeType="withEffect">
+                                  <p:stCondLst>
+                                    <p:cond delay="0"/>
+                                  </p:stCondLst>
+                                  <p:childTnLst>
+                                    <p:set>
+                                      <p:cBhvr>
+                                        <p:cTn id="22" dur="1" fill="hold">
+                                          <p:stCondLst>
+                                            <p:cond delay="0"/>
+                                          </p:stCondLst>
+                                        </p:cTn>
+                                        <p:tgtEl>
+                                          <p:spTgt spid="13">
+                                            <p:txEl>
+                                              <p:pRg st="5" end="5"/>
+                                            </p:txEl>
+                                          </p:spTgt>
+                                        </p:tgtEl>
+                                        <p:attrNameLst>
+                                          <p:attrName>style.visibility</p:attrName>
+                                        </p:attrNameLst>
+                                      </p:cBhvr>
+                                      <p:to>
+                                        <p:strVal val="visible"/>
+                                      </p:to>
+                                    </p:set>
+                                  </p:childTnLst>
+                                </p:cTn>
+                              </p:par>
+                              <p:par>
+                                <p:cTn id="23" presetID="1" presetClass="entr" presetSubtype="0" fill="hold" grpId="0" nodeType="withEffect">
+                                  <p:stCondLst>
+                                    <p:cond delay="0"/>
+                                  </p:stCondLst>
+                                  <p:childTnLst>
+                                    <p:set>
+                                      <p:cBhvr>
+                                        <p:cTn id="24" dur="1" fill="hold">
+                                          <p:stCondLst>
+                                            <p:cond delay="0"/>
+                                          </p:stCondLst>
+                                        </p:cTn>
+                                        <p:tgtEl>
+                                          <p:spTgt spid="13">
+                                            <p:txEl>
+                                              <p:pRg st="6" end="6"/>
+                                            </p:txEl>
+                                          </p:spTgt>
+                                        </p:tgtEl>
+                                        <p:attrNameLst>
+                                          <p:attrName>style.visibility</p:attrName>
+                                        </p:attrNameLst>
+                                      </p:cBhvr>
+                                      <p:to>
+                                        <p:strVal val="visible"/>
+                                      </p:to>
+                                    </p:set>
+                                  </p:childTnLst>
+                                </p:cTn>
+                              </p:par>
+                            </p:childTnLst>
+                          </p:cTn>
+                        </p:par>
+                      </p:childTnLst>
+                    </p:cTn>
+                  </p:par>
+                  <p:par>
+                    <p:cTn id="25" fill="hold">
+                      <p:stCondLst>
+                        <p:cond delay="indefinite"/>
+                      </p:stCondLst>
+                      <p:childTnLst>
+                        <p:par>
+                          <p:cTn id="26" fill="hold">
+                            <p:stCondLst>
+                              <p:cond delay="0"/>
+                            </p:stCondLst>
+                            <p:childTnLst>
+                              <p:par>
+                                <p:cTn id="27" presetID="1" presetClass="entr" presetSubtype="0" fill="hold" grpId="0" nodeType="clickEffect">
+                                  <p:stCondLst>
+                                    <p:cond delay="0"/>
+                                  </p:stCondLst>
+                                  <p:childTnLst>
+                                    <p:set>
+                                      <p:cBhvr>
+                                        <p:cTn id="28" dur="1" fill="hold">
+                                          <p:stCondLst>
+                                            <p:cond delay="0"/>
+                                          </p:stCondLst>
+                                        </p:cTn>
+                                        <p:tgtEl>
+                                          <p:spTgt spid="14"/>
+                                        </p:tgtEl>
+                                        <p:attrNameLst>
+                                          <p:attrName>style.visibility</p:attrName>
+                                        </p:attrNameLst>
+                                      </p:cBhvr>
+                                      <p:to>
+                                        <p:strVal val="visible"/>
+                                      </p:to>
+                                    </p:set>
+                                  </p:childTnLst>
+                                </p:cTn>
+                              </p:par>
+                            </p:childTnLst>
+                          </p:cTn>
+                        </p:par>
+                      </p:childTnLst>
+                    </p:cTn>
+                  </p:par>
+                  <p:par>
+                    <p:cTn id="29" fill="hold">
+                      <p:stCondLst>
+                        <p:cond delay="indefinite"/>
+                      </p:stCondLst>
+                      <p:childTnLst>
+                        <p:par>
+                          <p:cTn id="30" fill="hold">
+                            <p:stCondLst>
+                              <p:cond delay="0"/>
+                            </p:stCondLst>
+                            <p:childTnLst>
+                              <p:par>
+                                <p:cTn id="31" presetID="1" presetClass="entr" presetSubtype="0" fill="hold" nodeType="clickEffect">
+                                  <p:stCondLst>
+                                    <p:cond delay="0"/>
+                                  </p:stCondLst>
+                                  <p:childTnLst>
+                                    <p:set>
+                                      <p:cBhvr>
+                                        <p:cTn id="32" dur="1" fill="hold">
+                                          <p:stCondLst>
+                                            <p:cond delay="0"/>
+                                          </p:stCondLst>
+                                        </p:cTn>
+                                        <p:tgtEl>
+                                          <p:spTgt spid="33"/>
+                                        </p:tgtEl>
+                                        <p:attrNameLst>
+                                          <p:attrName>style.visibility</p:attrName>
+                                        </p:attrNameLst>
+                                      </p:cBhvr>
+                                      <p:to>
+                                        <p:strVal val="visible"/>
+                                      </p:to>
+                                    </p:set>
+                                  </p:childTnLst>
+                                </p:cTn>
+                              </p:par>
+                            </p:childTnLst>
+                          </p:cTn>
+                        </p:par>
+                      </p:childTnLst>
+                    </p:cTn>
+                  </p:par>
+                  <p:par>
+                    <p:cTn id="33" fill="hold">
+                      <p:stCondLst>
+                        <p:cond delay="indefinite"/>
+                      </p:stCondLst>
+                      <p:childTnLst>
+                        <p:par>
+                          <p:cTn id="34" fill="hold">
+                            <p:stCondLst>
+                              <p:cond delay="0"/>
+                            </p:stCondLst>
+                            <p:childTnLst>
+                              <p:par>
+                                <p:cTn id="35" presetID="1" presetClass="entr" presetSubtype="0" fill="hold" grpId="0" nodeType="clickEffect">
+                                  <p:stCondLst>
+                                    <p:cond delay="0"/>
+                                  </p:stCondLst>
+                                  <p:childTnLst>
+                                    <p:set>
+                                      <p:cBhvr>
+                                        <p:cTn id="36" dur="1" fill="hold">
+                                          <p:stCondLst>
+                                            <p:cond delay="0"/>
+                                          </p:stCondLst>
+                                        </p:cTn>
+                                        <p:tgtEl>
+                                          <p:spTgt spid="34"/>
+                                        </p:tgtEl>
+                                        <p:attrNameLst>
+                                          <p:attrName>style.visibility</p:attrName>
+                                        </p:attrNameLst>
+                                      </p:cBhvr>
+                                      <p:to>
+                                        <p:strVal val="visible"/>
+                                      </p:to>
+                                    </p:set>
+                                  </p:childTnLst>
+                                </p:cTn>
+                              </p:par>
+                            </p:childTnLst>
+                          </p:cTn>
+                        </p:par>
+                      </p:childTnLst>
+                    </p:cTn>
+                  </p:par>
+                </p:childTnLst>
+              </p:cTn>
+              <p:prevCondLst>
+                <p:cond evt="onPrev" delay="0">
+                  <p:tgtEl>
+                    <p:sldTgt/>
+                  </p:tgtEl>
+                </p:cond>
+              </p:prevCondLst>
+              <p:nextCondLst>
+                <p:cond evt="onNext" delay="0">
+                  <p:tgtEl>
+                    <p:sldTgt/>
+                  </p:tgtEl>
+                </p:cond>
+              </p:nextCondLst>
+            </p:seq>
+          </p:childTnLst>
+        </p:cTn>
+      </p:par>
+    </p:tnLst>
+    <p:bldLst>
+      <p:bldP spid="13" grpId="0" build="p" bldLvl="2"/>
+      <p:bldP spid="14" grpId="0" animBg="1"/>
+      <p:bldP spid="34" grpId="0" animBg="1"/>
+    </p:bldLst>
+  </p:timing>
 </p:sld>
 </file>
 
@@ -3613,6 +6022,108 @@
       </p:sp>
       <p:sp>
         <p:nvSpPr>
+          <p:cNvPr id="3" name="Text Placeholder 2"/>
+          <p:cNvSpPr>
+            <a:spLocks noGrp="1"/>
+          </p:cNvSpPr>
+          <p:nvPr>
+            <p:ph type="body" idx="1"/>
+          </p:nvPr>
+        </p:nvSpPr>
+        <p:spPr/>
+        <p:txBody>
+          <a:bodyPr/>
+          <a:lstStyle/>
+          <a:p>
+            <a:endParaRPr lang="nl-BE"/>
+          </a:p>
+        </p:txBody>
+      </p:sp>
+      <p:sp>
+        <p:nvSpPr>
+          <p:cNvPr id="4" name="Slide Number Placeholder 3"/>
+          <p:cNvSpPr>
+            <a:spLocks noGrp="1"/>
+          </p:cNvSpPr>
+          <p:nvPr>
+            <p:ph type="sldNum" sz="quarter" idx="12"/>
+          </p:nvPr>
+        </p:nvSpPr>
+        <p:spPr/>
+        <p:txBody>
+          <a:bodyPr/>
+          <a:lstStyle/>
+          <a:p>
+            <a:fld id="{AFF690EF-DE1B-4F48-8935-D551336ADF29}" type="slidenum">
+              <a:rPr lang="nl-BE" smtClean="0"/>
+              <a:t>2</a:t>
+            </a:fld>
+            <a:endParaRPr lang="nl-BE"/>
+          </a:p>
+        </p:txBody>
+      </p:sp>
+    </p:spTree>
+    <p:extLst>
+      <p:ext uri="{BB962C8B-B14F-4D97-AF65-F5344CB8AC3E}">
+        <p14:creationId xmlns:p14="http://schemas.microsoft.com/office/powerpoint/2010/main" val="3202480326"/>
+      </p:ext>
+    </p:extLst>
+  </p:cSld>
+  <p:clrMapOvr>
+    <a:masterClrMapping/>
+  </p:clrMapOvr>
+  <p:timing>
+    <p:tnLst>
+      <p:par>
+        <p:cTn id="1" dur="indefinite" restart="never" nodeType="tmRoot"/>
+      </p:par>
+    </p:tnLst>
+  </p:timing>
+</p:sld>
+</file>
+
+<file path=ppt/slides/slide3.xml><?xml version="1.0" encoding="utf-8"?>
+<p:sld xmlns:a="http://schemas.openxmlformats.org/drawingml/2006/main" xmlns:r="http://schemas.openxmlformats.org/officeDocument/2006/relationships" xmlns:p="http://schemas.openxmlformats.org/presentationml/2006/main">
+  <p:cSld>
+    <p:spTree>
+      <p:nvGrpSpPr>
+        <p:cNvPr id="1" name=""/>
+        <p:cNvGrpSpPr/>
+        <p:nvPr/>
+      </p:nvGrpSpPr>
+      <p:grpSpPr>
+        <a:xfrm>
+          <a:off x="0" y="0"/>
+          <a:ext cx="0" cy="0"/>
+          <a:chOff x="0" y="0"/>
+          <a:chExt cx="0" cy="0"/>
+        </a:xfrm>
+      </p:grpSpPr>
+      <p:sp>
+        <p:nvSpPr>
+          <p:cNvPr id="2" name="Title 1"/>
+          <p:cNvSpPr>
+            <a:spLocks noGrp="1"/>
+          </p:cNvSpPr>
+          <p:nvPr>
+            <p:ph type="title"/>
+          </p:nvPr>
+        </p:nvSpPr>
+        <p:spPr/>
+        <p:txBody>
+          <a:bodyPr/>
+          <a:lstStyle/>
+          <a:p>
+            <a:r>
+              <a:rPr lang="en-US" dirty="0" smtClean="0"/>
+              <a:t>Introduction</a:t>
+            </a:r>
+            <a:endParaRPr lang="nl-BE" dirty="0"/>
+          </a:p>
+        </p:txBody>
+      </p:sp>
+      <p:sp>
+        <p:nvSpPr>
           <p:cNvPr id="3" name="Content Placeholder 2"/>
           <p:cNvSpPr>
             <a:spLocks noGrp="1"/>
@@ -3790,7 +6301,7 @@
           <a:p>
             <a:fld id="{AFF690EF-DE1B-4F48-8935-D551336ADF29}" type="slidenum">
               <a:rPr lang="nl-BE" smtClean="0"/>
-              <a:t>2</a:t>
+              <a:t>3</a:t>
             </a:fld>
             <a:endParaRPr lang="nl-BE"/>
           </a:p>
@@ -4241,7 +6752,7 @@
 </p:sld>
 </file>
 
-<file path=ppt/slides/slide3.xml><?xml version="1.0" encoding="utf-8"?>
+<file path=ppt/slides/slide4.xml><?xml version="1.0" encoding="utf-8"?>
 <p:sld xmlns:a="http://schemas.openxmlformats.org/drawingml/2006/main" xmlns:r="http://schemas.openxmlformats.org/officeDocument/2006/relationships" xmlns:p="http://schemas.openxmlformats.org/presentationml/2006/main">
   <p:cSld>
     <p:spTree>
@@ -4354,7 +6865,7 @@
           <a:p>
             <a:fld id="{AFF690EF-DE1B-4F48-8935-D551336ADF29}" type="slidenum">
               <a:rPr lang="nl-BE" smtClean="0"/>
-              <a:t>3</a:t>
+              <a:t>4</a:t>
             </a:fld>
             <a:endParaRPr lang="nl-BE"/>
           </a:p>
@@ -4591,7 +7102,7 @@
 </p:sld>
 </file>
 
-<file path=ppt/slides/slide4.xml><?xml version="1.0" encoding="utf-8"?>
+<file path=ppt/slides/slide5.xml><?xml version="1.0" encoding="utf-8"?>
 <p:sld xmlns:a="http://schemas.openxmlformats.org/drawingml/2006/main" xmlns:r="http://schemas.openxmlformats.org/officeDocument/2006/relationships" xmlns:p="http://schemas.openxmlformats.org/presentationml/2006/main">
   <p:cSld>
     <p:spTree>
@@ -4755,7 +7266,7 @@
           <a:p>
             <a:fld id="{AFF690EF-DE1B-4F48-8935-D551336ADF29}" type="slidenum">
               <a:rPr lang="nl-BE" smtClean="0"/>
-              <a:t>4</a:t>
+              <a:t>5</a:t>
             </a:fld>
             <a:endParaRPr lang="nl-BE"/>
           </a:p>
@@ -5063,7 +7574,7 @@
 </p:sld>
 </file>
 
-<file path=ppt/slides/slide5.xml><?xml version="1.0" encoding="utf-8"?>
+<file path=ppt/slides/slide6.xml><?xml version="1.0" encoding="utf-8"?>
 <p:sld xmlns:a="http://schemas.openxmlformats.org/drawingml/2006/main" xmlns:r="http://schemas.openxmlformats.org/officeDocument/2006/relationships" xmlns:p="http://schemas.openxmlformats.org/presentationml/2006/main">
   <p:cSld>
     <p:spTree>
@@ -5097,9 +7608,28 @@
           <a:p>
             <a:r>
               <a:rPr lang="en-US" dirty="0" smtClean="0"/>
-              <a:t>Startup</a:t>
+              <a:t>Profiling</a:t>
             </a:r>
             <a:endParaRPr lang="nl-BE" dirty="0"/>
+          </a:p>
+        </p:txBody>
+      </p:sp>
+      <p:sp>
+        <p:nvSpPr>
+          <p:cNvPr id="3" name="Text Placeholder 2"/>
+          <p:cNvSpPr>
+            <a:spLocks noGrp="1"/>
+          </p:cNvSpPr>
+          <p:nvPr>
+            <p:ph type="body" idx="1"/>
+          </p:nvPr>
+        </p:nvSpPr>
+        <p:spPr/>
+        <p:txBody>
+          <a:bodyPr/>
+          <a:lstStyle/>
+          <a:p>
+            <a:endParaRPr lang="nl-BE"/>
           </a:p>
         </p:txBody>
       </p:sp>
@@ -5120,7 +7650,681 @@
           <a:p>
             <a:fld id="{AFF690EF-DE1B-4F48-8935-D551336ADF29}" type="slidenum">
               <a:rPr lang="nl-BE" smtClean="0"/>
-              <a:t>5</a:t>
+              <a:t>6</a:t>
+            </a:fld>
+            <a:endParaRPr lang="nl-BE"/>
+          </a:p>
+        </p:txBody>
+      </p:sp>
+    </p:spTree>
+    <p:extLst>
+      <p:ext uri="{BB962C8B-B14F-4D97-AF65-F5344CB8AC3E}">
+        <p14:creationId xmlns:p14="http://schemas.microsoft.com/office/powerpoint/2010/main" val="1568827058"/>
+      </p:ext>
+    </p:extLst>
+  </p:cSld>
+  <p:clrMapOvr>
+    <a:masterClrMapping/>
+  </p:clrMapOvr>
+  <p:timing>
+    <p:tnLst>
+      <p:par>
+        <p:cTn id="1" dur="indefinite" restart="never" nodeType="tmRoot"/>
+      </p:par>
+    </p:tnLst>
+  </p:timing>
+</p:sld>
+</file>
+
+<file path=ppt/slides/slide7.xml><?xml version="1.0" encoding="utf-8"?>
+<p:sld xmlns:a="http://schemas.openxmlformats.org/drawingml/2006/main" xmlns:r="http://schemas.openxmlformats.org/officeDocument/2006/relationships" xmlns:p="http://schemas.openxmlformats.org/presentationml/2006/main">
+  <p:cSld>
+    <p:spTree>
+      <p:nvGrpSpPr>
+        <p:cNvPr id="1" name=""/>
+        <p:cNvGrpSpPr/>
+        <p:nvPr/>
+      </p:nvGrpSpPr>
+      <p:grpSpPr>
+        <a:xfrm>
+          <a:off x="0" y="0"/>
+          <a:ext cx="0" cy="0"/>
+          <a:chOff x="0" y="0"/>
+          <a:chExt cx="0" cy="0"/>
+        </a:xfrm>
+      </p:grpSpPr>
+      <p:sp>
+        <p:nvSpPr>
+          <p:cNvPr id="2" name="Title 1"/>
+          <p:cNvSpPr>
+            <a:spLocks noGrp="1"/>
+          </p:cNvSpPr>
+          <p:nvPr>
+            <p:ph type="title"/>
+          </p:nvPr>
+        </p:nvSpPr>
+        <p:spPr/>
+        <p:txBody>
+          <a:bodyPr/>
+          <a:lstStyle/>
+          <a:p>
+            <a:r>
+              <a:rPr lang="en-US" dirty="0" smtClean="0"/>
+              <a:t>Methodology</a:t>
+            </a:r>
+            <a:endParaRPr lang="nl-BE" dirty="0"/>
+          </a:p>
+        </p:txBody>
+      </p:sp>
+      <p:sp>
+        <p:nvSpPr>
+          <p:cNvPr id="3" name="Content Placeholder 2"/>
+          <p:cNvSpPr>
+            <a:spLocks noGrp="1"/>
+          </p:cNvSpPr>
+          <p:nvPr>
+            <p:ph idx="1"/>
+          </p:nvPr>
+        </p:nvSpPr>
+        <p:spPr/>
+        <p:txBody>
+          <a:bodyPr/>
+          <a:lstStyle/>
+          <a:p>
+            <a:r>
+              <a:rPr lang="en-US" dirty="0" smtClean="0"/>
+              <a:t>MAP uses </a:t>
+            </a:r>
+            <a:r>
+              <a:rPr lang="en-US" dirty="0" smtClean="0">
+                <a:hlinkClick r:id="rId2"/>
+              </a:rPr>
+              <a:t>sampling</a:t>
+            </a:r>
+            <a:r>
+              <a:rPr lang="en-US" dirty="0" smtClean="0"/>
+              <a:t> (call stack)</a:t>
+            </a:r>
+          </a:p>
+          <a:p>
+            <a:pPr lvl="1"/>
+            <a:r>
+              <a:rPr lang="en-US" dirty="0" smtClean="0"/>
+              <a:t>No instrumentation</a:t>
+            </a:r>
+          </a:p>
+          <a:p>
+            <a:pPr lvl="1"/>
+            <a:r>
+              <a:rPr lang="en-US" dirty="0" smtClean="0"/>
+              <a:t>Simply compile with </a:t>
+            </a:r>
+            <a:r>
+              <a:rPr lang="en-US" dirty="0" smtClean="0">
+                <a:latin typeface="Courier New" panose="02070309020205020404" pitchFamily="49" charset="0"/>
+                <a:cs typeface="Courier New" panose="02070309020205020404" pitchFamily="49" charset="0"/>
+              </a:rPr>
+              <a:t>-</a:t>
+            </a:r>
+            <a:r>
+              <a:rPr lang="en-US" dirty="0" smtClean="0"/>
+              <a:t>g for details</a:t>
+            </a:r>
+          </a:p>
+          <a:p>
+            <a:pPr lvl="1"/>
+            <a:r>
+              <a:rPr lang="en-US" dirty="0" smtClean="0"/>
+              <a:t>Overhead is minimal (</a:t>
+            </a:r>
+            <a:r>
+              <a:rPr lang="en-US" dirty="0" smtClean="0">
+                <a:sym typeface="Symbol" panose="05050102010706020507" pitchFamily="18" charset="2"/>
+              </a:rPr>
+              <a:t></a:t>
+            </a:r>
+            <a:r>
+              <a:rPr lang="en-US" dirty="0" smtClean="0"/>
+              <a:t>  5-10 % at most)</a:t>
+            </a:r>
+          </a:p>
+          <a:p>
+            <a:r>
+              <a:rPr lang="en-US" dirty="0" smtClean="0"/>
+              <a:t>Works with many MPI implementations</a:t>
+            </a:r>
+          </a:p>
+          <a:p>
+            <a:pPr lvl="1"/>
+            <a:r>
+              <a:rPr lang="en-US" dirty="0" smtClean="0"/>
+              <a:t>Intel MPI</a:t>
+            </a:r>
+          </a:p>
+          <a:p>
+            <a:pPr lvl="1"/>
+            <a:r>
+              <a:rPr lang="en-US" dirty="0" err="1" smtClean="0"/>
+              <a:t>OpenMPI</a:t>
+            </a:r>
+            <a:endParaRPr lang="en-US" dirty="0" smtClean="0"/>
+          </a:p>
+          <a:p>
+            <a:pPr lvl="1"/>
+            <a:r>
+              <a:rPr lang="en-US" dirty="0" smtClean="0"/>
+              <a:t>MVAPICH</a:t>
+            </a:r>
+          </a:p>
+          <a:p>
+            <a:pPr lvl="1"/>
+            <a:r>
+              <a:rPr lang="en-US" dirty="0" smtClean="0"/>
+              <a:t>…</a:t>
+            </a:r>
+            <a:endParaRPr lang="nl-BE" dirty="0"/>
+          </a:p>
+        </p:txBody>
+      </p:sp>
+      <p:sp>
+        <p:nvSpPr>
+          <p:cNvPr id="4" name="Slide Number Placeholder 3"/>
+          <p:cNvSpPr>
+            <a:spLocks noGrp="1"/>
+          </p:cNvSpPr>
+          <p:nvPr>
+            <p:ph type="sldNum" sz="quarter" idx="12"/>
+          </p:nvPr>
+        </p:nvSpPr>
+        <p:spPr/>
+        <p:txBody>
+          <a:bodyPr/>
+          <a:lstStyle/>
+          <a:p>
+            <a:fld id="{AFF690EF-DE1B-4F48-8935-D551336ADF29}" type="slidenum">
+              <a:rPr lang="nl-BE" smtClean="0"/>
+              <a:t>7</a:t>
+            </a:fld>
+            <a:endParaRPr lang="nl-BE"/>
+          </a:p>
+        </p:txBody>
+      </p:sp>
+    </p:spTree>
+    <p:extLst>
+      <p:ext uri="{BB962C8B-B14F-4D97-AF65-F5344CB8AC3E}">
+        <p14:creationId xmlns:p14="http://schemas.microsoft.com/office/powerpoint/2010/main" val="2754792096"/>
+      </p:ext>
+    </p:extLst>
+  </p:cSld>
+  <p:clrMapOvr>
+    <a:masterClrMapping/>
+  </p:clrMapOvr>
+  <p:timing>
+    <p:tnLst>
+      <p:par>
+        <p:cTn id="1" dur="indefinite" restart="never" nodeType="tmRoot">
+          <p:childTnLst>
+            <p:seq concurrent="1" nextAc="seek">
+              <p:cTn id="2" dur="indefinite" nodeType="mainSeq">
+                <p:childTnLst>
+                  <p:par>
+                    <p:cTn id="3" fill="hold">
+                      <p:stCondLst>
+                        <p:cond delay="indefinite"/>
+                        <p:cond evt="onBegin" delay="0">
+                          <p:tn val="2"/>
+                        </p:cond>
+                      </p:stCondLst>
+                      <p:childTnLst>
+                        <p:par>
+                          <p:cTn id="4" fill="hold">
+                            <p:stCondLst>
+                              <p:cond delay="0"/>
+                            </p:stCondLst>
+                            <p:childTnLst>
+                              <p:par>
+                                <p:cTn id="5" presetID="1" presetClass="entr" presetSubtype="0" fill="hold" grpId="0" nodeType="withEffect">
+                                  <p:stCondLst>
+                                    <p:cond delay="0"/>
+                                  </p:stCondLst>
+                                  <p:childTnLst>
+                                    <p:set>
+                                      <p:cBhvr>
+                                        <p:cTn id="6" dur="1" fill="hold">
+                                          <p:stCondLst>
+                                            <p:cond delay="0"/>
+                                          </p:stCondLst>
+                                        </p:cTn>
+                                        <p:tgtEl>
+                                          <p:spTgt spid="3">
+                                            <p:txEl>
+                                              <p:pRg st="0" end="0"/>
+                                            </p:txEl>
+                                          </p:spTgt>
+                                        </p:tgtEl>
+                                        <p:attrNameLst>
+                                          <p:attrName>style.visibility</p:attrName>
+                                        </p:attrNameLst>
+                                      </p:cBhvr>
+                                      <p:to>
+                                        <p:strVal val="visible"/>
+                                      </p:to>
+                                    </p:set>
+                                  </p:childTnLst>
+                                </p:cTn>
+                              </p:par>
+                            </p:childTnLst>
+                          </p:cTn>
+                        </p:par>
+                      </p:childTnLst>
+                    </p:cTn>
+                  </p:par>
+                  <p:par>
+                    <p:cTn id="7" fill="hold">
+                      <p:stCondLst>
+                        <p:cond delay="indefinite"/>
+                      </p:stCondLst>
+                      <p:childTnLst>
+                        <p:par>
+                          <p:cTn id="8" fill="hold">
+                            <p:stCondLst>
+                              <p:cond delay="0"/>
+                            </p:stCondLst>
+                            <p:childTnLst>
+                              <p:par>
+                                <p:cTn id="9" presetID="1" presetClass="entr" presetSubtype="0" fill="hold" grpId="0" nodeType="clickEffect">
+                                  <p:stCondLst>
+                                    <p:cond delay="0"/>
+                                  </p:stCondLst>
+                                  <p:childTnLst>
+                                    <p:set>
+                                      <p:cBhvr>
+                                        <p:cTn id="10" dur="1" fill="hold">
+                                          <p:stCondLst>
+                                            <p:cond delay="0"/>
+                                          </p:stCondLst>
+                                        </p:cTn>
+                                        <p:tgtEl>
+                                          <p:spTgt spid="3">
+                                            <p:txEl>
+                                              <p:pRg st="1" end="1"/>
+                                            </p:txEl>
+                                          </p:spTgt>
+                                        </p:tgtEl>
+                                        <p:attrNameLst>
+                                          <p:attrName>style.visibility</p:attrName>
+                                        </p:attrNameLst>
+                                      </p:cBhvr>
+                                      <p:to>
+                                        <p:strVal val="visible"/>
+                                      </p:to>
+                                    </p:set>
+                                  </p:childTnLst>
+                                </p:cTn>
+                              </p:par>
+                            </p:childTnLst>
+                          </p:cTn>
+                        </p:par>
+                      </p:childTnLst>
+                    </p:cTn>
+                  </p:par>
+                  <p:par>
+                    <p:cTn id="11" fill="hold">
+                      <p:stCondLst>
+                        <p:cond delay="indefinite"/>
+                      </p:stCondLst>
+                      <p:childTnLst>
+                        <p:par>
+                          <p:cTn id="12" fill="hold">
+                            <p:stCondLst>
+                              <p:cond delay="0"/>
+                            </p:stCondLst>
+                            <p:childTnLst>
+                              <p:par>
+                                <p:cTn id="13" presetID="1" presetClass="entr" presetSubtype="0" fill="hold" grpId="0" nodeType="clickEffect">
+                                  <p:stCondLst>
+                                    <p:cond delay="0"/>
+                                  </p:stCondLst>
+                                  <p:childTnLst>
+                                    <p:set>
+                                      <p:cBhvr>
+                                        <p:cTn id="14" dur="1" fill="hold">
+                                          <p:stCondLst>
+                                            <p:cond delay="0"/>
+                                          </p:stCondLst>
+                                        </p:cTn>
+                                        <p:tgtEl>
+                                          <p:spTgt spid="3">
+                                            <p:txEl>
+                                              <p:pRg st="2" end="2"/>
+                                            </p:txEl>
+                                          </p:spTgt>
+                                        </p:tgtEl>
+                                        <p:attrNameLst>
+                                          <p:attrName>style.visibility</p:attrName>
+                                        </p:attrNameLst>
+                                      </p:cBhvr>
+                                      <p:to>
+                                        <p:strVal val="visible"/>
+                                      </p:to>
+                                    </p:set>
+                                  </p:childTnLst>
+                                </p:cTn>
+                              </p:par>
+                            </p:childTnLst>
+                          </p:cTn>
+                        </p:par>
+                      </p:childTnLst>
+                    </p:cTn>
+                  </p:par>
+                  <p:par>
+                    <p:cTn id="15" fill="hold">
+                      <p:stCondLst>
+                        <p:cond delay="indefinite"/>
+                      </p:stCondLst>
+                      <p:childTnLst>
+                        <p:par>
+                          <p:cTn id="16" fill="hold">
+                            <p:stCondLst>
+                              <p:cond delay="0"/>
+                            </p:stCondLst>
+                            <p:childTnLst>
+                              <p:par>
+                                <p:cTn id="17" presetID="1" presetClass="entr" presetSubtype="0" fill="hold" grpId="0" nodeType="clickEffect">
+                                  <p:stCondLst>
+                                    <p:cond delay="0"/>
+                                  </p:stCondLst>
+                                  <p:childTnLst>
+                                    <p:set>
+                                      <p:cBhvr>
+                                        <p:cTn id="18" dur="1" fill="hold">
+                                          <p:stCondLst>
+                                            <p:cond delay="0"/>
+                                          </p:stCondLst>
+                                        </p:cTn>
+                                        <p:tgtEl>
+                                          <p:spTgt spid="3">
+                                            <p:txEl>
+                                              <p:pRg st="3" end="3"/>
+                                            </p:txEl>
+                                          </p:spTgt>
+                                        </p:tgtEl>
+                                        <p:attrNameLst>
+                                          <p:attrName>style.visibility</p:attrName>
+                                        </p:attrNameLst>
+                                      </p:cBhvr>
+                                      <p:to>
+                                        <p:strVal val="visible"/>
+                                      </p:to>
+                                    </p:set>
+                                  </p:childTnLst>
+                                </p:cTn>
+                              </p:par>
+                            </p:childTnLst>
+                          </p:cTn>
+                        </p:par>
+                      </p:childTnLst>
+                    </p:cTn>
+                  </p:par>
+                  <p:par>
+                    <p:cTn id="19" fill="hold">
+                      <p:stCondLst>
+                        <p:cond delay="indefinite"/>
+                      </p:stCondLst>
+                      <p:childTnLst>
+                        <p:par>
+                          <p:cTn id="20" fill="hold">
+                            <p:stCondLst>
+                              <p:cond delay="0"/>
+                            </p:stCondLst>
+                            <p:childTnLst>
+                              <p:par>
+                                <p:cTn id="21" presetID="1" presetClass="entr" presetSubtype="0" fill="hold" grpId="0" nodeType="clickEffect">
+                                  <p:stCondLst>
+                                    <p:cond delay="0"/>
+                                  </p:stCondLst>
+                                  <p:childTnLst>
+                                    <p:set>
+                                      <p:cBhvr>
+                                        <p:cTn id="22" dur="1" fill="hold">
+                                          <p:stCondLst>
+                                            <p:cond delay="0"/>
+                                          </p:stCondLst>
+                                        </p:cTn>
+                                        <p:tgtEl>
+                                          <p:spTgt spid="3">
+                                            <p:txEl>
+                                              <p:pRg st="4" end="4"/>
+                                            </p:txEl>
+                                          </p:spTgt>
+                                        </p:tgtEl>
+                                        <p:attrNameLst>
+                                          <p:attrName>style.visibility</p:attrName>
+                                        </p:attrNameLst>
+                                      </p:cBhvr>
+                                      <p:to>
+                                        <p:strVal val="visible"/>
+                                      </p:to>
+                                    </p:set>
+                                  </p:childTnLst>
+                                </p:cTn>
+                              </p:par>
+                              <p:par>
+                                <p:cTn id="23" presetID="1" presetClass="entr" presetSubtype="0" fill="hold" grpId="0" nodeType="withEffect">
+                                  <p:stCondLst>
+                                    <p:cond delay="0"/>
+                                  </p:stCondLst>
+                                  <p:childTnLst>
+                                    <p:set>
+                                      <p:cBhvr>
+                                        <p:cTn id="24" dur="1" fill="hold">
+                                          <p:stCondLst>
+                                            <p:cond delay="0"/>
+                                          </p:stCondLst>
+                                        </p:cTn>
+                                        <p:tgtEl>
+                                          <p:spTgt spid="3">
+                                            <p:txEl>
+                                              <p:pRg st="5" end="5"/>
+                                            </p:txEl>
+                                          </p:spTgt>
+                                        </p:tgtEl>
+                                        <p:attrNameLst>
+                                          <p:attrName>style.visibility</p:attrName>
+                                        </p:attrNameLst>
+                                      </p:cBhvr>
+                                      <p:to>
+                                        <p:strVal val="visible"/>
+                                      </p:to>
+                                    </p:set>
+                                  </p:childTnLst>
+                                </p:cTn>
+                              </p:par>
+                              <p:par>
+                                <p:cTn id="25" presetID="1" presetClass="entr" presetSubtype="0" fill="hold" grpId="0" nodeType="withEffect">
+                                  <p:stCondLst>
+                                    <p:cond delay="0"/>
+                                  </p:stCondLst>
+                                  <p:childTnLst>
+                                    <p:set>
+                                      <p:cBhvr>
+                                        <p:cTn id="26" dur="1" fill="hold">
+                                          <p:stCondLst>
+                                            <p:cond delay="0"/>
+                                          </p:stCondLst>
+                                        </p:cTn>
+                                        <p:tgtEl>
+                                          <p:spTgt spid="3">
+                                            <p:txEl>
+                                              <p:pRg st="6" end="6"/>
+                                            </p:txEl>
+                                          </p:spTgt>
+                                        </p:tgtEl>
+                                        <p:attrNameLst>
+                                          <p:attrName>style.visibility</p:attrName>
+                                        </p:attrNameLst>
+                                      </p:cBhvr>
+                                      <p:to>
+                                        <p:strVal val="visible"/>
+                                      </p:to>
+                                    </p:set>
+                                  </p:childTnLst>
+                                </p:cTn>
+                              </p:par>
+                              <p:par>
+                                <p:cTn id="27" presetID="1" presetClass="entr" presetSubtype="0" fill="hold" grpId="0" nodeType="withEffect">
+                                  <p:stCondLst>
+                                    <p:cond delay="0"/>
+                                  </p:stCondLst>
+                                  <p:childTnLst>
+                                    <p:set>
+                                      <p:cBhvr>
+                                        <p:cTn id="28" dur="1" fill="hold">
+                                          <p:stCondLst>
+                                            <p:cond delay="0"/>
+                                          </p:stCondLst>
+                                        </p:cTn>
+                                        <p:tgtEl>
+                                          <p:spTgt spid="3">
+                                            <p:txEl>
+                                              <p:pRg st="7" end="7"/>
+                                            </p:txEl>
+                                          </p:spTgt>
+                                        </p:tgtEl>
+                                        <p:attrNameLst>
+                                          <p:attrName>style.visibility</p:attrName>
+                                        </p:attrNameLst>
+                                      </p:cBhvr>
+                                      <p:to>
+                                        <p:strVal val="visible"/>
+                                      </p:to>
+                                    </p:set>
+                                  </p:childTnLst>
+                                </p:cTn>
+                              </p:par>
+                              <p:par>
+                                <p:cTn id="29" presetID="1" presetClass="entr" presetSubtype="0" fill="hold" grpId="0" nodeType="withEffect">
+                                  <p:stCondLst>
+                                    <p:cond delay="0"/>
+                                  </p:stCondLst>
+                                  <p:childTnLst>
+                                    <p:set>
+                                      <p:cBhvr>
+                                        <p:cTn id="30" dur="1" fill="hold">
+                                          <p:stCondLst>
+                                            <p:cond delay="0"/>
+                                          </p:stCondLst>
+                                        </p:cTn>
+                                        <p:tgtEl>
+                                          <p:spTgt spid="3">
+                                            <p:txEl>
+                                              <p:pRg st="8" end="8"/>
+                                            </p:txEl>
+                                          </p:spTgt>
+                                        </p:tgtEl>
+                                        <p:attrNameLst>
+                                          <p:attrName>style.visibility</p:attrName>
+                                        </p:attrNameLst>
+                                      </p:cBhvr>
+                                      <p:to>
+                                        <p:strVal val="visible"/>
+                                      </p:to>
+                                    </p:set>
+                                  </p:childTnLst>
+                                </p:cTn>
+                              </p:par>
+                            </p:childTnLst>
+                          </p:cTn>
+                        </p:par>
+                      </p:childTnLst>
+                    </p:cTn>
+                  </p:par>
+                </p:childTnLst>
+              </p:cTn>
+              <p:prevCondLst>
+                <p:cond evt="onPrev" delay="0">
+                  <p:tgtEl>
+                    <p:sldTgt/>
+                  </p:tgtEl>
+                </p:cond>
+              </p:prevCondLst>
+              <p:nextCondLst>
+                <p:cond evt="onNext" delay="0">
+                  <p:tgtEl>
+                    <p:sldTgt/>
+                  </p:tgtEl>
+                </p:cond>
+              </p:nextCondLst>
+            </p:seq>
+          </p:childTnLst>
+        </p:cTn>
+      </p:par>
+    </p:tnLst>
+    <p:bldLst>
+      <p:bldP spid="3" grpId="0" uiExpand="1" build="p" bldLvl="2"/>
+    </p:bldLst>
+  </p:timing>
+</p:sld>
+</file>
+
+<file path=ppt/slides/slide8.xml><?xml version="1.0" encoding="utf-8"?>
+<p:sld xmlns:a="http://schemas.openxmlformats.org/drawingml/2006/main" xmlns:r="http://schemas.openxmlformats.org/officeDocument/2006/relationships" xmlns:p="http://schemas.openxmlformats.org/presentationml/2006/main">
+  <p:cSld>
+    <p:spTree>
+      <p:nvGrpSpPr>
+        <p:cNvPr id="1" name=""/>
+        <p:cNvGrpSpPr/>
+        <p:nvPr/>
+      </p:nvGrpSpPr>
+      <p:grpSpPr>
+        <a:xfrm>
+          <a:off x="0" y="0"/>
+          <a:ext cx="0" cy="0"/>
+          <a:chOff x="0" y="0"/>
+          <a:chExt cx="0" cy="0"/>
+        </a:xfrm>
+      </p:grpSpPr>
+      <p:sp>
+        <p:nvSpPr>
+          <p:cNvPr id="2" name="Title 1"/>
+          <p:cNvSpPr>
+            <a:spLocks noGrp="1"/>
+          </p:cNvSpPr>
+          <p:nvPr>
+            <p:ph type="title"/>
+          </p:nvPr>
+        </p:nvSpPr>
+        <p:spPr/>
+        <p:txBody>
+          <a:bodyPr/>
+          <a:lstStyle/>
+          <a:p>
+            <a:r>
+              <a:rPr lang="en-US" dirty="0" smtClean="0"/>
+              <a:t>Startup</a:t>
+            </a:r>
+            <a:endParaRPr lang="nl-BE" dirty="0"/>
+          </a:p>
+        </p:txBody>
+      </p:sp>
+      <p:sp>
+        <p:nvSpPr>
+          <p:cNvPr id="4" name="Slide Number Placeholder 3"/>
+          <p:cNvSpPr>
+            <a:spLocks noGrp="1"/>
+          </p:cNvSpPr>
+          <p:nvPr>
+            <p:ph type="sldNum" sz="quarter" idx="12"/>
+          </p:nvPr>
+        </p:nvSpPr>
+        <p:spPr/>
+        <p:txBody>
+          <a:bodyPr/>
+          <a:lstStyle/>
+          <a:p>
+            <a:fld id="{AFF690EF-DE1B-4F48-8935-D551336ADF29}" type="slidenum">
+              <a:rPr lang="nl-BE" smtClean="0"/>
+              <a:t>8</a:t>
             </a:fld>
             <a:endParaRPr lang="nl-BE"/>
           </a:p>
@@ -5843,7 +9047,7 @@
 </p:sld>
 </file>
 
-<file path=ppt/slides/slide6.xml><?xml version="1.0" encoding="utf-8"?>
+<file path=ppt/slides/slide9.xml><?xml version="1.0" encoding="utf-8"?>
 <p:sld xmlns:a="http://schemas.openxmlformats.org/drawingml/2006/main" xmlns:r="http://schemas.openxmlformats.org/officeDocument/2006/relationships" xmlns:p="http://schemas.openxmlformats.org/presentationml/2006/main">
   <p:cSld>
     <p:spTree>
@@ -5875,6 +9079,10 @@
           <a:bodyPr/>
           <a:lstStyle/>
           <a:p>
+            <a:r>
+              <a:rPr lang="en-US" dirty="0" smtClean="0"/>
+              <a:t>Interactive profiling</a:t>
+            </a:r>
             <a:endParaRPr lang="nl-BE" dirty="0"/>
           </a:p>
         </p:txBody>
@@ -5891,10 +9099,50 @@
         </p:nvSpPr>
         <p:spPr/>
         <p:txBody>
-          <a:bodyPr/>
+          <a:bodyPr>
+            <a:normAutofit fontScale="92500" lnSpcReduction="10000"/>
+          </a:bodyPr>
           <a:lstStyle/>
           <a:p>
-            <a:endParaRPr lang="nl-BE"/>
+            <a:r>
+              <a:rPr lang="en-US" dirty="0" smtClean="0"/>
+              <a:t>Run configuration</a:t>
+            </a:r>
+          </a:p>
+          <a:p>
+            <a:endParaRPr lang="en-US" dirty="0"/>
+          </a:p>
+          <a:p>
+            <a:endParaRPr lang="en-US" dirty="0" smtClean="0"/>
+          </a:p>
+          <a:p>
+            <a:endParaRPr lang="en-US" dirty="0"/>
+          </a:p>
+          <a:p>
+            <a:endParaRPr lang="en-US" dirty="0" smtClean="0"/>
+          </a:p>
+          <a:p>
+            <a:endParaRPr lang="en-US" dirty="0"/>
+          </a:p>
+          <a:p>
+            <a:endParaRPr lang="en-US" dirty="0" smtClean="0"/>
+          </a:p>
+          <a:p>
+            <a:endParaRPr lang="en-US" dirty="0"/>
+          </a:p>
+          <a:p>
+            <a:r>
+              <a:rPr lang="en-US" dirty="0" smtClean="0"/>
+              <a:t>Remembers</a:t>
+            </a:r>
+            <a:br>
+              <a:rPr lang="en-US" dirty="0" smtClean="0"/>
+            </a:br>
+            <a:r>
+              <a:rPr lang="en-US" dirty="0" smtClean="0"/>
+              <a:t>between runs</a:t>
+            </a:r>
+            <a:endParaRPr lang="nl-BE" dirty="0"/>
           </a:p>
         </p:txBody>
       </p:sp>
@@ -5915,12 +9163,500 @@
           <a:p>
             <a:fld id="{AFF690EF-DE1B-4F48-8935-D551336ADF29}" type="slidenum">
               <a:rPr lang="nl-BE" smtClean="0"/>
-              <a:t>6</a:t>
+              <a:t>9</a:t>
             </a:fld>
             <a:endParaRPr lang="nl-BE"/>
           </a:p>
         </p:txBody>
       </p:sp>
+      <p:pic>
+        <p:nvPicPr>
+          <p:cNvPr id="5" name="Picture 4"/>
+          <p:cNvPicPr>
+            <a:picLocks noChangeAspect="1"/>
+          </p:cNvPicPr>
+          <p:nvPr/>
+        </p:nvPicPr>
+        <p:blipFill>
+          <a:blip r:embed="rId2">
+            <a:extLst>
+              <a:ext uri="{28A0092B-C50C-407E-A947-70E740481C1C}">
+                <a14:useLocalDpi xmlns:a14="http://schemas.microsoft.com/office/drawing/2010/main" val="0"/>
+              </a:ext>
+            </a:extLst>
+          </a:blip>
+          <a:stretch>
+            <a:fillRect/>
+          </a:stretch>
+        </p:blipFill>
+        <p:spPr>
+          <a:xfrm>
+            <a:off x="3968146" y="2288924"/>
+            <a:ext cx="4087663" cy="4249989"/>
+          </a:xfrm>
+          <a:prstGeom prst="rect">
+            <a:avLst/>
+          </a:prstGeom>
+        </p:spPr>
+      </p:pic>
+      <p:grpSp>
+        <p:nvGrpSpPr>
+          <p:cNvPr id="6" name="Group 5"/>
+          <p:cNvGrpSpPr/>
+          <p:nvPr/>
+        </p:nvGrpSpPr>
+        <p:grpSpPr>
+          <a:xfrm>
+            <a:off x="448572" y="2398144"/>
+            <a:ext cx="3579964" cy="535612"/>
+            <a:chOff x="448572" y="2398144"/>
+            <a:chExt cx="3579964" cy="535612"/>
+          </a:xfrm>
+        </p:grpSpPr>
+        <p:sp>
+          <p:nvSpPr>
+            <p:cNvPr id="8" name="TextBox 7"/>
+            <p:cNvSpPr txBox="1"/>
+            <p:nvPr/>
+          </p:nvSpPr>
+          <p:spPr>
+            <a:xfrm>
+              <a:off x="448572" y="2398144"/>
+              <a:ext cx="1969578" cy="369332"/>
+            </a:xfrm>
+            <a:prstGeom prst="rect">
+              <a:avLst/>
+            </a:prstGeom>
+            <a:noFill/>
+          </p:spPr>
+          <p:txBody>
+            <a:bodyPr wrap="none" rtlCol="0">
+              <a:spAutoFit/>
+            </a:bodyPr>
+            <a:lstStyle/>
+            <a:p>
+              <a:r>
+                <a:rPr lang="en-US" dirty="0" smtClean="0"/>
+                <a:t>Choose application</a:t>
+              </a:r>
+              <a:endParaRPr lang="nl-BE" dirty="0"/>
+            </a:p>
+          </p:txBody>
+        </p:sp>
+        <p:cxnSp>
+          <p:nvCxnSpPr>
+            <p:cNvPr id="9" name="Straight Arrow Connector 8"/>
+            <p:cNvCxnSpPr>
+              <a:stCxn id="8" idx="3"/>
+            </p:cNvCxnSpPr>
+            <p:nvPr/>
+          </p:nvCxnSpPr>
+          <p:spPr>
+            <a:xfrm>
+              <a:off x="2418150" y="2582810"/>
+              <a:ext cx="1610386" cy="350946"/>
+            </a:xfrm>
+            <a:prstGeom prst="straightConnector1">
+              <a:avLst/>
+            </a:prstGeom>
+            <a:ln>
+              <a:solidFill>
+                <a:srgbClr val="C00000"/>
+              </a:solidFill>
+              <a:tailEnd type="stealth" w="lg" len="lg"/>
+            </a:ln>
+          </p:spPr>
+          <p:style>
+            <a:lnRef idx="1">
+              <a:schemeClr val="accent1"/>
+            </a:lnRef>
+            <a:fillRef idx="0">
+              <a:schemeClr val="accent1"/>
+            </a:fillRef>
+            <a:effectRef idx="0">
+              <a:schemeClr val="accent1"/>
+            </a:effectRef>
+            <a:fontRef idx="minor">
+              <a:schemeClr val="tx1"/>
+            </a:fontRef>
+          </p:style>
+        </p:cxnSp>
+      </p:grpSp>
+      <p:grpSp>
+        <p:nvGrpSpPr>
+          <p:cNvPr id="12" name="Group 11"/>
+          <p:cNvGrpSpPr/>
+          <p:nvPr/>
+        </p:nvGrpSpPr>
+        <p:grpSpPr>
+          <a:xfrm>
+            <a:off x="448572" y="2850616"/>
+            <a:ext cx="3579964" cy="369332"/>
+            <a:chOff x="448572" y="2398144"/>
+            <a:chExt cx="3579964" cy="369332"/>
+          </a:xfrm>
+        </p:grpSpPr>
+        <p:sp>
+          <p:nvSpPr>
+            <p:cNvPr id="13" name="TextBox 12"/>
+            <p:cNvSpPr txBox="1"/>
+            <p:nvPr/>
+          </p:nvSpPr>
+          <p:spPr>
+            <a:xfrm>
+              <a:off x="448572" y="2398144"/>
+              <a:ext cx="2302553" cy="369332"/>
+            </a:xfrm>
+            <a:prstGeom prst="rect">
+              <a:avLst/>
+            </a:prstGeom>
+            <a:noFill/>
+          </p:spPr>
+          <p:txBody>
+            <a:bodyPr wrap="none" rtlCol="0">
+              <a:spAutoFit/>
+            </a:bodyPr>
+            <a:lstStyle/>
+            <a:p>
+              <a:r>
+                <a:rPr lang="en-US" dirty="0" smtClean="0"/>
+                <a:t>Application arguments</a:t>
+              </a:r>
+              <a:endParaRPr lang="nl-BE" dirty="0"/>
+            </a:p>
+          </p:txBody>
+        </p:sp>
+        <p:cxnSp>
+          <p:nvCxnSpPr>
+            <p:cNvPr id="14" name="Straight Arrow Connector 13"/>
+            <p:cNvCxnSpPr>
+              <a:stCxn id="13" idx="3"/>
+            </p:cNvCxnSpPr>
+            <p:nvPr/>
+          </p:nvCxnSpPr>
+          <p:spPr>
+            <a:xfrm>
+              <a:off x="2751125" y="2582810"/>
+              <a:ext cx="1277411" cy="166280"/>
+            </a:xfrm>
+            <a:prstGeom prst="straightConnector1">
+              <a:avLst/>
+            </a:prstGeom>
+            <a:ln>
+              <a:solidFill>
+                <a:srgbClr val="C00000"/>
+              </a:solidFill>
+              <a:tailEnd type="stealth" w="lg" len="lg"/>
+            </a:ln>
+          </p:spPr>
+          <p:style>
+            <a:lnRef idx="1">
+              <a:schemeClr val="accent1"/>
+            </a:lnRef>
+            <a:fillRef idx="0">
+              <a:schemeClr val="accent1"/>
+            </a:fillRef>
+            <a:effectRef idx="0">
+              <a:schemeClr val="accent1"/>
+            </a:effectRef>
+            <a:fontRef idx="minor">
+              <a:schemeClr val="tx1"/>
+            </a:fontRef>
+          </p:style>
+        </p:cxnSp>
+      </p:grpSp>
+      <p:grpSp>
+        <p:nvGrpSpPr>
+          <p:cNvPr id="16" name="Group 15"/>
+          <p:cNvGrpSpPr/>
+          <p:nvPr/>
+        </p:nvGrpSpPr>
+        <p:grpSpPr>
+          <a:xfrm>
+            <a:off x="448572" y="3360797"/>
+            <a:ext cx="3579964" cy="369332"/>
+            <a:chOff x="448572" y="2398144"/>
+            <a:chExt cx="3579964" cy="369332"/>
+          </a:xfrm>
+        </p:grpSpPr>
+        <p:sp>
+          <p:nvSpPr>
+            <p:cNvPr id="17" name="TextBox 16"/>
+            <p:cNvSpPr txBox="1"/>
+            <p:nvPr/>
+          </p:nvSpPr>
+          <p:spPr>
+            <a:xfrm>
+              <a:off x="448572" y="2398144"/>
+              <a:ext cx="1870064" cy="369332"/>
+            </a:xfrm>
+            <a:prstGeom prst="rect">
+              <a:avLst/>
+            </a:prstGeom>
+            <a:noFill/>
+          </p:spPr>
+          <p:txBody>
+            <a:bodyPr wrap="none" rtlCol="0">
+              <a:spAutoFit/>
+            </a:bodyPr>
+            <a:lstStyle/>
+            <a:p>
+              <a:r>
+                <a:rPr lang="en-US" dirty="0" smtClean="0"/>
+                <a:t>Working directory</a:t>
+              </a:r>
+              <a:endParaRPr lang="nl-BE" dirty="0"/>
+            </a:p>
+          </p:txBody>
+        </p:sp>
+        <p:cxnSp>
+          <p:nvCxnSpPr>
+            <p:cNvPr id="18" name="Straight Arrow Connector 17"/>
+            <p:cNvCxnSpPr>
+              <a:stCxn id="17" idx="3"/>
+            </p:cNvCxnSpPr>
+            <p:nvPr/>
+          </p:nvCxnSpPr>
+          <p:spPr>
+            <a:xfrm>
+              <a:off x="2318636" y="2582810"/>
+              <a:ext cx="1709900" cy="166280"/>
+            </a:xfrm>
+            <a:prstGeom prst="straightConnector1">
+              <a:avLst/>
+            </a:prstGeom>
+            <a:ln>
+              <a:solidFill>
+                <a:srgbClr val="C00000"/>
+              </a:solidFill>
+              <a:tailEnd type="stealth" w="lg" len="lg"/>
+            </a:ln>
+          </p:spPr>
+          <p:style>
+            <a:lnRef idx="1">
+              <a:schemeClr val="accent1"/>
+            </a:lnRef>
+            <a:fillRef idx="0">
+              <a:schemeClr val="accent1"/>
+            </a:fillRef>
+            <a:effectRef idx="0">
+              <a:schemeClr val="accent1"/>
+            </a:effectRef>
+            <a:fontRef idx="minor">
+              <a:schemeClr val="tx1"/>
+            </a:fontRef>
+          </p:style>
+        </p:cxnSp>
+      </p:grpSp>
+      <p:grpSp>
+        <p:nvGrpSpPr>
+          <p:cNvPr id="30" name="Group 29"/>
+          <p:cNvGrpSpPr/>
+          <p:nvPr/>
+        </p:nvGrpSpPr>
+        <p:grpSpPr>
+          <a:xfrm>
+            <a:off x="448572" y="4229252"/>
+            <a:ext cx="3579964" cy="989988"/>
+            <a:chOff x="448572" y="4229252"/>
+            <a:chExt cx="3579964" cy="989988"/>
+          </a:xfrm>
+        </p:grpSpPr>
+        <p:sp>
+          <p:nvSpPr>
+            <p:cNvPr id="20" name="TextBox 19"/>
+            <p:cNvSpPr txBox="1"/>
+            <p:nvPr/>
+          </p:nvSpPr>
+          <p:spPr>
+            <a:xfrm>
+              <a:off x="448572" y="4229252"/>
+              <a:ext cx="2482416" cy="369332"/>
+            </a:xfrm>
+            <a:prstGeom prst="rect">
+              <a:avLst/>
+            </a:prstGeom>
+            <a:noFill/>
+          </p:spPr>
+          <p:txBody>
+            <a:bodyPr wrap="none" rtlCol="0">
+              <a:spAutoFit/>
+            </a:bodyPr>
+            <a:lstStyle/>
+            <a:p>
+              <a:r>
+                <a:rPr lang="en-US" dirty="0" smtClean="0"/>
+                <a:t>Configure MPI/</a:t>
+              </a:r>
+              <a:r>
+                <a:rPr lang="en-US" dirty="0" err="1" smtClean="0"/>
+                <a:t>OpenMP</a:t>
+              </a:r>
+              <a:endParaRPr lang="nl-BE" dirty="0"/>
+            </a:p>
+          </p:txBody>
+        </p:sp>
+        <p:cxnSp>
+          <p:nvCxnSpPr>
+            <p:cNvPr id="21" name="Straight Arrow Connector 20"/>
+            <p:cNvCxnSpPr>
+              <a:stCxn id="20" idx="3"/>
+              <a:endCxn id="5" idx="1"/>
+            </p:cNvCxnSpPr>
+            <p:nvPr/>
+          </p:nvCxnSpPr>
+          <p:spPr>
+            <a:xfrm>
+              <a:off x="2930988" y="4413918"/>
+              <a:ext cx="1097548" cy="1"/>
+            </a:xfrm>
+            <a:prstGeom prst="straightConnector1">
+              <a:avLst/>
+            </a:prstGeom>
+            <a:ln>
+              <a:solidFill>
+                <a:srgbClr val="C00000"/>
+              </a:solidFill>
+              <a:tailEnd type="stealth" w="lg" len="lg"/>
+            </a:ln>
+          </p:spPr>
+          <p:style>
+            <a:lnRef idx="1">
+              <a:schemeClr val="accent1"/>
+            </a:lnRef>
+            <a:fillRef idx="0">
+              <a:schemeClr val="accent1"/>
+            </a:fillRef>
+            <a:effectRef idx="0">
+              <a:schemeClr val="accent1"/>
+            </a:effectRef>
+            <a:fontRef idx="minor">
+              <a:schemeClr val="tx1"/>
+            </a:fontRef>
+          </p:style>
+        </p:cxnSp>
+        <p:cxnSp>
+          <p:nvCxnSpPr>
+            <p:cNvPr id="23" name="Straight Arrow Connector 22"/>
+            <p:cNvCxnSpPr>
+              <a:stCxn id="20" idx="3"/>
+            </p:cNvCxnSpPr>
+            <p:nvPr/>
+          </p:nvCxnSpPr>
+          <p:spPr>
+            <a:xfrm>
+              <a:off x="2930988" y="4413918"/>
+              <a:ext cx="1097548" cy="805322"/>
+            </a:xfrm>
+            <a:prstGeom prst="straightConnector1">
+              <a:avLst/>
+            </a:prstGeom>
+            <a:ln>
+              <a:solidFill>
+                <a:srgbClr val="C00000"/>
+              </a:solidFill>
+              <a:tailEnd type="stealth" w="lg" len="lg"/>
+            </a:ln>
+          </p:spPr>
+          <p:style>
+            <a:lnRef idx="1">
+              <a:schemeClr val="accent1"/>
+            </a:lnRef>
+            <a:fillRef idx="0">
+              <a:schemeClr val="accent1"/>
+            </a:fillRef>
+            <a:effectRef idx="0">
+              <a:schemeClr val="accent1"/>
+            </a:effectRef>
+            <a:fontRef idx="minor">
+              <a:schemeClr val="tx1"/>
+            </a:fontRef>
+          </p:style>
+        </p:cxnSp>
+      </p:grpSp>
+      <p:grpSp>
+        <p:nvGrpSpPr>
+          <p:cNvPr id="26" name="Group 25"/>
+          <p:cNvGrpSpPr/>
+          <p:nvPr/>
+        </p:nvGrpSpPr>
+        <p:grpSpPr>
+          <a:xfrm>
+            <a:off x="448572" y="4812737"/>
+            <a:ext cx="6418054" cy="1498933"/>
+            <a:chOff x="448572" y="2041371"/>
+            <a:chExt cx="6309789" cy="1498933"/>
+          </a:xfrm>
+        </p:grpSpPr>
+        <p:sp>
+          <p:nvSpPr>
+            <p:cNvPr id="27" name="TextBox 26"/>
+            <p:cNvSpPr txBox="1"/>
+            <p:nvPr/>
+          </p:nvSpPr>
+          <p:spPr>
+            <a:xfrm>
+              <a:off x="448572" y="2041371"/>
+              <a:ext cx="1847217" cy="369332"/>
+            </a:xfrm>
+            <a:prstGeom prst="rect">
+              <a:avLst/>
+            </a:prstGeom>
+            <a:noFill/>
+          </p:spPr>
+          <p:txBody>
+            <a:bodyPr wrap="none" rtlCol="0">
+              <a:spAutoFit/>
+            </a:bodyPr>
+            <a:lstStyle/>
+            <a:p>
+              <a:r>
+                <a:rPr lang="en-US" dirty="0" smtClean="0"/>
+                <a:t>Start run/profiling</a:t>
+              </a:r>
+              <a:endParaRPr lang="nl-BE" dirty="0"/>
+            </a:p>
+          </p:txBody>
+        </p:sp>
+        <p:cxnSp>
+          <p:nvCxnSpPr>
+            <p:cNvPr id="28" name="Straight Arrow Connector 27"/>
+            <p:cNvCxnSpPr>
+              <a:stCxn id="27" idx="3"/>
+            </p:cNvCxnSpPr>
+            <p:nvPr/>
+          </p:nvCxnSpPr>
+          <p:spPr>
+            <a:xfrm>
+              <a:off x="2295789" y="2226037"/>
+              <a:ext cx="4462572" cy="1314267"/>
+            </a:xfrm>
+            <a:prstGeom prst="straightConnector1">
+              <a:avLst/>
+            </a:prstGeom>
+            <a:ln>
+              <a:solidFill>
+                <a:srgbClr val="C00000"/>
+              </a:solidFill>
+              <a:tailEnd type="stealth" w="lg" len="lg"/>
+            </a:ln>
+          </p:spPr>
+          <p:style>
+            <a:lnRef idx="1">
+              <a:schemeClr val="accent1"/>
+            </a:lnRef>
+            <a:fillRef idx="0">
+              <a:schemeClr val="accent1"/>
+            </a:fillRef>
+            <a:effectRef idx="0">
+              <a:schemeClr val="accent1"/>
+            </a:effectRef>
+            <a:fontRef idx="minor">
+              <a:schemeClr val="tx1"/>
+            </a:fontRef>
+          </p:style>
+        </p:cxnSp>
+      </p:grpSp>
     </p:spTree>
     <p:extLst>
       <p:ext uri="{BB962C8B-B14F-4D97-AF65-F5344CB8AC3E}">
@@ -5934,7 +9670,255 @@
   <p:timing>
     <p:tnLst>
       <p:par>
-        <p:cTn id="1" dur="indefinite" restart="never" nodeType="tmRoot"/>
+        <p:cTn id="1" dur="indefinite" restart="never" nodeType="tmRoot">
+          <p:childTnLst>
+            <p:seq concurrent="1" nextAc="seek">
+              <p:cTn id="2" dur="indefinite" nodeType="mainSeq">
+                <p:childTnLst>
+                  <p:par>
+                    <p:cTn id="3" fill="hold">
+                      <p:stCondLst>
+                        <p:cond delay="indefinite"/>
+                      </p:stCondLst>
+                      <p:childTnLst>
+                        <p:par>
+                          <p:cTn id="4" fill="hold">
+                            <p:stCondLst>
+                              <p:cond delay="0"/>
+                            </p:stCondLst>
+                            <p:childTnLst>
+                              <p:par>
+                                <p:cTn id="5" presetID="1" presetClass="entr" presetSubtype="0" fill="hold" nodeType="clickEffect">
+                                  <p:stCondLst>
+                                    <p:cond delay="0"/>
+                                  </p:stCondLst>
+                                  <p:childTnLst>
+                                    <p:set>
+                                      <p:cBhvr>
+                                        <p:cTn id="6" dur="1" fill="hold">
+                                          <p:stCondLst>
+                                            <p:cond delay="0"/>
+                                          </p:stCondLst>
+                                        </p:cTn>
+                                        <p:tgtEl>
+                                          <p:spTgt spid="6"/>
+                                        </p:tgtEl>
+                                        <p:attrNameLst>
+                                          <p:attrName>style.visibility</p:attrName>
+                                        </p:attrNameLst>
+                                      </p:cBhvr>
+                                      <p:to>
+                                        <p:strVal val="visible"/>
+                                      </p:to>
+                                    </p:set>
+                                  </p:childTnLst>
+                                </p:cTn>
+                              </p:par>
+                            </p:childTnLst>
+                          </p:cTn>
+                        </p:par>
+                      </p:childTnLst>
+                    </p:cTn>
+                  </p:par>
+                  <p:par>
+                    <p:cTn id="7" fill="hold">
+                      <p:stCondLst>
+                        <p:cond delay="indefinite"/>
+                      </p:stCondLst>
+                      <p:childTnLst>
+                        <p:par>
+                          <p:cTn id="8" fill="hold">
+                            <p:stCondLst>
+                              <p:cond delay="0"/>
+                            </p:stCondLst>
+                            <p:childTnLst>
+                              <p:par>
+                                <p:cTn id="9" presetID="1" presetClass="entr" presetSubtype="0" fill="hold" nodeType="clickEffect">
+                                  <p:stCondLst>
+                                    <p:cond delay="0"/>
+                                  </p:stCondLst>
+                                  <p:childTnLst>
+                                    <p:set>
+                                      <p:cBhvr>
+                                        <p:cTn id="10" dur="1" fill="hold">
+                                          <p:stCondLst>
+                                            <p:cond delay="0"/>
+                                          </p:stCondLst>
+                                        </p:cTn>
+                                        <p:tgtEl>
+                                          <p:spTgt spid="12"/>
+                                        </p:tgtEl>
+                                        <p:attrNameLst>
+                                          <p:attrName>style.visibility</p:attrName>
+                                        </p:attrNameLst>
+                                      </p:cBhvr>
+                                      <p:to>
+                                        <p:strVal val="visible"/>
+                                      </p:to>
+                                    </p:set>
+                                  </p:childTnLst>
+                                </p:cTn>
+                              </p:par>
+                            </p:childTnLst>
+                          </p:cTn>
+                        </p:par>
+                      </p:childTnLst>
+                    </p:cTn>
+                  </p:par>
+                  <p:par>
+                    <p:cTn id="11" fill="hold">
+                      <p:stCondLst>
+                        <p:cond delay="indefinite"/>
+                      </p:stCondLst>
+                      <p:childTnLst>
+                        <p:par>
+                          <p:cTn id="12" fill="hold">
+                            <p:stCondLst>
+                              <p:cond delay="0"/>
+                            </p:stCondLst>
+                            <p:childTnLst>
+                              <p:par>
+                                <p:cTn id="13" presetID="1" presetClass="entr" presetSubtype="0" fill="hold" nodeType="clickEffect">
+                                  <p:stCondLst>
+                                    <p:cond delay="0"/>
+                                  </p:stCondLst>
+                                  <p:childTnLst>
+                                    <p:set>
+                                      <p:cBhvr>
+                                        <p:cTn id="14" dur="1" fill="hold">
+                                          <p:stCondLst>
+                                            <p:cond delay="0"/>
+                                          </p:stCondLst>
+                                        </p:cTn>
+                                        <p:tgtEl>
+                                          <p:spTgt spid="16"/>
+                                        </p:tgtEl>
+                                        <p:attrNameLst>
+                                          <p:attrName>style.visibility</p:attrName>
+                                        </p:attrNameLst>
+                                      </p:cBhvr>
+                                      <p:to>
+                                        <p:strVal val="visible"/>
+                                      </p:to>
+                                    </p:set>
+                                  </p:childTnLst>
+                                </p:cTn>
+                              </p:par>
+                            </p:childTnLst>
+                          </p:cTn>
+                        </p:par>
+                      </p:childTnLst>
+                    </p:cTn>
+                  </p:par>
+                  <p:par>
+                    <p:cTn id="15" fill="hold">
+                      <p:stCondLst>
+                        <p:cond delay="indefinite"/>
+                      </p:stCondLst>
+                      <p:childTnLst>
+                        <p:par>
+                          <p:cTn id="16" fill="hold">
+                            <p:stCondLst>
+                              <p:cond delay="0"/>
+                            </p:stCondLst>
+                            <p:childTnLst>
+                              <p:par>
+                                <p:cTn id="17" presetID="1" presetClass="entr" presetSubtype="0" fill="hold" nodeType="clickEffect">
+                                  <p:stCondLst>
+                                    <p:cond delay="0"/>
+                                  </p:stCondLst>
+                                  <p:childTnLst>
+                                    <p:set>
+                                      <p:cBhvr>
+                                        <p:cTn id="18" dur="1" fill="hold">
+                                          <p:stCondLst>
+                                            <p:cond delay="0"/>
+                                          </p:stCondLst>
+                                        </p:cTn>
+                                        <p:tgtEl>
+                                          <p:spTgt spid="30"/>
+                                        </p:tgtEl>
+                                        <p:attrNameLst>
+                                          <p:attrName>style.visibility</p:attrName>
+                                        </p:attrNameLst>
+                                      </p:cBhvr>
+                                      <p:to>
+                                        <p:strVal val="visible"/>
+                                      </p:to>
+                                    </p:set>
+                                  </p:childTnLst>
+                                </p:cTn>
+                              </p:par>
+                            </p:childTnLst>
+                          </p:cTn>
+                        </p:par>
+                      </p:childTnLst>
+                    </p:cTn>
+                  </p:par>
+                  <p:par>
+                    <p:cTn id="19" fill="hold">
+                      <p:stCondLst>
+                        <p:cond delay="indefinite"/>
+                      </p:stCondLst>
+                      <p:childTnLst>
+                        <p:par>
+                          <p:cTn id="20" fill="hold">
+                            <p:stCondLst>
+                              <p:cond delay="0"/>
+                            </p:stCondLst>
+                            <p:childTnLst>
+                              <p:par>
+                                <p:cTn id="21" presetID="1" presetClass="entr" presetSubtype="0" fill="hold" nodeType="clickEffect">
+                                  <p:stCondLst>
+                                    <p:cond delay="0"/>
+                                  </p:stCondLst>
+                                  <p:childTnLst>
+                                    <p:set>
+                                      <p:cBhvr>
+                                        <p:cTn id="22" dur="1" fill="hold">
+                                          <p:stCondLst>
+                                            <p:cond delay="0"/>
+                                          </p:stCondLst>
+                                        </p:cTn>
+                                        <p:tgtEl>
+                                          <p:spTgt spid="26"/>
+                                        </p:tgtEl>
+                                        <p:attrNameLst>
+                                          <p:attrName>style.visibility</p:attrName>
+                                        </p:attrNameLst>
+                                      </p:cBhvr>
+                                      <p:to>
+                                        <p:strVal val="visible"/>
+                                      </p:to>
+                                    </p:set>
+                                  </p:childTnLst>
+                                </p:cTn>
+                              </p:par>
+                            </p:childTnLst>
+                          </p:cTn>
+                        </p:par>
+                      </p:childTnLst>
+                    </p:cTn>
+                  </p:par>
+                </p:childTnLst>
+              </p:cTn>
+              <p:prevCondLst>
+                <p:cond evt="onPrev" delay="0">
+                  <p:tgtEl>
+                    <p:sldTgt/>
+                  </p:tgtEl>
+                </p:cond>
+              </p:prevCondLst>
+              <p:nextCondLst>
+                <p:cond evt="onNext" delay="0">
+                  <p:tgtEl>
+                    <p:sldTgt/>
+                  </p:tgtEl>
+                </p:cond>
+              </p:nextCondLst>
+            </p:seq>
+          </p:childTnLst>
+        </p:cTn>
       </p:par>
     </p:tnLst>
   </p:timing>

</xml_diff>

<commit_message>
Added slide on call stack view
</commit_message>
<xml_diff>
--- a/Optimization/AllineaMAP/allinea_map.pptx
+++ b/Optimization/AllineaMAP/allinea_map.pptx
@@ -5,7 +5,7 @@
     <p:sldMasterId id="2147483660" r:id="rId1"/>
   </p:sldMasterIdLst>
   <p:notesMasterIdLst>
-    <p:notesMasterId r:id="rId14"/>
+    <p:notesMasterId r:id="rId18"/>
   </p:notesMasterIdLst>
   <p:sldIdLst>
     <p:sldId id="256" r:id="rId2"/>
@@ -20,6 +20,10 @@
     <p:sldId id="265" r:id="rId11"/>
     <p:sldId id="266" r:id="rId12"/>
     <p:sldId id="267" r:id="rId13"/>
+    <p:sldId id="268" r:id="rId14"/>
+    <p:sldId id="269" r:id="rId15"/>
+    <p:sldId id="270" r:id="rId16"/>
+    <p:sldId id="271" r:id="rId17"/>
   </p:sldIdLst>
   <p:sldSz cx="9144000" cy="6858000" type="screen4x3"/>
   <p:notesSz cx="6858000" cy="9144000"/>
@@ -5508,6 +5512,87 @@
           </a:p>
         </p:txBody>
       </p:sp>
+      <p:grpSp>
+        <p:nvGrpSpPr>
+          <p:cNvPr id="39" name="Group 38"/>
+          <p:cNvGrpSpPr/>
+          <p:nvPr/>
+        </p:nvGrpSpPr>
+        <p:grpSpPr>
+          <a:xfrm>
+            <a:off x="6205948" y="1117680"/>
+            <a:ext cx="2204514" cy="369332"/>
+            <a:chOff x="6205948" y="1117680"/>
+            <a:chExt cx="2204514" cy="369332"/>
+          </a:xfrm>
+        </p:grpSpPr>
+        <p:sp>
+          <p:nvSpPr>
+            <p:cNvPr id="35" name="TextBox 34"/>
+            <p:cNvSpPr txBox="1"/>
+            <p:nvPr/>
+          </p:nvSpPr>
+          <p:spPr>
+            <a:xfrm>
+              <a:off x="6583680" y="1117680"/>
+              <a:ext cx="1826782" cy="369332"/>
+            </a:xfrm>
+            <a:prstGeom prst="rect">
+              <a:avLst/>
+            </a:prstGeom>
+            <a:noFill/>
+          </p:spPr>
+          <p:txBody>
+            <a:bodyPr wrap="none" rtlCol="0">
+              <a:spAutoFit/>
+            </a:bodyPr>
+            <a:lstStyle/>
+            <a:p>
+              <a:r>
+                <a:rPr lang="en-US" dirty="0" smtClean="0"/>
+                <a:t>All view updated!</a:t>
+              </a:r>
+              <a:endParaRPr lang="nl-BE" dirty="0"/>
+            </a:p>
+          </p:txBody>
+        </p:sp>
+        <p:cxnSp>
+          <p:nvCxnSpPr>
+            <p:cNvPr id="36" name="Straight Arrow Connector 35"/>
+            <p:cNvCxnSpPr/>
+            <p:nvPr/>
+          </p:nvCxnSpPr>
+          <p:spPr>
+            <a:xfrm flipV="1">
+              <a:off x="6205948" y="1314607"/>
+              <a:ext cx="394067" cy="3690"/>
+            </a:xfrm>
+            <a:prstGeom prst="straightConnector1">
+              <a:avLst/>
+            </a:prstGeom>
+            <a:ln w="19050">
+              <a:solidFill>
+                <a:schemeClr val="tx1"/>
+              </a:solidFill>
+              <a:tailEnd type="stealth" w="lg" len="lg"/>
+            </a:ln>
+          </p:spPr>
+          <p:style>
+            <a:lnRef idx="1">
+              <a:schemeClr val="accent1"/>
+            </a:lnRef>
+            <a:fillRef idx="0">
+              <a:schemeClr val="accent1"/>
+            </a:fillRef>
+            <a:effectRef idx="0">
+              <a:schemeClr val="accent1"/>
+            </a:effectRef>
+            <a:fontRef idx="minor">
+              <a:schemeClr val="tx1"/>
+            </a:fontRef>
+          </p:style>
+        </p:cxnSp>
+      </p:grpSp>
     </p:spTree>
     <p:extLst>
       <p:ext uri="{BB962C8B-B14F-4D97-AF65-F5344CB8AC3E}">
@@ -5918,7 +6003,7 @@
                             </p:stCondLst>
                             <p:childTnLst>
                               <p:par>
-                                <p:cTn id="35" presetID="1" presetClass="entr" presetSubtype="0" fill="hold" grpId="0" nodeType="clickEffect">
+                                <p:cTn id="35" presetID="1" presetClass="entr" presetSubtype="0" fill="hold" nodeType="clickEffect">
                                   <p:stCondLst>
                                     <p:cond delay="0"/>
                                   </p:stCondLst>
@@ -5926,6 +6011,51 @@
                                     <p:set>
                                       <p:cBhvr>
                                         <p:cTn id="36" dur="1" fill="hold">
+                                          <p:stCondLst>
+                                            <p:cond delay="0"/>
+                                          </p:stCondLst>
+                                        </p:cTn>
+                                        <p:tgtEl>
+                                          <p:spTgt spid="39"/>
+                                        </p:tgtEl>
+                                        <p:attrNameLst>
+                                          <p:attrName>style.visibility</p:attrName>
+                                        </p:attrNameLst>
+                                      </p:cBhvr>
+                                      <p:to>
+                                        <p:strVal val="visible"/>
+                                      </p:to>
+                                    </p:set>
+                                  </p:childTnLst>
+                                </p:cTn>
+                              </p:par>
+                            </p:childTnLst>
+                          </p:cTn>
+                        </p:par>
+                      </p:childTnLst>
+                    </p:cTn>
+                  </p:par>
+                  <p:par>
+                    <p:cTn id="37" fill="hold">
+                      <p:stCondLst>
+                        <p:cond delay="indefinite"/>
+                      </p:stCondLst>
+                      <p:childTnLst>
+                        <p:par>
+                          <p:cTn id="38" fill="hold">
+                            <p:stCondLst>
+                              <p:cond delay="0"/>
+                            </p:stCondLst>
+                            <p:childTnLst>
+                              <p:par>
+                                <p:cTn id="39" presetID="1" presetClass="entr" presetSubtype="0" fill="hold" grpId="0" nodeType="clickEffect">
+                                  <p:stCondLst>
+                                    <p:cond delay="0"/>
+                                  </p:stCondLst>
+                                  <p:childTnLst>
+                                    <p:set>
+                                      <p:cBhvr>
+                                        <p:cTn id="40" dur="1" fill="hold">
                                           <p:stCondLst>
                                             <p:cond delay="0"/>
                                           </p:stCondLst>
@@ -5976,6 +6106,1374 @@
       <p:bldP spid="14" grpId="0" animBg="1"/>
       <p:bldP spid="34" grpId="0" animBg="1"/>
     </p:bldLst>
+  </p:timing>
+</p:sld>
+</file>
+
+<file path=ppt/slides/slide13.xml><?xml version="1.0" encoding="utf-8"?>
+<p:sld xmlns:a="http://schemas.openxmlformats.org/drawingml/2006/main" xmlns:r="http://schemas.openxmlformats.org/officeDocument/2006/relationships" xmlns:p="http://schemas.openxmlformats.org/presentationml/2006/main">
+  <p:cSld>
+    <p:spTree>
+      <p:nvGrpSpPr>
+        <p:cNvPr id="1" name=""/>
+        <p:cNvGrpSpPr/>
+        <p:nvPr/>
+      </p:nvGrpSpPr>
+      <p:grpSpPr>
+        <a:xfrm>
+          <a:off x="0" y="0"/>
+          <a:ext cx="0" cy="0"/>
+          <a:chOff x="0" y="0"/>
+          <a:chExt cx="0" cy="0"/>
+        </a:xfrm>
+      </p:grpSpPr>
+      <p:sp>
+        <p:nvSpPr>
+          <p:cNvPr id="2" name="Title 1"/>
+          <p:cNvSpPr>
+            <a:spLocks noGrp="1"/>
+          </p:cNvSpPr>
+          <p:nvPr>
+            <p:ph type="title"/>
+          </p:nvPr>
+        </p:nvSpPr>
+        <p:spPr/>
+        <p:txBody>
+          <a:bodyPr/>
+          <a:lstStyle/>
+          <a:p>
+            <a:r>
+              <a:rPr lang="en-US" dirty="0" smtClean="0"/>
+              <a:t>Source code view</a:t>
+            </a:r>
+            <a:endParaRPr lang="nl-BE" dirty="0"/>
+          </a:p>
+        </p:txBody>
+      </p:sp>
+      <p:sp>
+        <p:nvSpPr>
+          <p:cNvPr id="3" name="Content Placeholder 2"/>
+          <p:cNvSpPr>
+            <a:spLocks noGrp="1"/>
+          </p:cNvSpPr>
+          <p:nvPr>
+            <p:ph idx="1"/>
+          </p:nvPr>
+        </p:nvSpPr>
+        <p:spPr>
+          <a:xfrm>
+            <a:off x="628650" y="4979323"/>
+            <a:ext cx="7886700" cy="1197639"/>
+          </a:xfrm>
+        </p:spPr>
+        <p:txBody>
+          <a:bodyPr>
+            <a:normAutofit fontScale="92500" lnSpcReduction="10000"/>
+          </a:bodyPr>
+          <a:lstStyle/>
+          <a:p>
+            <a:r>
+              <a:rPr lang="en-US" dirty="0" smtClean="0"/>
+              <a:t>Easy to navigate through code</a:t>
+            </a:r>
+          </a:p>
+          <a:p>
+            <a:pPr lvl="1"/>
+            <a:r>
+              <a:rPr lang="en-US" dirty="0" smtClean="0"/>
+              <a:t>Go to function definitions in any file</a:t>
+            </a:r>
+          </a:p>
+          <a:p>
+            <a:r>
+              <a:rPr lang="en-US" dirty="0" smtClean="0"/>
+              <a:t>Requires compile with </a:t>
+            </a:r>
+            <a:r>
+              <a:rPr lang="en-US" dirty="0" smtClean="0">
+                <a:latin typeface="Courier New" panose="02070309020205020404" pitchFamily="49" charset="0"/>
+                <a:cs typeface="Courier New" panose="02070309020205020404" pitchFamily="49" charset="0"/>
+              </a:rPr>
+              <a:t>-g</a:t>
+            </a:r>
+            <a:endParaRPr lang="nl-BE" dirty="0">
+              <a:latin typeface="Courier New" panose="02070309020205020404" pitchFamily="49" charset="0"/>
+              <a:cs typeface="Courier New" panose="02070309020205020404" pitchFamily="49" charset="0"/>
+            </a:endParaRPr>
+          </a:p>
+        </p:txBody>
+      </p:sp>
+      <p:sp>
+        <p:nvSpPr>
+          <p:cNvPr id="4" name="Slide Number Placeholder 3"/>
+          <p:cNvSpPr>
+            <a:spLocks noGrp="1"/>
+          </p:cNvSpPr>
+          <p:nvPr>
+            <p:ph type="sldNum" sz="quarter" idx="12"/>
+          </p:nvPr>
+        </p:nvSpPr>
+        <p:spPr/>
+        <p:txBody>
+          <a:bodyPr/>
+          <a:lstStyle/>
+          <a:p>
+            <a:fld id="{AFF690EF-DE1B-4F48-8935-D551336ADF29}" type="slidenum">
+              <a:rPr lang="nl-BE" smtClean="0"/>
+              <a:t>13</a:t>
+            </a:fld>
+            <a:endParaRPr lang="nl-BE"/>
+          </a:p>
+        </p:txBody>
+      </p:sp>
+      <p:pic>
+        <p:nvPicPr>
+          <p:cNvPr id="5" name="Picture 4"/>
+          <p:cNvPicPr>
+            <a:picLocks noChangeAspect="1"/>
+          </p:cNvPicPr>
+          <p:nvPr/>
+        </p:nvPicPr>
+        <p:blipFill rotWithShape="1">
+          <a:blip r:embed="rId2"/>
+          <a:srcRect t="1557"/>
+          <a:stretch/>
+        </p:blipFill>
+        <p:spPr>
+          <a:xfrm>
+            <a:off x="2229957" y="1521229"/>
+            <a:ext cx="6546147" cy="3368399"/>
+          </a:xfrm>
+          <a:prstGeom prst="rect">
+            <a:avLst/>
+          </a:prstGeom>
+        </p:spPr>
+      </p:pic>
+      <p:grpSp>
+        <p:nvGrpSpPr>
+          <p:cNvPr id="6" name="Group 5"/>
+          <p:cNvGrpSpPr/>
+          <p:nvPr/>
+        </p:nvGrpSpPr>
+        <p:grpSpPr>
+          <a:xfrm>
+            <a:off x="91124" y="1899381"/>
+            <a:ext cx="2452571" cy="646331"/>
+            <a:chOff x="448572" y="2398144"/>
+            <a:chExt cx="2452571" cy="646331"/>
+          </a:xfrm>
+        </p:grpSpPr>
+        <p:sp>
+          <p:nvSpPr>
+            <p:cNvPr id="7" name="TextBox 6"/>
+            <p:cNvSpPr txBox="1"/>
+            <p:nvPr/>
+          </p:nvSpPr>
+          <p:spPr>
+            <a:xfrm>
+              <a:off x="448572" y="2398144"/>
+              <a:ext cx="1184940" cy="646331"/>
+            </a:xfrm>
+            <a:prstGeom prst="rect">
+              <a:avLst/>
+            </a:prstGeom>
+            <a:noFill/>
+          </p:spPr>
+          <p:txBody>
+            <a:bodyPr wrap="none" rtlCol="0">
+              <a:spAutoFit/>
+            </a:bodyPr>
+            <a:lstStyle/>
+            <a:p>
+              <a:r>
+                <a:rPr lang="en-US" dirty="0" smtClean="0"/>
+                <a:t>Line based</a:t>
+              </a:r>
+              <a:br>
+                <a:rPr lang="en-US" dirty="0" smtClean="0"/>
+              </a:br>
+              <a:r>
+                <a:rPr lang="en-US" dirty="0" smtClean="0"/>
+                <a:t>activity</a:t>
+              </a:r>
+              <a:endParaRPr lang="nl-BE" dirty="0"/>
+            </a:p>
+          </p:txBody>
+        </p:sp>
+        <p:cxnSp>
+          <p:nvCxnSpPr>
+            <p:cNvPr id="8" name="Straight Arrow Connector 7"/>
+            <p:cNvCxnSpPr>
+              <a:stCxn id="7" idx="3"/>
+            </p:cNvCxnSpPr>
+            <p:nvPr/>
+          </p:nvCxnSpPr>
+          <p:spPr>
+            <a:xfrm>
+              <a:off x="1633512" y="2721310"/>
+              <a:ext cx="1267631" cy="281965"/>
+            </a:xfrm>
+            <a:prstGeom prst="straightConnector1">
+              <a:avLst/>
+            </a:prstGeom>
+            <a:ln>
+              <a:solidFill>
+                <a:srgbClr val="C00000"/>
+              </a:solidFill>
+              <a:tailEnd type="stealth" w="lg" len="lg"/>
+            </a:ln>
+          </p:spPr>
+          <p:style>
+            <a:lnRef idx="1">
+              <a:schemeClr val="accent1"/>
+            </a:lnRef>
+            <a:fillRef idx="0">
+              <a:schemeClr val="accent1"/>
+            </a:fillRef>
+            <a:effectRef idx="0">
+              <a:schemeClr val="accent1"/>
+            </a:effectRef>
+            <a:fontRef idx="minor">
+              <a:schemeClr val="tx1"/>
+            </a:fontRef>
+          </p:style>
+        </p:cxnSp>
+      </p:grpSp>
+      <p:sp>
+        <p:nvSpPr>
+          <p:cNvPr id="12" name="TextBox 11"/>
+          <p:cNvSpPr txBox="1"/>
+          <p:nvPr/>
+        </p:nvSpPr>
+        <p:spPr>
+          <a:xfrm>
+            <a:off x="91124" y="2839187"/>
+            <a:ext cx="1924995" cy="923330"/>
+          </a:xfrm>
+          <a:prstGeom prst="rect">
+            <a:avLst/>
+          </a:prstGeom>
+          <a:noFill/>
+          <a:ln>
+            <a:noFill/>
+          </a:ln>
+        </p:spPr>
+        <p:txBody>
+          <a:bodyPr wrap="square" rtlCol="0">
+            <a:spAutoFit/>
+          </a:bodyPr>
+          <a:lstStyle/>
+          <a:p>
+            <a:r>
+              <a:rPr lang="en-US" dirty="0" smtClean="0"/>
+              <a:t>Color coded:</a:t>
+            </a:r>
+          </a:p>
+          <a:p>
+            <a:r>
+              <a:rPr lang="en-US" dirty="0" smtClean="0"/>
+              <a:t> </a:t>
+            </a:r>
+            <a:r>
+              <a:rPr lang="en-US" dirty="0" smtClean="0">
+                <a:sym typeface="Symbol" panose="05050102010706020507" pitchFamily="18" charset="2"/>
+              </a:rPr>
+              <a:t> </a:t>
+            </a:r>
+            <a:r>
+              <a:rPr lang="en-US" dirty="0" smtClean="0">
+                <a:solidFill>
+                  <a:srgbClr val="0070C0"/>
+                </a:solidFill>
+              </a:rPr>
+              <a:t>Communication</a:t>
+            </a:r>
+            <a:endParaRPr lang="nl-BE" dirty="0">
+              <a:solidFill>
+                <a:srgbClr val="0070C0"/>
+              </a:solidFill>
+            </a:endParaRPr>
+          </a:p>
+          <a:p>
+            <a:r>
+              <a:rPr lang="en-US" dirty="0"/>
+              <a:t> </a:t>
+            </a:r>
+            <a:r>
+              <a:rPr lang="en-US" dirty="0">
+                <a:sym typeface="Symbol" panose="05050102010706020507" pitchFamily="18" charset="2"/>
+              </a:rPr>
+              <a:t> </a:t>
+            </a:r>
+            <a:r>
+              <a:rPr lang="en-US" dirty="0" smtClean="0">
+                <a:solidFill>
+                  <a:srgbClr val="00B050"/>
+                </a:solidFill>
+              </a:rPr>
+              <a:t>Compute</a:t>
+            </a:r>
+          </a:p>
+        </p:txBody>
+      </p:sp>
+      <p:cxnSp>
+        <p:nvCxnSpPr>
+          <p:cNvPr id="13" name="Straight Arrow Connector 12"/>
+          <p:cNvCxnSpPr/>
+          <p:nvPr/>
+        </p:nvCxnSpPr>
+        <p:spPr>
+          <a:xfrm>
+            <a:off x="1352173" y="3588217"/>
+            <a:ext cx="1066831" cy="44445"/>
+          </a:xfrm>
+          <a:prstGeom prst="straightConnector1">
+            <a:avLst/>
+          </a:prstGeom>
+          <a:ln>
+            <a:solidFill>
+              <a:srgbClr val="00B050"/>
+            </a:solidFill>
+            <a:tailEnd type="stealth" w="lg" len="lg"/>
+          </a:ln>
+        </p:spPr>
+        <p:style>
+          <a:lnRef idx="1">
+            <a:schemeClr val="accent1"/>
+          </a:lnRef>
+          <a:fillRef idx="0">
+            <a:schemeClr val="accent1"/>
+          </a:fillRef>
+          <a:effectRef idx="0">
+            <a:schemeClr val="accent1"/>
+          </a:effectRef>
+          <a:fontRef idx="minor">
+            <a:schemeClr val="tx1"/>
+          </a:fontRef>
+        </p:style>
+      </p:cxnSp>
+      <p:cxnSp>
+        <p:nvCxnSpPr>
+          <p:cNvPr id="19" name="Straight Arrow Connector 18"/>
+          <p:cNvCxnSpPr/>
+          <p:nvPr/>
+        </p:nvCxnSpPr>
+        <p:spPr>
+          <a:xfrm flipV="1">
+            <a:off x="2020558" y="3155620"/>
+            <a:ext cx="398446" cy="145232"/>
+          </a:xfrm>
+          <a:prstGeom prst="straightConnector1">
+            <a:avLst/>
+          </a:prstGeom>
+          <a:ln>
+            <a:solidFill>
+              <a:srgbClr val="0070C0"/>
+            </a:solidFill>
+            <a:tailEnd type="stealth" w="lg" len="lg"/>
+          </a:ln>
+        </p:spPr>
+        <p:style>
+          <a:lnRef idx="1">
+            <a:schemeClr val="accent1"/>
+          </a:lnRef>
+          <a:fillRef idx="0">
+            <a:schemeClr val="accent1"/>
+          </a:fillRef>
+          <a:effectRef idx="0">
+            <a:schemeClr val="accent1"/>
+          </a:effectRef>
+          <a:fontRef idx="minor">
+            <a:schemeClr val="tx1"/>
+          </a:fontRef>
+        </p:style>
+      </p:cxnSp>
+      <p:grpSp>
+        <p:nvGrpSpPr>
+          <p:cNvPr id="21" name="Group 20"/>
+          <p:cNvGrpSpPr/>
+          <p:nvPr/>
+        </p:nvGrpSpPr>
+        <p:grpSpPr>
+          <a:xfrm>
+            <a:off x="4389120" y="620012"/>
+            <a:ext cx="3539488" cy="1070677"/>
+            <a:chOff x="-1100050" y="2398144"/>
+            <a:chExt cx="3539488" cy="1070677"/>
+          </a:xfrm>
+        </p:grpSpPr>
+        <p:sp>
+          <p:nvSpPr>
+            <p:cNvPr id="22" name="TextBox 21"/>
+            <p:cNvSpPr txBox="1"/>
+            <p:nvPr/>
+          </p:nvSpPr>
+          <p:spPr>
+            <a:xfrm>
+              <a:off x="448572" y="2398144"/>
+              <a:ext cx="1990866" cy="369332"/>
+            </a:xfrm>
+            <a:prstGeom prst="rect">
+              <a:avLst/>
+            </a:prstGeom>
+            <a:noFill/>
+          </p:spPr>
+          <p:txBody>
+            <a:bodyPr wrap="none" rtlCol="0">
+              <a:spAutoFit/>
+            </a:bodyPr>
+            <a:lstStyle/>
+            <a:p>
+              <a:r>
+                <a:rPr lang="en-US" dirty="0" smtClean="0"/>
+                <a:t>Code can be folded</a:t>
+              </a:r>
+              <a:endParaRPr lang="nl-BE" dirty="0"/>
+            </a:p>
+          </p:txBody>
+        </p:sp>
+        <p:cxnSp>
+          <p:nvCxnSpPr>
+            <p:cNvPr id="23" name="Straight Arrow Connector 22"/>
+            <p:cNvCxnSpPr>
+              <a:stCxn id="22" idx="1"/>
+            </p:cNvCxnSpPr>
+            <p:nvPr/>
+          </p:nvCxnSpPr>
+          <p:spPr>
+            <a:xfrm flipH="1">
+              <a:off x="-1100050" y="2582810"/>
+              <a:ext cx="1548622" cy="886011"/>
+            </a:xfrm>
+            <a:prstGeom prst="straightConnector1">
+              <a:avLst/>
+            </a:prstGeom>
+            <a:ln>
+              <a:solidFill>
+                <a:srgbClr val="C00000"/>
+              </a:solidFill>
+              <a:tailEnd type="stealth" w="lg" len="lg"/>
+            </a:ln>
+          </p:spPr>
+          <p:style>
+            <a:lnRef idx="1">
+              <a:schemeClr val="accent1"/>
+            </a:lnRef>
+            <a:fillRef idx="0">
+              <a:schemeClr val="accent1"/>
+            </a:fillRef>
+            <a:effectRef idx="0">
+              <a:schemeClr val="accent1"/>
+            </a:effectRef>
+            <a:fontRef idx="minor">
+              <a:schemeClr val="tx1"/>
+            </a:fontRef>
+          </p:style>
+        </p:cxnSp>
+      </p:grpSp>
+    </p:spTree>
+    <p:extLst>
+      <p:ext uri="{BB962C8B-B14F-4D97-AF65-F5344CB8AC3E}">
+        <p14:creationId xmlns:p14="http://schemas.microsoft.com/office/powerpoint/2010/main" val="247518033"/>
+      </p:ext>
+    </p:extLst>
+  </p:cSld>
+  <p:clrMapOvr>
+    <a:masterClrMapping/>
+  </p:clrMapOvr>
+  <p:timing>
+    <p:tnLst>
+      <p:par>
+        <p:cTn id="1" dur="indefinite" restart="never" nodeType="tmRoot">
+          <p:childTnLst>
+            <p:seq concurrent="1" nextAc="seek">
+              <p:cTn id="2" dur="indefinite" nodeType="mainSeq">
+                <p:childTnLst>
+                  <p:par>
+                    <p:cTn id="3" fill="hold">
+                      <p:stCondLst>
+                        <p:cond delay="indefinite"/>
+                      </p:stCondLst>
+                      <p:childTnLst>
+                        <p:par>
+                          <p:cTn id="4" fill="hold">
+                            <p:stCondLst>
+                              <p:cond delay="0"/>
+                            </p:stCondLst>
+                            <p:childTnLst>
+                              <p:par>
+                                <p:cTn id="5" presetID="1" presetClass="entr" presetSubtype="0" fill="hold" nodeType="clickEffect">
+                                  <p:stCondLst>
+                                    <p:cond delay="0"/>
+                                  </p:stCondLst>
+                                  <p:childTnLst>
+                                    <p:set>
+                                      <p:cBhvr>
+                                        <p:cTn id="6" dur="1" fill="hold">
+                                          <p:stCondLst>
+                                            <p:cond delay="0"/>
+                                          </p:stCondLst>
+                                        </p:cTn>
+                                        <p:tgtEl>
+                                          <p:spTgt spid="6"/>
+                                        </p:tgtEl>
+                                        <p:attrNameLst>
+                                          <p:attrName>style.visibility</p:attrName>
+                                        </p:attrNameLst>
+                                      </p:cBhvr>
+                                      <p:to>
+                                        <p:strVal val="visible"/>
+                                      </p:to>
+                                    </p:set>
+                                  </p:childTnLst>
+                                </p:cTn>
+                              </p:par>
+                            </p:childTnLst>
+                          </p:cTn>
+                        </p:par>
+                      </p:childTnLst>
+                    </p:cTn>
+                  </p:par>
+                  <p:par>
+                    <p:cTn id="7" fill="hold">
+                      <p:stCondLst>
+                        <p:cond delay="indefinite"/>
+                      </p:stCondLst>
+                      <p:childTnLst>
+                        <p:par>
+                          <p:cTn id="8" fill="hold">
+                            <p:stCondLst>
+                              <p:cond delay="0"/>
+                            </p:stCondLst>
+                            <p:childTnLst>
+                              <p:par>
+                                <p:cTn id="9" presetID="1" presetClass="entr" presetSubtype="0" fill="hold" nodeType="clickEffect">
+                                  <p:stCondLst>
+                                    <p:cond delay="0"/>
+                                  </p:stCondLst>
+                                  <p:childTnLst>
+                                    <p:set>
+                                      <p:cBhvr>
+                                        <p:cTn id="10" dur="1" fill="hold">
+                                          <p:stCondLst>
+                                            <p:cond delay="0"/>
+                                          </p:stCondLst>
+                                        </p:cTn>
+                                        <p:tgtEl>
+                                          <p:spTgt spid="21"/>
+                                        </p:tgtEl>
+                                        <p:attrNameLst>
+                                          <p:attrName>style.visibility</p:attrName>
+                                        </p:attrNameLst>
+                                      </p:cBhvr>
+                                      <p:to>
+                                        <p:strVal val="visible"/>
+                                      </p:to>
+                                    </p:set>
+                                  </p:childTnLst>
+                                </p:cTn>
+                              </p:par>
+                            </p:childTnLst>
+                          </p:cTn>
+                        </p:par>
+                      </p:childTnLst>
+                    </p:cTn>
+                  </p:par>
+                </p:childTnLst>
+              </p:cTn>
+              <p:prevCondLst>
+                <p:cond evt="onPrev" delay="0">
+                  <p:tgtEl>
+                    <p:sldTgt/>
+                  </p:tgtEl>
+                </p:cond>
+              </p:prevCondLst>
+              <p:nextCondLst>
+                <p:cond evt="onNext" delay="0">
+                  <p:tgtEl>
+                    <p:sldTgt/>
+                  </p:tgtEl>
+                </p:cond>
+              </p:nextCondLst>
+            </p:seq>
+          </p:childTnLst>
+        </p:cTn>
+      </p:par>
+    </p:tnLst>
+  </p:timing>
+</p:sld>
+</file>
+
+<file path=ppt/slides/slide14.xml><?xml version="1.0" encoding="utf-8"?>
+<p:sld xmlns:a="http://schemas.openxmlformats.org/drawingml/2006/main" xmlns:r="http://schemas.openxmlformats.org/officeDocument/2006/relationships" xmlns:p="http://schemas.openxmlformats.org/presentationml/2006/main">
+  <p:cSld>
+    <p:spTree>
+      <p:nvGrpSpPr>
+        <p:cNvPr id="1" name=""/>
+        <p:cNvGrpSpPr/>
+        <p:nvPr/>
+      </p:nvGrpSpPr>
+      <p:grpSpPr>
+        <a:xfrm>
+          <a:off x="0" y="0"/>
+          <a:ext cx="0" cy="0"/>
+          <a:chOff x="0" y="0"/>
+          <a:chExt cx="0" cy="0"/>
+        </a:xfrm>
+      </p:grpSpPr>
+      <p:sp>
+        <p:nvSpPr>
+          <p:cNvPr id="2" name="Title 1"/>
+          <p:cNvSpPr>
+            <a:spLocks noGrp="1"/>
+          </p:cNvSpPr>
+          <p:nvPr>
+            <p:ph type="title"/>
+          </p:nvPr>
+        </p:nvSpPr>
+        <p:spPr/>
+        <p:txBody>
+          <a:bodyPr/>
+          <a:lstStyle/>
+          <a:p>
+            <a:r>
+              <a:rPr lang="en-US" dirty="0" smtClean="0"/>
+              <a:t>Call stack view</a:t>
+            </a:r>
+            <a:endParaRPr lang="nl-BE" dirty="0"/>
+          </a:p>
+        </p:txBody>
+      </p:sp>
+      <p:sp>
+        <p:nvSpPr>
+          <p:cNvPr id="4" name="Slide Number Placeholder 3"/>
+          <p:cNvSpPr>
+            <a:spLocks noGrp="1"/>
+          </p:cNvSpPr>
+          <p:nvPr>
+            <p:ph type="sldNum" sz="quarter" idx="12"/>
+          </p:nvPr>
+        </p:nvSpPr>
+        <p:spPr/>
+        <p:txBody>
+          <a:bodyPr/>
+          <a:lstStyle/>
+          <a:p>
+            <a:fld id="{AFF690EF-DE1B-4F48-8935-D551336ADF29}" type="slidenum">
+              <a:rPr lang="nl-BE" smtClean="0"/>
+              <a:t>14</a:t>
+            </a:fld>
+            <a:endParaRPr lang="nl-BE"/>
+          </a:p>
+        </p:txBody>
+      </p:sp>
+      <p:sp>
+        <p:nvSpPr>
+          <p:cNvPr id="9" name="Content Placeholder 8"/>
+          <p:cNvSpPr>
+            <a:spLocks noGrp="1"/>
+          </p:cNvSpPr>
+          <p:nvPr>
+            <p:ph idx="1"/>
+          </p:nvPr>
+        </p:nvSpPr>
+        <p:spPr>
+          <a:xfrm>
+            <a:off x="628650" y="4156363"/>
+            <a:ext cx="7886700" cy="2020599"/>
+          </a:xfrm>
+        </p:spPr>
+        <p:txBody>
+          <a:bodyPr/>
+          <a:lstStyle/>
+          <a:p>
+            <a:r>
+              <a:rPr lang="en-US" dirty="0" smtClean="0"/>
+              <a:t>Ordered by % runtime</a:t>
+            </a:r>
+          </a:p>
+          <a:p>
+            <a:r>
+              <a:rPr lang="en-US" dirty="0" smtClean="0"/>
+              <a:t>Navigate to source code</a:t>
+            </a:r>
+            <a:endParaRPr lang="nl-BE" dirty="0"/>
+          </a:p>
+        </p:txBody>
+      </p:sp>
+      <p:pic>
+        <p:nvPicPr>
+          <p:cNvPr id="10" name="Content Placeholder 4"/>
+          <p:cNvPicPr>
+            <a:picLocks noChangeAspect="1"/>
+          </p:cNvPicPr>
+          <p:nvPr/>
+        </p:nvPicPr>
+        <p:blipFill>
+          <a:blip r:embed="rId2"/>
+          <a:stretch>
+            <a:fillRect/>
+          </a:stretch>
+        </p:blipFill>
+        <p:spPr>
+          <a:xfrm>
+            <a:off x="628650" y="1870078"/>
+            <a:ext cx="6424217" cy="1790855"/>
+          </a:xfrm>
+          <a:prstGeom prst="rect">
+            <a:avLst/>
+          </a:prstGeom>
+        </p:spPr>
+      </p:pic>
+      <p:grpSp>
+        <p:nvGrpSpPr>
+          <p:cNvPr id="11" name="Group 10"/>
+          <p:cNvGrpSpPr/>
+          <p:nvPr/>
+        </p:nvGrpSpPr>
+        <p:grpSpPr>
+          <a:xfrm>
+            <a:off x="5320145" y="1189982"/>
+            <a:ext cx="2685066" cy="1769349"/>
+            <a:chOff x="-484909" y="1690508"/>
+            <a:chExt cx="2685066" cy="1769349"/>
+          </a:xfrm>
+        </p:grpSpPr>
+        <p:sp>
+          <p:nvSpPr>
+            <p:cNvPr id="12" name="TextBox 11"/>
+            <p:cNvSpPr txBox="1"/>
+            <p:nvPr/>
+          </p:nvSpPr>
+          <p:spPr>
+            <a:xfrm>
+              <a:off x="295468" y="1690508"/>
+              <a:ext cx="1904689" cy="369332"/>
+            </a:xfrm>
+            <a:prstGeom prst="rect">
+              <a:avLst/>
+            </a:prstGeom>
+            <a:noFill/>
+          </p:spPr>
+          <p:txBody>
+            <a:bodyPr wrap="none" rtlCol="0">
+              <a:spAutoFit/>
+            </a:bodyPr>
+            <a:lstStyle/>
+            <a:p>
+              <a:r>
+                <a:rPr lang="en-US" dirty="0" smtClean="0"/>
+                <a:t>Click to go to code</a:t>
+              </a:r>
+              <a:endParaRPr lang="nl-BE" dirty="0"/>
+            </a:p>
+          </p:txBody>
+        </p:sp>
+        <p:cxnSp>
+          <p:nvCxnSpPr>
+            <p:cNvPr id="13" name="Straight Arrow Connector 12"/>
+            <p:cNvCxnSpPr>
+              <a:stCxn id="12" idx="1"/>
+            </p:cNvCxnSpPr>
+            <p:nvPr/>
+          </p:nvCxnSpPr>
+          <p:spPr>
+            <a:xfrm flipH="1">
+              <a:off x="-484909" y="1875174"/>
+              <a:ext cx="780377" cy="1584683"/>
+            </a:xfrm>
+            <a:prstGeom prst="straightConnector1">
+              <a:avLst/>
+            </a:prstGeom>
+            <a:ln>
+              <a:solidFill>
+                <a:srgbClr val="C00000"/>
+              </a:solidFill>
+              <a:tailEnd type="stealth" w="lg" len="lg"/>
+            </a:ln>
+          </p:spPr>
+          <p:style>
+            <a:lnRef idx="1">
+              <a:schemeClr val="accent1"/>
+            </a:lnRef>
+            <a:fillRef idx="0">
+              <a:schemeClr val="accent1"/>
+            </a:fillRef>
+            <a:effectRef idx="0">
+              <a:schemeClr val="accent1"/>
+            </a:effectRef>
+            <a:fontRef idx="minor">
+              <a:schemeClr val="tx1"/>
+            </a:fontRef>
+          </p:style>
+        </p:cxnSp>
+      </p:grpSp>
+    </p:spTree>
+    <p:extLst>
+      <p:ext uri="{BB962C8B-B14F-4D97-AF65-F5344CB8AC3E}">
+        <p14:creationId xmlns:p14="http://schemas.microsoft.com/office/powerpoint/2010/main" val="4180678924"/>
+      </p:ext>
+    </p:extLst>
+  </p:cSld>
+  <p:clrMapOvr>
+    <a:masterClrMapping/>
+  </p:clrMapOvr>
+  <p:timing>
+    <p:tnLst>
+      <p:par>
+        <p:cTn id="1" dur="indefinite" restart="never" nodeType="tmRoot">
+          <p:childTnLst>
+            <p:seq concurrent="1" nextAc="seek">
+              <p:cTn id="2" dur="indefinite" nodeType="mainSeq">
+                <p:childTnLst>
+                  <p:par>
+                    <p:cTn id="3" fill="hold">
+                      <p:stCondLst>
+                        <p:cond delay="indefinite"/>
+                      </p:stCondLst>
+                      <p:childTnLst>
+                        <p:par>
+                          <p:cTn id="4" fill="hold">
+                            <p:stCondLst>
+                              <p:cond delay="0"/>
+                            </p:stCondLst>
+                            <p:childTnLst>
+                              <p:par>
+                                <p:cTn id="5" presetID="1" presetClass="entr" presetSubtype="0" fill="hold" nodeType="clickEffect">
+                                  <p:stCondLst>
+                                    <p:cond delay="0"/>
+                                  </p:stCondLst>
+                                  <p:childTnLst>
+                                    <p:set>
+                                      <p:cBhvr>
+                                        <p:cTn id="6" dur="1" fill="hold">
+                                          <p:stCondLst>
+                                            <p:cond delay="0"/>
+                                          </p:stCondLst>
+                                        </p:cTn>
+                                        <p:tgtEl>
+                                          <p:spTgt spid="11"/>
+                                        </p:tgtEl>
+                                        <p:attrNameLst>
+                                          <p:attrName>style.visibility</p:attrName>
+                                        </p:attrNameLst>
+                                      </p:cBhvr>
+                                      <p:to>
+                                        <p:strVal val="visible"/>
+                                      </p:to>
+                                    </p:set>
+                                  </p:childTnLst>
+                                </p:cTn>
+                              </p:par>
+                            </p:childTnLst>
+                          </p:cTn>
+                        </p:par>
+                      </p:childTnLst>
+                    </p:cTn>
+                  </p:par>
+                </p:childTnLst>
+              </p:cTn>
+              <p:prevCondLst>
+                <p:cond evt="onPrev" delay="0">
+                  <p:tgtEl>
+                    <p:sldTgt/>
+                  </p:tgtEl>
+                </p:cond>
+              </p:prevCondLst>
+              <p:nextCondLst>
+                <p:cond evt="onNext" delay="0">
+                  <p:tgtEl>
+                    <p:sldTgt/>
+                  </p:tgtEl>
+                </p:cond>
+              </p:nextCondLst>
+            </p:seq>
+          </p:childTnLst>
+        </p:cTn>
+      </p:par>
+    </p:tnLst>
+  </p:timing>
+</p:sld>
+</file>
+
+<file path=ppt/slides/slide15.xml><?xml version="1.0" encoding="utf-8"?>
+<p:sld xmlns:a="http://schemas.openxmlformats.org/drawingml/2006/main" xmlns:r="http://schemas.openxmlformats.org/officeDocument/2006/relationships" xmlns:p="http://schemas.openxmlformats.org/presentationml/2006/main">
+  <p:cSld>
+    <p:spTree>
+      <p:nvGrpSpPr>
+        <p:cNvPr id="1" name=""/>
+        <p:cNvGrpSpPr/>
+        <p:nvPr/>
+      </p:nvGrpSpPr>
+      <p:grpSpPr>
+        <a:xfrm>
+          <a:off x="0" y="0"/>
+          <a:ext cx="0" cy="0"/>
+          <a:chOff x="0" y="0"/>
+          <a:chExt cx="0" cy="0"/>
+        </a:xfrm>
+      </p:grpSpPr>
+      <p:sp>
+        <p:nvSpPr>
+          <p:cNvPr id="2" name="Title 1"/>
+          <p:cNvSpPr>
+            <a:spLocks noGrp="1"/>
+          </p:cNvSpPr>
+          <p:nvPr>
+            <p:ph type="title"/>
+          </p:nvPr>
+        </p:nvSpPr>
+        <p:spPr/>
+        <p:txBody>
+          <a:bodyPr/>
+          <a:lstStyle/>
+          <a:p>
+            <a:r>
+              <a:rPr lang="en-US" dirty="0" smtClean="0"/>
+              <a:t>Round tripping</a:t>
+            </a:r>
+            <a:endParaRPr lang="nl-BE" dirty="0"/>
+          </a:p>
+        </p:txBody>
+      </p:sp>
+      <p:sp>
+        <p:nvSpPr>
+          <p:cNvPr id="3" name="Content Placeholder 2"/>
+          <p:cNvSpPr>
+            <a:spLocks noGrp="1"/>
+          </p:cNvSpPr>
+          <p:nvPr>
+            <p:ph idx="1"/>
+          </p:nvPr>
+        </p:nvSpPr>
+        <p:spPr/>
+        <p:txBody>
+          <a:bodyPr/>
+          <a:lstStyle/>
+          <a:p>
+            <a:r>
+              <a:rPr lang="en-US" dirty="0" smtClean="0"/>
+              <a:t>From within </a:t>
+            </a:r>
+            <a:r>
+              <a:rPr lang="en-US" dirty="0" err="1" smtClean="0"/>
+              <a:t>Allinea</a:t>
+            </a:r>
+            <a:r>
+              <a:rPr lang="en-US" dirty="0" smtClean="0"/>
+              <a:t> MAP</a:t>
+            </a:r>
+          </a:p>
+          <a:p>
+            <a:pPr lvl="1"/>
+            <a:r>
+              <a:rPr lang="en-US" dirty="0" smtClean="0"/>
+              <a:t>Edit code</a:t>
+            </a:r>
+          </a:p>
+          <a:p>
+            <a:pPr lvl="1"/>
+            <a:r>
+              <a:rPr lang="en-US" dirty="0" smtClean="0"/>
+              <a:t>Rebuild</a:t>
+            </a:r>
+          </a:p>
+          <a:p>
+            <a:pPr lvl="1"/>
+            <a:r>
+              <a:rPr lang="en-US" dirty="0" smtClean="0"/>
+              <a:t>Profile</a:t>
+            </a:r>
+          </a:p>
+          <a:p>
+            <a:pPr lvl="1"/>
+            <a:r>
+              <a:rPr lang="en-US" dirty="0" smtClean="0"/>
+              <a:t>Commit in version control system</a:t>
+            </a:r>
+          </a:p>
+          <a:p>
+            <a:r>
+              <a:rPr lang="en-US" dirty="0" smtClean="0"/>
+              <a:t>Switch between MAP and DDT</a:t>
+            </a:r>
+            <a:endParaRPr lang="nl-BE" dirty="0"/>
+          </a:p>
+        </p:txBody>
+      </p:sp>
+      <p:sp>
+        <p:nvSpPr>
+          <p:cNvPr id="4" name="Slide Number Placeholder 3"/>
+          <p:cNvSpPr>
+            <a:spLocks noGrp="1"/>
+          </p:cNvSpPr>
+          <p:nvPr>
+            <p:ph type="sldNum" sz="quarter" idx="12"/>
+          </p:nvPr>
+        </p:nvSpPr>
+        <p:spPr/>
+        <p:txBody>
+          <a:bodyPr/>
+          <a:lstStyle/>
+          <a:p>
+            <a:fld id="{AFF690EF-DE1B-4F48-8935-D551336ADF29}" type="slidenum">
+              <a:rPr lang="nl-BE" smtClean="0"/>
+              <a:t>15</a:t>
+            </a:fld>
+            <a:endParaRPr lang="nl-BE"/>
+          </a:p>
+        </p:txBody>
+      </p:sp>
+    </p:spTree>
+    <p:extLst>
+      <p:ext uri="{BB962C8B-B14F-4D97-AF65-F5344CB8AC3E}">
+        <p14:creationId xmlns:p14="http://schemas.microsoft.com/office/powerpoint/2010/main" val="3414515644"/>
+      </p:ext>
+    </p:extLst>
+  </p:cSld>
+  <p:clrMapOvr>
+    <a:masterClrMapping/>
+  </p:clrMapOvr>
+  <p:timing>
+    <p:tnLst>
+      <p:par>
+        <p:cTn id="1" dur="indefinite" restart="never" nodeType="tmRoot">
+          <p:childTnLst>
+            <p:seq concurrent="1" nextAc="seek">
+              <p:cTn id="2" dur="indefinite" nodeType="mainSeq">
+                <p:childTnLst>
+                  <p:par>
+                    <p:cTn id="3" fill="hold">
+                      <p:stCondLst>
+                        <p:cond delay="indefinite"/>
+                        <p:cond evt="onBegin" delay="0">
+                          <p:tn val="2"/>
+                        </p:cond>
+                      </p:stCondLst>
+                      <p:childTnLst>
+                        <p:par>
+                          <p:cTn id="4" fill="hold">
+                            <p:stCondLst>
+                              <p:cond delay="0"/>
+                            </p:stCondLst>
+                            <p:childTnLst>
+                              <p:par>
+                                <p:cTn id="5" presetID="1" presetClass="entr" presetSubtype="0" fill="hold" grpId="0" nodeType="withEffect">
+                                  <p:stCondLst>
+                                    <p:cond delay="0"/>
+                                  </p:stCondLst>
+                                  <p:childTnLst>
+                                    <p:set>
+                                      <p:cBhvr>
+                                        <p:cTn id="6" dur="1" fill="hold">
+                                          <p:stCondLst>
+                                            <p:cond delay="0"/>
+                                          </p:stCondLst>
+                                        </p:cTn>
+                                        <p:tgtEl>
+                                          <p:spTgt spid="3">
+                                            <p:txEl>
+                                              <p:pRg st="0" end="0"/>
+                                            </p:txEl>
+                                          </p:spTgt>
+                                        </p:tgtEl>
+                                        <p:attrNameLst>
+                                          <p:attrName>style.visibility</p:attrName>
+                                        </p:attrNameLst>
+                                      </p:cBhvr>
+                                      <p:to>
+                                        <p:strVal val="visible"/>
+                                      </p:to>
+                                    </p:set>
+                                  </p:childTnLst>
+                                </p:cTn>
+                              </p:par>
+                              <p:par>
+                                <p:cTn id="7" presetID="1" presetClass="entr" presetSubtype="0" fill="hold" grpId="0" nodeType="withEffect">
+                                  <p:stCondLst>
+                                    <p:cond delay="0"/>
+                                  </p:stCondLst>
+                                  <p:childTnLst>
+                                    <p:set>
+                                      <p:cBhvr>
+                                        <p:cTn id="8" dur="1" fill="hold">
+                                          <p:stCondLst>
+                                            <p:cond delay="0"/>
+                                          </p:stCondLst>
+                                        </p:cTn>
+                                        <p:tgtEl>
+                                          <p:spTgt spid="3">
+                                            <p:txEl>
+                                              <p:pRg st="1" end="1"/>
+                                            </p:txEl>
+                                          </p:spTgt>
+                                        </p:tgtEl>
+                                        <p:attrNameLst>
+                                          <p:attrName>style.visibility</p:attrName>
+                                        </p:attrNameLst>
+                                      </p:cBhvr>
+                                      <p:to>
+                                        <p:strVal val="visible"/>
+                                      </p:to>
+                                    </p:set>
+                                  </p:childTnLst>
+                                </p:cTn>
+                              </p:par>
+                              <p:par>
+                                <p:cTn id="9" presetID="1" presetClass="entr" presetSubtype="0" fill="hold" grpId="0" nodeType="withEffect">
+                                  <p:stCondLst>
+                                    <p:cond delay="0"/>
+                                  </p:stCondLst>
+                                  <p:childTnLst>
+                                    <p:set>
+                                      <p:cBhvr>
+                                        <p:cTn id="10" dur="1" fill="hold">
+                                          <p:stCondLst>
+                                            <p:cond delay="0"/>
+                                          </p:stCondLst>
+                                        </p:cTn>
+                                        <p:tgtEl>
+                                          <p:spTgt spid="3">
+                                            <p:txEl>
+                                              <p:pRg st="2" end="2"/>
+                                            </p:txEl>
+                                          </p:spTgt>
+                                        </p:tgtEl>
+                                        <p:attrNameLst>
+                                          <p:attrName>style.visibility</p:attrName>
+                                        </p:attrNameLst>
+                                      </p:cBhvr>
+                                      <p:to>
+                                        <p:strVal val="visible"/>
+                                      </p:to>
+                                    </p:set>
+                                  </p:childTnLst>
+                                </p:cTn>
+                              </p:par>
+                              <p:par>
+                                <p:cTn id="11" presetID="1" presetClass="entr" presetSubtype="0" fill="hold" grpId="0" nodeType="withEffect">
+                                  <p:stCondLst>
+                                    <p:cond delay="0"/>
+                                  </p:stCondLst>
+                                  <p:childTnLst>
+                                    <p:set>
+                                      <p:cBhvr>
+                                        <p:cTn id="12" dur="1" fill="hold">
+                                          <p:stCondLst>
+                                            <p:cond delay="0"/>
+                                          </p:stCondLst>
+                                        </p:cTn>
+                                        <p:tgtEl>
+                                          <p:spTgt spid="3">
+                                            <p:txEl>
+                                              <p:pRg st="3" end="3"/>
+                                            </p:txEl>
+                                          </p:spTgt>
+                                        </p:tgtEl>
+                                        <p:attrNameLst>
+                                          <p:attrName>style.visibility</p:attrName>
+                                        </p:attrNameLst>
+                                      </p:cBhvr>
+                                      <p:to>
+                                        <p:strVal val="visible"/>
+                                      </p:to>
+                                    </p:set>
+                                  </p:childTnLst>
+                                </p:cTn>
+                              </p:par>
+                              <p:par>
+                                <p:cTn id="13" presetID="1" presetClass="entr" presetSubtype="0" fill="hold" grpId="0" nodeType="withEffect">
+                                  <p:stCondLst>
+                                    <p:cond delay="0"/>
+                                  </p:stCondLst>
+                                  <p:childTnLst>
+                                    <p:set>
+                                      <p:cBhvr>
+                                        <p:cTn id="14" dur="1" fill="hold">
+                                          <p:stCondLst>
+                                            <p:cond delay="0"/>
+                                          </p:stCondLst>
+                                        </p:cTn>
+                                        <p:tgtEl>
+                                          <p:spTgt spid="3">
+                                            <p:txEl>
+                                              <p:pRg st="4" end="4"/>
+                                            </p:txEl>
+                                          </p:spTgt>
+                                        </p:tgtEl>
+                                        <p:attrNameLst>
+                                          <p:attrName>style.visibility</p:attrName>
+                                        </p:attrNameLst>
+                                      </p:cBhvr>
+                                      <p:to>
+                                        <p:strVal val="visible"/>
+                                      </p:to>
+                                    </p:set>
+                                  </p:childTnLst>
+                                </p:cTn>
+                              </p:par>
+                            </p:childTnLst>
+                          </p:cTn>
+                        </p:par>
+                      </p:childTnLst>
+                    </p:cTn>
+                  </p:par>
+                  <p:par>
+                    <p:cTn id="15" fill="hold">
+                      <p:stCondLst>
+                        <p:cond delay="indefinite"/>
+                      </p:stCondLst>
+                      <p:childTnLst>
+                        <p:par>
+                          <p:cTn id="16" fill="hold">
+                            <p:stCondLst>
+                              <p:cond delay="0"/>
+                            </p:stCondLst>
+                            <p:childTnLst>
+                              <p:par>
+                                <p:cTn id="17" presetID="1" presetClass="entr" presetSubtype="0" fill="hold" grpId="0" nodeType="clickEffect">
+                                  <p:stCondLst>
+                                    <p:cond delay="0"/>
+                                  </p:stCondLst>
+                                  <p:childTnLst>
+                                    <p:set>
+                                      <p:cBhvr>
+                                        <p:cTn id="18" dur="1" fill="hold">
+                                          <p:stCondLst>
+                                            <p:cond delay="0"/>
+                                          </p:stCondLst>
+                                        </p:cTn>
+                                        <p:tgtEl>
+                                          <p:spTgt spid="3">
+                                            <p:txEl>
+                                              <p:pRg st="5" end="5"/>
+                                            </p:txEl>
+                                          </p:spTgt>
+                                        </p:tgtEl>
+                                        <p:attrNameLst>
+                                          <p:attrName>style.visibility</p:attrName>
+                                        </p:attrNameLst>
+                                      </p:cBhvr>
+                                      <p:to>
+                                        <p:strVal val="visible"/>
+                                      </p:to>
+                                    </p:set>
+                                  </p:childTnLst>
+                                </p:cTn>
+                              </p:par>
+                            </p:childTnLst>
+                          </p:cTn>
+                        </p:par>
+                      </p:childTnLst>
+                    </p:cTn>
+                  </p:par>
+                </p:childTnLst>
+              </p:cTn>
+              <p:prevCondLst>
+                <p:cond evt="onPrev" delay="0">
+                  <p:tgtEl>
+                    <p:sldTgt/>
+                  </p:tgtEl>
+                </p:cond>
+              </p:prevCondLst>
+              <p:nextCondLst>
+                <p:cond evt="onNext" delay="0">
+                  <p:tgtEl>
+                    <p:sldTgt/>
+                  </p:tgtEl>
+                </p:cond>
+              </p:nextCondLst>
+            </p:seq>
+          </p:childTnLst>
+        </p:cTn>
+      </p:par>
+    </p:tnLst>
+    <p:bldLst>
+      <p:bldP spid="3" grpId="0" uiExpand="1" build="p"/>
+    </p:bldLst>
+  </p:timing>
+</p:sld>
+</file>
+
+<file path=ppt/slides/slide16.xml><?xml version="1.0" encoding="utf-8"?>
+<p:sld xmlns:a="http://schemas.openxmlformats.org/drawingml/2006/main" xmlns:r="http://schemas.openxmlformats.org/officeDocument/2006/relationships" xmlns:p="http://schemas.openxmlformats.org/presentationml/2006/main">
+  <p:cSld>
+    <p:spTree>
+      <p:nvGrpSpPr>
+        <p:cNvPr id="1" name=""/>
+        <p:cNvGrpSpPr/>
+        <p:nvPr/>
+      </p:nvGrpSpPr>
+      <p:grpSpPr>
+        <a:xfrm>
+          <a:off x="0" y="0"/>
+          <a:ext cx="0" cy="0"/>
+          <a:chOff x="0" y="0"/>
+          <a:chExt cx="0" cy="0"/>
+        </a:xfrm>
+      </p:grpSpPr>
+      <p:sp>
+        <p:nvSpPr>
+          <p:cNvPr id="2" name="Title 1"/>
+          <p:cNvSpPr>
+            <a:spLocks noGrp="1"/>
+          </p:cNvSpPr>
+          <p:nvPr>
+            <p:ph type="title"/>
+          </p:nvPr>
+        </p:nvSpPr>
+        <p:spPr/>
+        <p:txBody>
+          <a:bodyPr/>
+          <a:lstStyle/>
+          <a:p>
+            <a:r>
+              <a:rPr lang="en-US" dirty="0" smtClean="0"/>
+              <a:t>Profiling via job</a:t>
+            </a:r>
+            <a:endParaRPr lang="nl-BE" dirty="0"/>
+          </a:p>
+        </p:txBody>
+      </p:sp>
+      <p:sp>
+        <p:nvSpPr>
+          <p:cNvPr id="4" name="Slide Number Placeholder 3"/>
+          <p:cNvSpPr>
+            <a:spLocks noGrp="1"/>
+          </p:cNvSpPr>
+          <p:nvPr>
+            <p:ph type="sldNum" sz="quarter" idx="12"/>
+          </p:nvPr>
+        </p:nvSpPr>
+        <p:spPr/>
+        <p:txBody>
+          <a:bodyPr/>
+          <a:lstStyle/>
+          <a:p>
+            <a:fld id="{AFF690EF-DE1B-4F48-8935-D551336ADF29}" type="slidenum">
+              <a:rPr lang="nl-BE" smtClean="0"/>
+              <a:t>16</a:t>
+            </a:fld>
+            <a:endParaRPr lang="nl-BE"/>
+          </a:p>
+        </p:txBody>
+      </p:sp>
+    </p:spTree>
+    <p:extLst>
+      <p:ext uri="{BB962C8B-B14F-4D97-AF65-F5344CB8AC3E}">
+        <p14:creationId xmlns:p14="http://schemas.microsoft.com/office/powerpoint/2010/main" val="1383793501"/>
+      </p:ext>
+    </p:extLst>
+  </p:cSld>
+  <p:clrMapOvr>
+    <a:masterClrMapping/>
+  </p:clrMapOvr>
+  <p:timing>
+    <p:tnLst>
+      <p:par>
+        <p:cTn id="1" dur="indefinite" restart="never" nodeType="tmRoot"/>
+      </p:par>
+    </p:tnLst>
   </p:timing>
 </p:sld>
 </file>

</xml_diff>

<commit_message>
Add domain decomposition slide
</commit_message>
<xml_diff>
--- a/Optimization/AllineaMAP/allinea_map.pptx
+++ b/Optimization/AllineaMAP/allinea_map.pptx
@@ -5,7 +5,7 @@
     <p:sldMasterId id="2147483660" r:id="rId1"/>
   </p:sldMasterIdLst>
   <p:notesMasterIdLst>
-    <p:notesMasterId r:id="rId22"/>
+    <p:notesMasterId r:id="rId24"/>
   </p:notesMasterIdLst>
   <p:sldIdLst>
     <p:sldId id="256" r:id="rId2"/>
@@ -26,8 +26,10 @@
     <p:sldId id="270" r:id="rId17"/>
     <p:sldId id="271" r:id="rId18"/>
     <p:sldId id="272" r:id="rId19"/>
-    <p:sldId id="273" r:id="rId20"/>
-    <p:sldId id="274" r:id="rId21"/>
+    <p:sldId id="277" r:id="rId20"/>
+    <p:sldId id="278" r:id="rId21"/>
+    <p:sldId id="273" r:id="rId22"/>
+    <p:sldId id="274" r:id="rId23"/>
   </p:sldIdLst>
   <p:sldSz cx="9144000" cy="6858000" type="screen4x3"/>
   <p:notesSz cx="6858000" cy="9144000"/>
@@ -216,7 +218,7 @@
           <a:p>
             <a:fld id="{DCBCB4EF-AF11-42C5-A407-C6B5B92B4E13}" type="datetimeFigureOut">
               <a:rPr lang="nl-BE" smtClean="0"/>
-              <a:t>30/05/2017</a:t>
+              <a:t>17/01/2018</a:t>
             </a:fld>
             <a:endParaRPr lang="nl-BE"/>
           </a:p>
@@ -699,7 +701,7 @@
           <a:p>
             <a:fld id="{16EF12B4-B810-4A0E-8BE8-50A63E57FF46}" type="datetime1">
               <a:rPr lang="nl-BE" smtClean="0"/>
-              <a:t>30/05/2017</a:t>
+              <a:t>17/01/2018</a:t>
             </a:fld>
             <a:endParaRPr lang="nl-BE"/>
           </a:p>
@@ -869,7 +871,7 @@
           <a:p>
             <a:fld id="{1C4C54F0-81EA-4EDD-8D8A-D45FC20BB49D}" type="datetime1">
               <a:rPr lang="nl-BE" smtClean="0"/>
-              <a:t>30/05/2017</a:t>
+              <a:t>17/01/2018</a:t>
             </a:fld>
             <a:endParaRPr lang="nl-BE"/>
           </a:p>
@@ -1049,7 +1051,7 @@
           <a:p>
             <a:fld id="{C777687B-F7A2-4048-B084-F43AE07119BE}" type="datetime1">
               <a:rPr lang="nl-BE" smtClean="0"/>
-              <a:t>30/05/2017</a:t>
+              <a:t>17/01/2018</a:t>
             </a:fld>
             <a:endParaRPr lang="nl-BE"/>
           </a:p>
@@ -1219,7 +1221,7 @@
           <a:p>
             <a:fld id="{17D68A66-8CE0-4AE5-B09A-AFB1DA1D35B7}" type="datetime1">
               <a:rPr lang="nl-BE" smtClean="0"/>
-              <a:t>30/05/2017</a:t>
+              <a:t>17/01/2018</a:t>
             </a:fld>
             <a:endParaRPr lang="nl-BE"/>
           </a:p>
@@ -1463,7 +1465,7 @@
           <a:p>
             <a:fld id="{ACD2EF45-07D9-47DD-8D2C-044FB9A2A8C8}" type="datetime1">
               <a:rPr lang="nl-BE" smtClean="0"/>
-              <a:t>30/05/2017</a:t>
+              <a:t>17/01/2018</a:t>
             </a:fld>
             <a:endParaRPr lang="nl-BE"/>
           </a:p>
@@ -1695,7 +1697,7 @@
           <a:p>
             <a:fld id="{C1AA2C35-BB49-44DC-82C3-3BD7F8F0132B}" type="datetime1">
               <a:rPr lang="nl-BE" smtClean="0"/>
-              <a:t>30/05/2017</a:t>
+              <a:t>17/01/2018</a:t>
             </a:fld>
             <a:endParaRPr lang="nl-BE"/>
           </a:p>
@@ -2062,7 +2064,7 @@
           <a:p>
             <a:fld id="{EF292103-E950-40E9-A111-1A108610AB2D}" type="datetime1">
               <a:rPr lang="nl-BE" smtClean="0"/>
-              <a:t>30/05/2017</a:t>
+              <a:t>17/01/2018</a:t>
             </a:fld>
             <a:endParaRPr lang="nl-BE"/>
           </a:p>
@@ -2180,7 +2182,7 @@
           <a:p>
             <a:fld id="{C309520F-DE14-43BC-AF22-FA4B0586587C}" type="datetime1">
               <a:rPr lang="nl-BE" smtClean="0"/>
-              <a:t>30/05/2017</a:t>
+              <a:t>17/01/2018</a:t>
             </a:fld>
             <a:endParaRPr lang="nl-BE"/>
           </a:p>
@@ -2275,7 +2277,7 @@
           <a:p>
             <a:fld id="{89A75246-50AD-43D4-AC8F-C9CEFC06F414}" type="datetime1">
               <a:rPr lang="nl-BE" smtClean="0"/>
-              <a:t>30/05/2017</a:t>
+              <a:t>17/01/2018</a:t>
             </a:fld>
             <a:endParaRPr lang="nl-BE"/>
           </a:p>
@@ -2552,7 +2554,7 @@
           <a:p>
             <a:fld id="{8D0AC96A-CB4C-447A-BAE9-CD71E5D3E387}" type="datetime1">
               <a:rPr lang="nl-BE" smtClean="0"/>
-              <a:t>30/05/2017</a:t>
+              <a:t>17/01/2018</a:t>
             </a:fld>
             <a:endParaRPr lang="nl-BE"/>
           </a:p>
@@ -2809,7 +2811,7 @@
           <a:p>
             <a:fld id="{8EF713C0-6057-4AAB-80ED-C8B012F691C2}" type="datetime1">
               <a:rPr lang="nl-BE" smtClean="0"/>
-              <a:t>30/05/2017</a:t>
+              <a:t>17/01/2018</a:t>
             </a:fld>
             <a:endParaRPr lang="nl-BE"/>
           </a:p>
@@ -3022,7 +3024,7 @@
           <a:p>
             <a:fld id="{67CEDA06-6E27-4D36-9084-23ECECD0BA0D}" type="datetime1">
               <a:rPr lang="nl-BE" smtClean="0"/>
-              <a:t>30/05/2017</a:t>
+              <a:t>17/01/2018</a:t>
             </a:fld>
             <a:endParaRPr lang="nl-BE"/>
           </a:p>
@@ -9451,10 +9453,18 @@
           <a:lstStyle/>
           <a:p>
             <a:r>
+              <a:rPr lang="en-US" dirty="0" err="1" smtClean="0"/>
+              <a:t>ommunication</a:t>
+            </a:r>
+            <a:r>
               <a:rPr lang="en-US" dirty="0" smtClean="0"/>
-              <a:t>Conclusions</a:t>
-            </a:r>
-            <a:endParaRPr lang="nl-BE" dirty="0"/>
+              <a:t> </a:t>
+            </a:r>
+            <a:r>
+              <a:rPr lang="en-US" dirty="0" smtClean="0"/>
+              <a:t>vs. computation</a:t>
+            </a:r>
+            <a:endParaRPr lang="en-US" dirty="0"/>
           </a:p>
         </p:txBody>
       </p:sp>
@@ -9473,7 +9483,7 @@
           <a:bodyPr/>
           <a:lstStyle/>
           <a:p>
-            <a:endParaRPr lang="nl-BE"/>
+            <a:endParaRPr lang="en-US"/>
           </a:p>
         </p:txBody>
       </p:sp>
@@ -9503,7 +9513,7 @@
     </p:spTree>
     <p:extLst>
       <p:ext uri="{BB962C8B-B14F-4D97-AF65-F5344CB8AC3E}">
-        <p14:creationId xmlns:p14="http://schemas.microsoft.com/office/powerpoint/2010/main" val="3071723956"/>
+        <p14:creationId xmlns:p14="http://schemas.microsoft.com/office/powerpoint/2010/main" val="2316478238"/>
       </p:ext>
     </p:extLst>
   </p:cSld>
@@ -9656,6 +9666,1513 @@
           <a:p>
             <a:r>
               <a:rPr lang="en-US" dirty="0" smtClean="0"/>
+              <a:t>Domain decomposition</a:t>
+            </a:r>
+            <a:endParaRPr lang="en-US" dirty="0"/>
+          </a:p>
+        </p:txBody>
+      </p:sp>
+      <p:sp>
+        <p:nvSpPr>
+          <p:cNvPr id="3" name="Slide Number Placeholder 2"/>
+          <p:cNvSpPr>
+            <a:spLocks noGrp="1"/>
+          </p:cNvSpPr>
+          <p:nvPr>
+            <p:ph type="sldNum" sz="quarter" idx="12"/>
+          </p:nvPr>
+        </p:nvSpPr>
+        <p:spPr/>
+        <p:txBody>
+          <a:bodyPr/>
+          <a:lstStyle/>
+          <a:p>
+            <a:fld id="{AFF690EF-DE1B-4F48-8935-D551336ADF29}" type="slidenum">
+              <a:rPr lang="nl-BE" smtClean="0"/>
+              <a:t>20</a:t>
+            </a:fld>
+            <a:endParaRPr lang="nl-BE"/>
+          </a:p>
+        </p:txBody>
+      </p:sp>
+      <p:pic>
+        <p:nvPicPr>
+          <p:cNvPr id="5" name="Picture 4"/>
+          <p:cNvPicPr>
+            <a:picLocks noChangeAspect="1"/>
+          </p:cNvPicPr>
+          <p:nvPr/>
+        </p:nvPicPr>
+        <p:blipFill>
+          <a:blip r:embed="rId2">
+            <a:extLst>
+              <a:ext uri="{28A0092B-C50C-407E-A947-70E740481C1C}">
+                <a14:useLocalDpi xmlns:a14="http://schemas.microsoft.com/office/drawing/2010/main" val="0"/>
+              </a:ext>
+            </a:extLst>
+          </a:blip>
+          <a:stretch>
+            <a:fillRect/>
+          </a:stretch>
+        </p:blipFill>
+        <p:spPr>
+          <a:xfrm>
+            <a:off x="108066" y="4845665"/>
+            <a:ext cx="8919556" cy="1544794"/>
+          </a:xfrm>
+          <a:prstGeom prst="rect">
+            <a:avLst/>
+          </a:prstGeom>
+        </p:spPr>
+      </p:pic>
+      <p:grpSp>
+        <p:nvGrpSpPr>
+          <p:cNvPr id="11" name="Group 10"/>
+          <p:cNvGrpSpPr/>
+          <p:nvPr/>
+        </p:nvGrpSpPr>
+        <p:grpSpPr>
+          <a:xfrm>
+            <a:off x="6068291" y="1613703"/>
+            <a:ext cx="1483672" cy="630733"/>
+            <a:chOff x="6068291" y="1613703"/>
+            <a:chExt cx="1483672" cy="630733"/>
+          </a:xfrm>
+        </p:grpSpPr>
+        <p:sp>
+          <p:nvSpPr>
+            <p:cNvPr id="6" name="Rounded Rectangle 5"/>
+            <p:cNvSpPr/>
+            <p:nvPr/>
+          </p:nvSpPr>
+          <p:spPr>
+            <a:xfrm>
+              <a:off x="6068291" y="2085682"/>
+              <a:ext cx="389659" cy="158754"/>
+            </a:xfrm>
+            <a:prstGeom prst="roundRect">
+              <a:avLst/>
+            </a:prstGeom>
+            <a:noFill/>
+          </p:spPr>
+          <p:style>
+            <a:lnRef idx="2">
+              <a:schemeClr val="accent1">
+                <a:shade val="50000"/>
+              </a:schemeClr>
+            </a:lnRef>
+            <a:fillRef idx="1">
+              <a:schemeClr val="accent1"/>
+            </a:fillRef>
+            <a:effectRef idx="0">
+              <a:schemeClr val="accent1"/>
+            </a:effectRef>
+            <a:fontRef idx="minor">
+              <a:schemeClr val="lt1"/>
+            </a:fontRef>
+          </p:style>
+          <p:txBody>
+            <a:bodyPr rtlCol="0" anchor="ctr"/>
+            <a:lstStyle/>
+            <a:p>
+              <a:pPr algn="ctr"/>
+              <a:endParaRPr lang="en-US"/>
+            </a:p>
+          </p:txBody>
+        </p:sp>
+        <p:cxnSp>
+          <p:nvCxnSpPr>
+            <p:cNvPr id="8" name="Straight Arrow Connector 7"/>
+            <p:cNvCxnSpPr>
+              <a:stCxn id="9" idx="1"/>
+              <a:endCxn id="6" idx="0"/>
+            </p:cNvCxnSpPr>
+            <p:nvPr/>
+          </p:nvCxnSpPr>
+          <p:spPr>
+            <a:xfrm flipH="1">
+              <a:off x="6263121" y="1798369"/>
+              <a:ext cx="295621" cy="287313"/>
+            </a:xfrm>
+            <a:prstGeom prst="straightConnector1">
+              <a:avLst/>
+            </a:prstGeom>
+            <a:ln w="12700">
+              <a:tailEnd type="stealth" w="lg" len="lg"/>
+            </a:ln>
+          </p:spPr>
+          <p:style>
+            <a:lnRef idx="1">
+              <a:schemeClr val="accent1"/>
+            </a:lnRef>
+            <a:fillRef idx="0">
+              <a:schemeClr val="accent1"/>
+            </a:fillRef>
+            <a:effectRef idx="0">
+              <a:schemeClr val="accent1"/>
+            </a:effectRef>
+            <a:fontRef idx="minor">
+              <a:schemeClr val="tx1"/>
+            </a:fontRef>
+          </p:style>
+        </p:cxnSp>
+        <p:sp>
+          <p:nvSpPr>
+            <p:cNvPr id="9" name="TextBox 8"/>
+            <p:cNvSpPr txBox="1"/>
+            <p:nvPr/>
+          </p:nvSpPr>
+          <p:spPr>
+            <a:xfrm>
+              <a:off x="6558742" y="1613703"/>
+              <a:ext cx="993221" cy="369332"/>
+            </a:xfrm>
+            <a:prstGeom prst="rect">
+              <a:avLst/>
+            </a:prstGeom>
+            <a:noFill/>
+            <a:ln>
+              <a:solidFill>
+                <a:schemeClr val="accent1"/>
+              </a:solidFill>
+            </a:ln>
+          </p:spPr>
+          <p:txBody>
+            <a:bodyPr wrap="none" rtlCol="0">
+              <a:spAutoFit/>
+            </a:bodyPr>
+            <a:lstStyle/>
+            <a:p>
+              <a:r>
+                <a:rPr lang="en-US" dirty="0" err="1" smtClean="0">
+                  <a:solidFill>
+                    <a:srgbClr val="0070C0"/>
+                  </a:solidFill>
+                </a:rPr>
+                <a:t>walltime</a:t>
+              </a:r>
+              <a:endParaRPr lang="en-US" dirty="0">
+                <a:solidFill>
+                  <a:srgbClr val="0070C0"/>
+                </a:solidFill>
+              </a:endParaRPr>
+            </a:p>
+          </p:txBody>
+        </p:sp>
+      </p:grpSp>
+      <p:grpSp>
+        <p:nvGrpSpPr>
+          <p:cNvPr id="12" name="Group 11"/>
+          <p:cNvGrpSpPr/>
+          <p:nvPr/>
+        </p:nvGrpSpPr>
+        <p:grpSpPr>
+          <a:xfrm>
+            <a:off x="4691149" y="4366177"/>
+            <a:ext cx="1483672" cy="630733"/>
+            <a:chOff x="6068291" y="1613703"/>
+            <a:chExt cx="1483672" cy="630733"/>
+          </a:xfrm>
+        </p:grpSpPr>
+        <p:sp>
+          <p:nvSpPr>
+            <p:cNvPr id="13" name="Rounded Rectangle 12"/>
+            <p:cNvSpPr/>
+            <p:nvPr/>
+          </p:nvSpPr>
+          <p:spPr>
+            <a:xfrm>
+              <a:off x="6068291" y="2085682"/>
+              <a:ext cx="389659" cy="158754"/>
+            </a:xfrm>
+            <a:prstGeom prst="roundRect">
+              <a:avLst/>
+            </a:prstGeom>
+            <a:noFill/>
+          </p:spPr>
+          <p:style>
+            <a:lnRef idx="2">
+              <a:schemeClr val="accent1">
+                <a:shade val="50000"/>
+              </a:schemeClr>
+            </a:lnRef>
+            <a:fillRef idx="1">
+              <a:schemeClr val="accent1"/>
+            </a:fillRef>
+            <a:effectRef idx="0">
+              <a:schemeClr val="accent1"/>
+            </a:effectRef>
+            <a:fontRef idx="minor">
+              <a:schemeClr val="lt1"/>
+            </a:fontRef>
+          </p:style>
+          <p:txBody>
+            <a:bodyPr rtlCol="0" anchor="ctr"/>
+            <a:lstStyle/>
+            <a:p>
+              <a:pPr algn="ctr"/>
+              <a:endParaRPr lang="en-US"/>
+            </a:p>
+          </p:txBody>
+        </p:sp>
+        <p:cxnSp>
+          <p:nvCxnSpPr>
+            <p:cNvPr id="14" name="Straight Arrow Connector 13"/>
+            <p:cNvCxnSpPr>
+              <a:stCxn id="15" idx="1"/>
+              <a:endCxn id="13" idx="0"/>
+            </p:cNvCxnSpPr>
+            <p:nvPr/>
+          </p:nvCxnSpPr>
+          <p:spPr>
+            <a:xfrm flipH="1">
+              <a:off x="6263121" y="1798369"/>
+              <a:ext cx="295621" cy="287313"/>
+            </a:xfrm>
+            <a:prstGeom prst="straightConnector1">
+              <a:avLst/>
+            </a:prstGeom>
+            <a:ln w="12700">
+              <a:tailEnd type="stealth" w="lg" len="lg"/>
+            </a:ln>
+          </p:spPr>
+          <p:style>
+            <a:lnRef idx="1">
+              <a:schemeClr val="accent1"/>
+            </a:lnRef>
+            <a:fillRef idx="0">
+              <a:schemeClr val="accent1"/>
+            </a:fillRef>
+            <a:effectRef idx="0">
+              <a:schemeClr val="accent1"/>
+            </a:effectRef>
+            <a:fontRef idx="minor">
+              <a:schemeClr val="tx1"/>
+            </a:fontRef>
+          </p:style>
+        </p:cxnSp>
+        <p:sp>
+          <p:nvSpPr>
+            <p:cNvPr id="15" name="TextBox 14"/>
+            <p:cNvSpPr txBox="1"/>
+            <p:nvPr/>
+          </p:nvSpPr>
+          <p:spPr>
+            <a:xfrm>
+              <a:off x="6558742" y="1613703"/>
+              <a:ext cx="993221" cy="369332"/>
+            </a:xfrm>
+            <a:prstGeom prst="rect">
+              <a:avLst/>
+            </a:prstGeom>
+            <a:noFill/>
+            <a:ln>
+              <a:solidFill>
+                <a:schemeClr val="accent1"/>
+              </a:solidFill>
+            </a:ln>
+          </p:spPr>
+          <p:txBody>
+            <a:bodyPr wrap="none" rtlCol="0">
+              <a:spAutoFit/>
+            </a:bodyPr>
+            <a:lstStyle/>
+            <a:p>
+              <a:r>
+                <a:rPr lang="en-US" dirty="0" err="1" smtClean="0">
+                  <a:solidFill>
+                    <a:srgbClr val="0070C0"/>
+                  </a:solidFill>
+                </a:rPr>
+                <a:t>walltime</a:t>
+              </a:r>
+              <a:endParaRPr lang="en-US" dirty="0">
+                <a:solidFill>
+                  <a:srgbClr val="0070C0"/>
+                </a:solidFill>
+              </a:endParaRPr>
+            </a:p>
+          </p:txBody>
+        </p:sp>
+      </p:grpSp>
+      <p:grpSp>
+        <p:nvGrpSpPr>
+          <p:cNvPr id="16" name="Group 15"/>
+          <p:cNvGrpSpPr/>
+          <p:nvPr/>
+        </p:nvGrpSpPr>
+        <p:grpSpPr>
+          <a:xfrm>
+            <a:off x="1039315" y="1573337"/>
+            <a:ext cx="2179106" cy="665991"/>
+            <a:chOff x="6068291" y="1578445"/>
+            <a:chExt cx="2179106" cy="665991"/>
+          </a:xfrm>
+        </p:grpSpPr>
+        <p:sp>
+          <p:nvSpPr>
+            <p:cNvPr id="17" name="Rounded Rectangle 16"/>
+            <p:cNvSpPr/>
+            <p:nvPr/>
+          </p:nvSpPr>
+          <p:spPr>
+            <a:xfrm>
+              <a:off x="6068291" y="2090790"/>
+              <a:ext cx="1088743" cy="153646"/>
+            </a:xfrm>
+            <a:prstGeom prst="roundRect">
+              <a:avLst/>
+            </a:prstGeom>
+            <a:noFill/>
+          </p:spPr>
+          <p:style>
+            <a:lnRef idx="2">
+              <a:schemeClr val="accent1">
+                <a:shade val="50000"/>
+              </a:schemeClr>
+            </a:lnRef>
+            <a:fillRef idx="1">
+              <a:schemeClr val="accent1"/>
+            </a:fillRef>
+            <a:effectRef idx="0">
+              <a:schemeClr val="accent1"/>
+            </a:effectRef>
+            <a:fontRef idx="minor">
+              <a:schemeClr val="lt1"/>
+            </a:fontRef>
+          </p:style>
+          <p:txBody>
+            <a:bodyPr rtlCol="0" anchor="ctr"/>
+            <a:lstStyle/>
+            <a:p>
+              <a:pPr algn="ctr"/>
+              <a:endParaRPr lang="en-US"/>
+            </a:p>
+          </p:txBody>
+        </p:sp>
+        <p:cxnSp>
+          <p:nvCxnSpPr>
+            <p:cNvPr id="18" name="Straight Arrow Connector 17"/>
+            <p:cNvCxnSpPr>
+              <a:stCxn id="19" idx="1"/>
+              <a:endCxn id="17" idx="0"/>
+            </p:cNvCxnSpPr>
+            <p:nvPr/>
+          </p:nvCxnSpPr>
+          <p:spPr>
+            <a:xfrm flipH="1">
+              <a:off x="6612663" y="1763111"/>
+              <a:ext cx="544371" cy="327679"/>
+            </a:xfrm>
+            <a:prstGeom prst="straightConnector1">
+              <a:avLst/>
+            </a:prstGeom>
+            <a:ln w="12700">
+              <a:tailEnd type="stealth" w="lg" len="lg"/>
+            </a:ln>
+          </p:spPr>
+          <p:style>
+            <a:lnRef idx="1">
+              <a:schemeClr val="accent1"/>
+            </a:lnRef>
+            <a:fillRef idx="0">
+              <a:schemeClr val="accent1"/>
+            </a:fillRef>
+            <a:effectRef idx="0">
+              <a:schemeClr val="accent1"/>
+            </a:effectRef>
+            <a:fontRef idx="minor">
+              <a:schemeClr val="tx1"/>
+            </a:fontRef>
+          </p:style>
+        </p:cxnSp>
+        <p:sp>
+          <p:nvSpPr>
+            <p:cNvPr id="19" name="TextBox 18"/>
+            <p:cNvSpPr txBox="1"/>
+            <p:nvPr/>
+          </p:nvSpPr>
+          <p:spPr>
+            <a:xfrm>
+              <a:off x="7157034" y="1578445"/>
+              <a:ext cx="1090363" cy="369332"/>
+            </a:xfrm>
+            <a:prstGeom prst="rect">
+              <a:avLst/>
+            </a:prstGeom>
+            <a:noFill/>
+            <a:ln>
+              <a:solidFill>
+                <a:schemeClr val="accent1"/>
+              </a:solidFill>
+            </a:ln>
+          </p:spPr>
+          <p:txBody>
+            <a:bodyPr wrap="none" rtlCol="0">
+              <a:spAutoFit/>
+            </a:bodyPr>
+            <a:lstStyle/>
+            <a:p>
+              <a:r>
+                <a:rPr lang="en-US" dirty="0" smtClean="0">
+                  <a:solidFill>
+                    <a:srgbClr val="0070C0"/>
+                  </a:solidFill>
+                </a:rPr>
+                <a:t>resources</a:t>
+              </a:r>
+              <a:endParaRPr lang="en-US" dirty="0">
+                <a:solidFill>
+                  <a:srgbClr val="0070C0"/>
+                </a:solidFill>
+              </a:endParaRPr>
+            </a:p>
+          </p:txBody>
+        </p:sp>
+      </p:grpSp>
+      <p:grpSp>
+        <p:nvGrpSpPr>
+          <p:cNvPr id="23" name="Group 22"/>
+          <p:cNvGrpSpPr/>
+          <p:nvPr/>
+        </p:nvGrpSpPr>
+        <p:grpSpPr>
+          <a:xfrm>
+            <a:off x="1038506" y="4298217"/>
+            <a:ext cx="1907729" cy="698693"/>
+            <a:chOff x="6068292" y="1545743"/>
+            <a:chExt cx="1907729" cy="698693"/>
+          </a:xfrm>
+        </p:grpSpPr>
+        <p:sp>
+          <p:nvSpPr>
+            <p:cNvPr id="24" name="Rounded Rectangle 23"/>
+            <p:cNvSpPr/>
+            <p:nvPr/>
+          </p:nvSpPr>
+          <p:spPr>
+            <a:xfrm>
+              <a:off x="6068292" y="2085682"/>
+              <a:ext cx="1006426" cy="158754"/>
+            </a:xfrm>
+            <a:prstGeom prst="roundRect">
+              <a:avLst/>
+            </a:prstGeom>
+            <a:noFill/>
+          </p:spPr>
+          <p:style>
+            <a:lnRef idx="2">
+              <a:schemeClr val="accent1">
+                <a:shade val="50000"/>
+              </a:schemeClr>
+            </a:lnRef>
+            <a:fillRef idx="1">
+              <a:schemeClr val="accent1"/>
+            </a:fillRef>
+            <a:effectRef idx="0">
+              <a:schemeClr val="accent1"/>
+            </a:effectRef>
+            <a:fontRef idx="minor">
+              <a:schemeClr val="lt1"/>
+            </a:fontRef>
+          </p:style>
+          <p:txBody>
+            <a:bodyPr rtlCol="0" anchor="ctr"/>
+            <a:lstStyle/>
+            <a:p>
+              <a:pPr algn="ctr"/>
+              <a:endParaRPr lang="en-US"/>
+            </a:p>
+          </p:txBody>
+        </p:sp>
+        <p:cxnSp>
+          <p:nvCxnSpPr>
+            <p:cNvPr id="25" name="Straight Arrow Connector 24"/>
+            <p:cNvCxnSpPr>
+              <a:stCxn id="26" idx="1"/>
+              <a:endCxn id="24" idx="0"/>
+            </p:cNvCxnSpPr>
+            <p:nvPr/>
+          </p:nvCxnSpPr>
+          <p:spPr>
+            <a:xfrm flipH="1">
+              <a:off x="6571505" y="1730409"/>
+              <a:ext cx="314153" cy="355273"/>
+            </a:xfrm>
+            <a:prstGeom prst="straightConnector1">
+              <a:avLst/>
+            </a:prstGeom>
+            <a:ln w="12700">
+              <a:tailEnd type="stealth" w="lg" len="lg"/>
+            </a:ln>
+          </p:spPr>
+          <p:style>
+            <a:lnRef idx="1">
+              <a:schemeClr val="accent1"/>
+            </a:lnRef>
+            <a:fillRef idx="0">
+              <a:schemeClr val="accent1"/>
+            </a:fillRef>
+            <a:effectRef idx="0">
+              <a:schemeClr val="accent1"/>
+            </a:effectRef>
+            <a:fontRef idx="minor">
+              <a:schemeClr val="tx1"/>
+            </a:fontRef>
+          </p:style>
+        </p:cxnSp>
+        <p:sp>
+          <p:nvSpPr>
+            <p:cNvPr id="26" name="TextBox 25"/>
+            <p:cNvSpPr txBox="1"/>
+            <p:nvPr/>
+          </p:nvSpPr>
+          <p:spPr>
+            <a:xfrm>
+              <a:off x="6885658" y="1545743"/>
+              <a:ext cx="1090363" cy="369332"/>
+            </a:xfrm>
+            <a:prstGeom prst="rect">
+              <a:avLst/>
+            </a:prstGeom>
+            <a:noFill/>
+            <a:ln>
+              <a:solidFill>
+                <a:schemeClr val="accent1"/>
+              </a:solidFill>
+            </a:ln>
+          </p:spPr>
+          <p:txBody>
+            <a:bodyPr wrap="none" rtlCol="0">
+              <a:spAutoFit/>
+            </a:bodyPr>
+            <a:lstStyle/>
+            <a:p>
+              <a:r>
+                <a:rPr lang="en-US" dirty="0" smtClean="0">
+                  <a:solidFill>
+                    <a:srgbClr val="0070C0"/>
+                  </a:solidFill>
+                </a:rPr>
+                <a:t>resources</a:t>
+              </a:r>
+              <a:endParaRPr lang="en-US" dirty="0">
+                <a:solidFill>
+                  <a:srgbClr val="0070C0"/>
+                </a:solidFill>
+              </a:endParaRPr>
+            </a:p>
+          </p:txBody>
+        </p:sp>
+      </p:grpSp>
+      <p:pic>
+        <p:nvPicPr>
+          <p:cNvPr id="4" name="Picture 3"/>
+          <p:cNvPicPr>
+            <a:picLocks noChangeAspect="1"/>
+          </p:cNvPicPr>
+          <p:nvPr/>
+        </p:nvPicPr>
+        <p:blipFill>
+          <a:blip r:embed="rId3">
+            <a:extLst>
+              <a:ext uri="{28A0092B-C50C-407E-A947-70E740481C1C}">
+                <a14:useLocalDpi xmlns:a14="http://schemas.microsoft.com/office/drawing/2010/main" val="0"/>
+              </a:ext>
+            </a:extLst>
+          </a:blip>
+          <a:stretch>
+            <a:fillRect/>
+          </a:stretch>
+        </p:blipFill>
+        <p:spPr>
+          <a:xfrm>
+            <a:off x="108066" y="2085682"/>
+            <a:ext cx="8919556" cy="1528051"/>
+          </a:xfrm>
+          <a:prstGeom prst="rect">
+            <a:avLst/>
+          </a:prstGeom>
+          <a:ln w="28575">
+            <a:solidFill>
+              <a:schemeClr val="tx1"/>
+            </a:solidFill>
+          </a:ln>
+        </p:spPr>
+      </p:pic>
+      <p:grpSp>
+        <p:nvGrpSpPr>
+          <p:cNvPr id="35" name="Group 34"/>
+          <p:cNvGrpSpPr/>
+          <p:nvPr/>
+        </p:nvGrpSpPr>
+        <p:grpSpPr>
+          <a:xfrm>
+            <a:off x="3044145" y="2335876"/>
+            <a:ext cx="1997791" cy="1898404"/>
+            <a:chOff x="3044145" y="2335876"/>
+            <a:chExt cx="1997791" cy="1898404"/>
+          </a:xfrm>
+        </p:grpSpPr>
+        <p:sp>
+          <p:nvSpPr>
+            <p:cNvPr id="28" name="Rounded Rectangle 27"/>
+            <p:cNvSpPr/>
+            <p:nvPr/>
+          </p:nvSpPr>
+          <p:spPr>
+            <a:xfrm>
+              <a:off x="3458095" y="2335876"/>
+              <a:ext cx="1138843" cy="307571"/>
+            </a:xfrm>
+            <a:prstGeom prst="roundRect">
+              <a:avLst/>
+            </a:prstGeom>
+            <a:noFill/>
+            <a:ln w="28575">
+              <a:solidFill>
+                <a:srgbClr val="C00000"/>
+              </a:solidFill>
+            </a:ln>
+          </p:spPr>
+          <p:style>
+            <a:lnRef idx="2">
+              <a:schemeClr val="accent1">
+                <a:shade val="50000"/>
+              </a:schemeClr>
+            </a:lnRef>
+            <a:fillRef idx="1">
+              <a:schemeClr val="accent1"/>
+            </a:fillRef>
+            <a:effectRef idx="0">
+              <a:schemeClr val="accent1"/>
+            </a:effectRef>
+            <a:fontRef idx="minor">
+              <a:schemeClr val="lt1"/>
+            </a:fontRef>
+          </p:style>
+          <p:txBody>
+            <a:bodyPr rtlCol="0" anchor="ctr"/>
+            <a:lstStyle/>
+            <a:p>
+              <a:pPr algn="ctr"/>
+              <a:endParaRPr lang="en-US"/>
+            </a:p>
+          </p:txBody>
+        </p:sp>
+        <p:cxnSp>
+          <p:nvCxnSpPr>
+            <p:cNvPr id="30" name="Straight Arrow Connector 29"/>
+            <p:cNvCxnSpPr>
+              <a:stCxn id="32" idx="0"/>
+              <a:endCxn id="28" idx="2"/>
+            </p:cNvCxnSpPr>
+            <p:nvPr/>
+          </p:nvCxnSpPr>
+          <p:spPr>
+            <a:xfrm flipH="1" flipV="1">
+              <a:off x="4027517" y="2643447"/>
+              <a:ext cx="15524" cy="1221501"/>
+            </a:xfrm>
+            <a:prstGeom prst="straightConnector1">
+              <a:avLst/>
+            </a:prstGeom>
+            <a:ln w="28575">
+              <a:solidFill>
+                <a:srgbClr val="C00000"/>
+              </a:solidFill>
+              <a:tailEnd type="triangle"/>
+            </a:ln>
+          </p:spPr>
+          <p:style>
+            <a:lnRef idx="1">
+              <a:schemeClr val="accent1"/>
+            </a:lnRef>
+            <a:fillRef idx="0">
+              <a:schemeClr val="accent1"/>
+            </a:fillRef>
+            <a:effectRef idx="0">
+              <a:schemeClr val="accent1"/>
+            </a:effectRef>
+            <a:fontRef idx="minor">
+              <a:schemeClr val="tx1"/>
+            </a:fontRef>
+          </p:style>
+        </p:cxnSp>
+        <p:sp>
+          <p:nvSpPr>
+            <p:cNvPr id="32" name="TextBox 31"/>
+            <p:cNvSpPr txBox="1"/>
+            <p:nvPr/>
+          </p:nvSpPr>
+          <p:spPr>
+            <a:xfrm>
+              <a:off x="3044145" y="3864948"/>
+              <a:ext cx="1997791" cy="369332"/>
+            </a:xfrm>
+            <a:prstGeom prst="rect">
+              <a:avLst/>
+            </a:prstGeom>
+            <a:noFill/>
+            <a:ln w="19050">
+              <a:solidFill>
+                <a:srgbClr val="C00000"/>
+              </a:solidFill>
+            </a:ln>
+          </p:spPr>
+          <p:txBody>
+            <a:bodyPr wrap="none" rtlCol="0">
+              <a:spAutoFit/>
+            </a:bodyPr>
+            <a:lstStyle/>
+            <a:p>
+              <a:r>
+                <a:rPr lang="en-US" dirty="0">
+                  <a:solidFill>
+                    <a:srgbClr val="C00000"/>
+                  </a:solidFill>
+                </a:rPr>
+                <a:t>l</a:t>
+              </a:r>
+              <a:r>
+                <a:rPr lang="en-US" dirty="0" smtClean="0">
+                  <a:solidFill>
+                    <a:srgbClr val="C00000"/>
+                  </a:solidFill>
+                </a:rPr>
+                <a:t>ots of MPI chatter!</a:t>
+              </a:r>
+              <a:endParaRPr lang="en-US" dirty="0">
+                <a:solidFill>
+                  <a:srgbClr val="C00000"/>
+                </a:solidFill>
+              </a:endParaRPr>
+            </a:p>
+          </p:txBody>
+        </p:sp>
+      </p:grpSp>
+      <p:grpSp>
+        <p:nvGrpSpPr>
+          <p:cNvPr id="36" name="Group 35"/>
+          <p:cNvGrpSpPr/>
+          <p:nvPr/>
+        </p:nvGrpSpPr>
+        <p:grpSpPr>
+          <a:xfrm>
+            <a:off x="5284321" y="2705068"/>
+            <a:ext cx="3074113" cy="1513263"/>
+            <a:chOff x="2847381" y="2376413"/>
+            <a:chExt cx="3074113" cy="1513263"/>
+          </a:xfrm>
+        </p:grpSpPr>
+        <p:sp>
+          <p:nvSpPr>
+            <p:cNvPr id="37" name="Rounded Rectangle 36"/>
+            <p:cNvSpPr/>
+            <p:nvPr/>
+          </p:nvSpPr>
+          <p:spPr>
+            <a:xfrm>
+              <a:off x="2847381" y="2376413"/>
+              <a:ext cx="1138843" cy="307571"/>
+            </a:xfrm>
+            <a:prstGeom prst="roundRect">
+              <a:avLst/>
+            </a:prstGeom>
+            <a:noFill/>
+            <a:ln w="28575">
+              <a:solidFill>
+                <a:srgbClr val="C00000"/>
+              </a:solidFill>
+            </a:ln>
+          </p:spPr>
+          <p:style>
+            <a:lnRef idx="2">
+              <a:schemeClr val="accent1">
+                <a:shade val="50000"/>
+              </a:schemeClr>
+            </a:lnRef>
+            <a:fillRef idx="1">
+              <a:schemeClr val="accent1"/>
+            </a:fillRef>
+            <a:effectRef idx="0">
+              <a:schemeClr val="accent1"/>
+            </a:effectRef>
+            <a:fontRef idx="minor">
+              <a:schemeClr val="lt1"/>
+            </a:fontRef>
+          </p:style>
+          <p:txBody>
+            <a:bodyPr rtlCol="0" anchor="ctr"/>
+            <a:lstStyle/>
+            <a:p>
+              <a:pPr algn="ctr"/>
+              <a:endParaRPr lang="en-US"/>
+            </a:p>
+          </p:txBody>
+        </p:sp>
+        <p:cxnSp>
+          <p:nvCxnSpPr>
+            <p:cNvPr id="38" name="Straight Arrow Connector 37"/>
+            <p:cNvCxnSpPr>
+              <a:stCxn id="39" idx="0"/>
+              <a:endCxn id="37" idx="2"/>
+            </p:cNvCxnSpPr>
+            <p:nvPr/>
+          </p:nvCxnSpPr>
+          <p:spPr>
+            <a:xfrm flipH="1" flipV="1">
+              <a:off x="3416803" y="2683984"/>
+              <a:ext cx="1698220" cy="836360"/>
+            </a:xfrm>
+            <a:prstGeom prst="straightConnector1">
+              <a:avLst/>
+            </a:prstGeom>
+            <a:ln w="28575">
+              <a:solidFill>
+                <a:srgbClr val="C00000"/>
+              </a:solidFill>
+              <a:tailEnd type="triangle"/>
+            </a:ln>
+          </p:spPr>
+          <p:style>
+            <a:lnRef idx="1">
+              <a:schemeClr val="accent1"/>
+            </a:lnRef>
+            <a:fillRef idx="0">
+              <a:schemeClr val="accent1"/>
+            </a:fillRef>
+            <a:effectRef idx="0">
+              <a:schemeClr val="accent1"/>
+            </a:effectRef>
+            <a:fontRef idx="minor">
+              <a:schemeClr val="tx1"/>
+            </a:fontRef>
+          </p:style>
+        </p:cxnSp>
+        <p:sp>
+          <p:nvSpPr>
+            <p:cNvPr id="39" name="TextBox 38"/>
+            <p:cNvSpPr txBox="1"/>
+            <p:nvPr/>
+          </p:nvSpPr>
+          <p:spPr>
+            <a:xfrm>
+              <a:off x="4308552" y="3520344"/>
+              <a:ext cx="1612942" cy="369332"/>
+            </a:xfrm>
+            <a:prstGeom prst="rect">
+              <a:avLst/>
+            </a:prstGeom>
+            <a:noFill/>
+            <a:ln w="19050">
+              <a:solidFill>
+                <a:srgbClr val="C00000"/>
+              </a:solidFill>
+            </a:ln>
+          </p:spPr>
+          <p:txBody>
+            <a:bodyPr wrap="none" rtlCol="0">
+              <a:spAutoFit/>
+            </a:bodyPr>
+            <a:lstStyle/>
+            <a:p>
+              <a:r>
+                <a:rPr lang="en-US" dirty="0" smtClean="0">
+                  <a:solidFill>
+                    <a:srgbClr val="C00000"/>
+                  </a:solidFill>
+                </a:rPr>
+                <a:t>load imbalance</a:t>
+              </a:r>
+              <a:endParaRPr lang="en-US" dirty="0">
+                <a:solidFill>
+                  <a:srgbClr val="C00000"/>
+                </a:solidFill>
+              </a:endParaRPr>
+            </a:p>
+          </p:txBody>
+        </p:sp>
+      </p:grpSp>
+      <p:sp>
+        <p:nvSpPr>
+          <p:cNvPr id="43" name="TextBox 42"/>
+          <p:cNvSpPr txBox="1"/>
+          <p:nvPr/>
+        </p:nvSpPr>
+        <p:spPr>
+          <a:xfrm rot="20700399">
+            <a:off x="955980" y="3481983"/>
+            <a:ext cx="2177904" cy="400110"/>
+          </a:xfrm>
+          <a:prstGeom prst="rect">
+            <a:avLst/>
+          </a:prstGeom>
+          <a:solidFill>
+            <a:schemeClr val="bg1"/>
+          </a:solidFill>
+          <a:ln>
+            <a:solidFill>
+              <a:schemeClr val="tx1"/>
+            </a:solidFill>
+          </a:ln>
+        </p:spPr>
+        <p:txBody>
+          <a:bodyPr wrap="none" rtlCol="0">
+            <a:spAutoFit/>
+          </a:bodyPr>
+          <a:lstStyle/>
+          <a:p>
+            <a:r>
+              <a:rPr lang="en-US" sz="2000" dirty="0" smtClean="0"/>
+              <a:t>domains too small!</a:t>
+            </a:r>
+            <a:endParaRPr lang="en-US" sz="2000" dirty="0"/>
+          </a:p>
+        </p:txBody>
+      </p:sp>
+    </p:spTree>
+    <p:extLst>
+      <p:ext uri="{BB962C8B-B14F-4D97-AF65-F5344CB8AC3E}">
+        <p14:creationId xmlns:p14="http://schemas.microsoft.com/office/powerpoint/2010/main" val="881001687"/>
+      </p:ext>
+    </p:extLst>
+  </p:cSld>
+  <p:clrMapOvr>
+    <a:masterClrMapping/>
+  </p:clrMapOvr>
+  <p:timing>
+    <p:tnLst>
+      <p:par>
+        <p:cTn id="1" dur="indefinite" restart="never" nodeType="tmRoot">
+          <p:childTnLst>
+            <p:seq concurrent="1" nextAc="seek">
+              <p:cTn id="2" dur="indefinite" nodeType="mainSeq">
+                <p:childTnLst>
+                  <p:par>
+                    <p:cTn id="3" fill="hold">
+                      <p:stCondLst>
+                        <p:cond delay="indefinite"/>
+                      </p:stCondLst>
+                      <p:childTnLst>
+                        <p:par>
+                          <p:cTn id="4" fill="hold">
+                            <p:stCondLst>
+                              <p:cond delay="0"/>
+                            </p:stCondLst>
+                            <p:childTnLst>
+                              <p:par>
+                                <p:cTn id="5" presetID="1" presetClass="entr" presetSubtype="0" fill="hold" nodeType="clickEffect">
+                                  <p:stCondLst>
+                                    <p:cond delay="0"/>
+                                  </p:stCondLst>
+                                  <p:childTnLst>
+                                    <p:set>
+                                      <p:cBhvr>
+                                        <p:cTn id="6" dur="1" fill="hold">
+                                          <p:stCondLst>
+                                            <p:cond delay="0"/>
+                                          </p:stCondLst>
+                                        </p:cTn>
+                                        <p:tgtEl>
+                                          <p:spTgt spid="16"/>
+                                        </p:tgtEl>
+                                        <p:attrNameLst>
+                                          <p:attrName>style.visibility</p:attrName>
+                                        </p:attrNameLst>
+                                      </p:cBhvr>
+                                      <p:to>
+                                        <p:strVal val="visible"/>
+                                      </p:to>
+                                    </p:set>
+                                  </p:childTnLst>
+                                </p:cTn>
+                              </p:par>
+                            </p:childTnLst>
+                          </p:cTn>
+                        </p:par>
+                      </p:childTnLst>
+                    </p:cTn>
+                  </p:par>
+                  <p:par>
+                    <p:cTn id="7" fill="hold">
+                      <p:stCondLst>
+                        <p:cond delay="indefinite"/>
+                      </p:stCondLst>
+                      <p:childTnLst>
+                        <p:par>
+                          <p:cTn id="8" fill="hold">
+                            <p:stCondLst>
+                              <p:cond delay="0"/>
+                            </p:stCondLst>
+                            <p:childTnLst>
+                              <p:par>
+                                <p:cTn id="9" presetID="1" presetClass="entr" presetSubtype="0" fill="hold" nodeType="clickEffect">
+                                  <p:stCondLst>
+                                    <p:cond delay="0"/>
+                                  </p:stCondLst>
+                                  <p:childTnLst>
+                                    <p:set>
+                                      <p:cBhvr>
+                                        <p:cTn id="10" dur="1" fill="hold">
+                                          <p:stCondLst>
+                                            <p:cond delay="0"/>
+                                          </p:stCondLst>
+                                        </p:cTn>
+                                        <p:tgtEl>
+                                          <p:spTgt spid="11"/>
+                                        </p:tgtEl>
+                                        <p:attrNameLst>
+                                          <p:attrName>style.visibility</p:attrName>
+                                        </p:attrNameLst>
+                                      </p:cBhvr>
+                                      <p:to>
+                                        <p:strVal val="visible"/>
+                                      </p:to>
+                                    </p:set>
+                                  </p:childTnLst>
+                                </p:cTn>
+                              </p:par>
+                            </p:childTnLst>
+                          </p:cTn>
+                        </p:par>
+                      </p:childTnLst>
+                    </p:cTn>
+                  </p:par>
+                  <p:par>
+                    <p:cTn id="11" fill="hold">
+                      <p:stCondLst>
+                        <p:cond delay="indefinite"/>
+                      </p:stCondLst>
+                      <p:childTnLst>
+                        <p:par>
+                          <p:cTn id="12" fill="hold">
+                            <p:stCondLst>
+                              <p:cond delay="0"/>
+                            </p:stCondLst>
+                            <p:childTnLst>
+                              <p:par>
+                                <p:cTn id="13" presetID="1" presetClass="entr" presetSubtype="0" fill="hold" nodeType="clickEffect">
+                                  <p:stCondLst>
+                                    <p:cond delay="0"/>
+                                  </p:stCondLst>
+                                  <p:childTnLst>
+                                    <p:set>
+                                      <p:cBhvr>
+                                        <p:cTn id="14" dur="1" fill="hold">
+                                          <p:stCondLst>
+                                            <p:cond delay="0"/>
+                                          </p:stCondLst>
+                                        </p:cTn>
+                                        <p:tgtEl>
+                                          <p:spTgt spid="35"/>
+                                        </p:tgtEl>
+                                        <p:attrNameLst>
+                                          <p:attrName>style.visibility</p:attrName>
+                                        </p:attrNameLst>
+                                      </p:cBhvr>
+                                      <p:to>
+                                        <p:strVal val="visible"/>
+                                      </p:to>
+                                    </p:set>
+                                  </p:childTnLst>
+                                </p:cTn>
+                              </p:par>
+                            </p:childTnLst>
+                          </p:cTn>
+                        </p:par>
+                      </p:childTnLst>
+                    </p:cTn>
+                  </p:par>
+                  <p:par>
+                    <p:cTn id="15" fill="hold">
+                      <p:stCondLst>
+                        <p:cond delay="indefinite"/>
+                      </p:stCondLst>
+                      <p:childTnLst>
+                        <p:par>
+                          <p:cTn id="16" fill="hold">
+                            <p:stCondLst>
+                              <p:cond delay="0"/>
+                            </p:stCondLst>
+                            <p:childTnLst>
+                              <p:par>
+                                <p:cTn id="17" presetID="1" presetClass="entr" presetSubtype="0" fill="hold" nodeType="clickEffect">
+                                  <p:stCondLst>
+                                    <p:cond delay="0"/>
+                                  </p:stCondLst>
+                                  <p:childTnLst>
+                                    <p:set>
+                                      <p:cBhvr>
+                                        <p:cTn id="18" dur="1" fill="hold">
+                                          <p:stCondLst>
+                                            <p:cond delay="0"/>
+                                          </p:stCondLst>
+                                        </p:cTn>
+                                        <p:tgtEl>
+                                          <p:spTgt spid="36"/>
+                                        </p:tgtEl>
+                                        <p:attrNameLst>
+                                          <p:attrName>style.visibility</p:attrName>
+                                        </p:attrNameLst>
+                                      </p:cBhvr>
+                                      <p:to>
+                                        <p:strVal val="visible"/>
+                                      </p:to>
+                                    </p:set>
+                                  </p:childTnLst>
+                                </p:cTn>
+                              </p:par>
+                            </p:childTnLst>
+                          </p:cTn>
+                        </p:par>
+                      </p:childTnLst>
+                    </p:cTn>
+                  </p:par>
+                  <p:par>
+                    <p:cTn id="19" fill="hold">
+                      <p:stCondLst>
+                        <p:cond delay="indefinite"/>
+                      </p:stCondLst>
+                      <p:childTnLst>
+                        <p:par>
+                          <p:cTn id="20" fill="hold">
+                            <p:stCondLst>
+                              <p:cond delay="0"/>
+                            </p:stCondLst>
+                            <p:childTnLst>
+                              <p:par>
+                                <p:cTn id="21" presetID="1" presetClass="entr" presetSubtype="0" fill="hold" grpId="0" nodeType="clickEffect">
+                                  <p:stCondLst>
+                                    <p:cond delay="0"/>
+                                  </p:stCondLst>
+                                  <p:childTnLst>
+                                    <p:set>
+                                      <p:cBhvr>
+                                        <p:cTn id="22" dur="1" fill="hold">
+                                          <p:stCondLst>
+                                            <p:cond delay="0"/>
+                                          </p:stCondLst>
+                                        </p:cTn>
+                                        <p:tgtEl>
+                                          <p:spTgt spid="43"/>
+                                        </p:tgtEl>
+                                        <p:attrNameLst>
+                                          <p:attrName>style.visibility</p:attrName>
+                                        </p:attrNameLst>
+                                      </p:cBhvr>
+                                      <p:to>
+                                        <p:strVal val="visible"/>
+                                      </p:to>
+                                    </p:set>
+                                  </p:childTnLst>
+                                </p:cTn>
+                              </p:par>
+                            </p:childTnLst>
+                          </p:cTn>
+                        </p:par>
+                      </p:childTnLst>
+                    </p:cTn>
+                  </p:par>
+                  <p:par>
+                    <p:cTn id="23" fill="hold">
+                      <p:stCondLst>
+                        <p:cond delay="indefinite"/>
+                      </p:stCondLst>
+                      <p:childTnLst>
+                        <p:par>
+                          <p:cTn id="24" fill="hold">
+                            <p:stCondLst>
+                              <p:cond delay="0"/>
+                            </p:stCondLst>
+                            <p:childTnLst>
+                              <p:par>
+                                <p:cTn id="25" presetID="1" presetClass="entr" presetSubtype="0" fill="hold" nodeType="clickEffect">
+                                  <p:stCondLst>
+                                    <p:cond delay="0"/>
+                                  </p:stCondLst>
+                                  <p:childTnLst>
+                                    <p:set>
+                                      <p:cBhvr>
+                                        <p:cTn id="26" dur="1" fill="hold">
+                                          <p:stCondLst>
+                                            <p:cond delay="0"/>
+                                          </p:stCondLst>
+                                        </p:cTn>
+                                        <p:tgtEl>
+                                          <p:spTgt spid="5"/>
+                                        </p:tgtEl>
+                                        <p:attrNameLst>
+                                          <p:attrName>style.visibility</p:attrName>
+                                        </p:attrNameLst>
+                                      </p:cBhvr>
+                                      <p:to>
+                                        <p:strVal val="visible"/>
+                                      </p:to>
+                                    </p:set>
+                                  </p:childTnLst>
+                                </p:cTn>
+                              </p:par>
+                            </p:childTnLst>
+                          </p:cTn>
+                        </p:par>
+                      </p:childTnLst>
+                    </p:cTn>
+                  </p:par>
+                  <p:par>
+                    <p:cTn id="27" fill="hold">
+                      <p:stCondLst>
+                        <p:cond delay="indefinite"/>
+                      </p:stCondLst>
+                      <p:childTnLst>
+                        <p:par>
+                          <p:cTn id="28" fill="hold">
+                            <p:stCondLst>
+                              <p:cond delay="0"/>
+                            </p:stCondLst>
+                            <p:childTnLst>
+                              <p:par>
+                                <p:cTn id="29" presetID="1" presetClass="entr" presetSubtype="0" fill="hold" nodeType="clickEffect">
+                                  <p:stCondLst>
+                                    <p:cond delay="0"/>
+                                  </p:stCondLst>
+                                  <p:childTnLst>
+                                    <p:set>
+                                      <p:cBhvr>
+                                        <p:cTn id="30" dur="1" fill="hold">
+                                          <p:stCondLst>
+                                            <p:cond delay="0"/>
+                                          </p:stCondLst>
+                                        </p:cTn>
+                                        <p:tgtEl>
+                                          <p:spTgt spid="23"/>
+                                        </p:tgtEl>
+                                        <p:attrNameLst>
+                                          <p:attrName>style.visibility</p:attrName>
+                                        </p:attrNameLst>
+                                      </p:cBhvr>
+                                      <p:to>
+                                        <p:strVal val="visible"/>
+                                      </p:to>
+                                    </p:set>
+                                  </p:childTnLst>
+                                </p:cTn>
+                              </p:par>
+                            </p:childTnLst>
+                          </p:cTn>
+                        </p:par>
+                      </p:childTnLst>
+                    </p:cTn>
+                  </p:par>
+                  <p:par>
+                    <p:cTn id="31" fill="hold">
+                      <p:stCondLst>
+                        <p:cond delay="indefinite"/>
+                      </p:stCondLst>
+                      <p:childTnLst>
+                        <p:par>
+                          <p:cTn id="32" fill="hold">
+                            <p:stCondLst>
+                              <p:cond delay="0"/>
+                            </p:stCondLst>
+                            <p:childTnLst>
+                              <p:par>
+                                <p:cTn id="33" presetID="1" presetClass="entr" presetSubtype="0" fill="hold" nodeType="clickEffect">
+                                  <p:stCondLst>
+                                    <p:cond delay="0"/>
+                                  </p:stCondLst>
+                                  <p:childTnLst>
+                                    <p:set>
+                                      <p:cBhvr>
+                                        <p:cTn id="34" dur="1" fill="hold">
+                                          <p:stCondLst>
+                                            <p:cond delay="0"/>
+                                          </p:stCondLst>
+                                        </p:cTn>
+                                        <p:tgtEl>
+                                          <p:spTgt spid="12"/>
+                                        </p:tgtEl>
+                                        <p:attrNameLst>
+                                          <p:attrName>style.visibility</p:attrName>
+                                        </p:attrNameLst>
+                                      </p:cBhvr>
+                                      <p:to>
+                                        <p:strVal val="visible"/>
+                                      </p:to>
+                                    </p:set>
+                                  </p:childTnLst>
+                                </p:cTn>
+                              </p:par>
+                            </p:childTnLst>
+                          </p:cTn>
+                        </p:par>
+                      </p:childTnLst>
+                    </p:cTn>
+                  </p:par>
+                </p:childTnLst>
+              </p:cTn>
+              <p:prevCondLst>
+                <p:cond evt="onPrev" delay="0">
+                  <p:tgtEl>
+                    <p:sldTgt/>
+                  </p:tgtEl>
+                </p:cond>
+              </p:prevCondLst>
+              <p:nextCondLst>
+                <p:cond evt="onNext" delay="0">
+                  <p:tgtEl>
+                    <p:sldTgt/>
+                  </p:tgtEl>
+                </p:cond>
+              </p:nextCondLst>
+            </p:seq>
+          </p:childTnLst>
+        </p:cTn>
+      </p:par>
+    </p:tnLst>
+    <p:bldLst>
+      <p:bldP spid="43" grpId="0" animBg="1"/>
+    </p:bldLst>
+  </p:timing>
+</p:sld>
+</file>
+
+<file path=ppt/slides/slide21.xml><?xml version="1.0" encoding="utf-8"?>
+<p:sld xmlns:a="http://schemas.openxmlformats.org/drawingml/2006/main" xmlns:r="http://schemas.openxmlformats.org/officeDocument/2006/relationships" xmlns:p="http://schemas.openxmlformats.org/presentationml/2006/main">
+  <p:cSld>
+    <p:spTree>
+      <p:nvGrpSpPr>
+        <p:cNvPr id="1" name=""/>
+        <p:cNvGrpSpPr/>
+        <p:nvPr/>
+      </p:nvGrpSpPr>
+      <p:grpSpPr>
+        <a:xfrm>
+          <a:off x="0" y="0"/>
+          <a:ext cx="0" cy="0"/>
+          <a:chOff x="0" y="0"/>
+          <a:chExt cx="0" cy="0"/>
+        </a:xfrm>
+      </p:grpSpPr>
+      <p:sp>
+        <p:nvSpPr>
+          <p:cNvPr id="2" name="Title 1"/>
+          <p:cNvSpPr>
+            <a:spLocks noGrp="1"/>
+          </p:cNvSpPr>
+          <p:nvPr>
+            <p:ph type="title"/>
+          </p:nvPr>
+        </p:nvSpPr>
+        <p:spPr/>
+        <p:txBody>
+          <a:bodyPr/>
+          <a:lstStyle/>
+          <a:p>
+            <a:r>
+              <a:rPr lang="en-US" dirty="0" smtClean="0"/>
+              <a:t>Conclusions</a:t>
+            </a:r>
+            <a:endParaRPr lang="nl-BE" dirty="0"/>
+          </a:p>
+        </p:txBody>
+      </p:sp>
+      <p:sp>
+        <p:nvSpPr>
+          <p:cNvPr id="3" name="Text Placeholder 2"/>
+          <p:cNvSpPr>
+            <a:spLocks noGrp="1"/>
+          </p:cNvSpPr>
+          <p:nvPr>
+            <p:ph type="body" idx="1"/>
+          </p:nvPr>
+        </p:nvSpPr>
+        <p:spPr/>
+        <p:txBody>
+          <a:bodyPr/>
+          <a:lstStyle/>
+          <a:p>
+            <a:endParaRPr lang="nl-BE"/>
+          </a:p>
+        </p:txBody>
+      </p:sp>
+      <p:sp>
+        <p:nvSpPr>
+          <p:cNvPr id="4" name="Slide Number Placeholder 3"/>
+          <p:cNvSpPr>
+            <a:spLocks noGrp="1"/>
+          </p:cNvSpPr>
+          <p:nvPr>
+            <p:ph type="sldNum" sz="quarter" idx="12"/>
+          </p:nvPr>
+        </p:nvSpPr>
+        <p:spPr/>
+        <p:txBody>
+          <a:bodyPr/>
+          <a:lstStyle/>
+          <a:p>
+            <a:fld id="{AFF690EF-DE1B-4F48-8935-D551336ADF29}" type="slidenum">
+              <a:rPr lang="nl-BE" smtClean="0"/>
+              <a:t>21</a:t>
+            </a:fld>
+            <a:endParaRPr lang="nl-BE"/>
+          </a:p>
+        </p:txBody>
+      </p:sp>
+    </p:spTree>
+    <p:extLst>
+      <p:ext uri="{BB962C8B-B14F-4D97-AF65-F5344CB8AC3E}">
+        <p14:creationId xmlns:p14="http://schemas.microsoft.com/office/powerpoint/2010/main" val="3071723956"/>
+      </p:ext>
+    </p:extLst>
+  </p:cSld>
+  <p:clrMapOvr>
+    <a:masterClrMapping/>
+  </p:clrMapOvr>
+  <p:timing>
+    <p:tnLst>
+      <p:par>
+        <p:cTn id="1" dur="indefinite" restart="never" nodeType="tmRoot"/>
+      </p:par>
+    </p:tnLst>
+  </p:timing>
+</p:sld>
+</file>
+
+<file path=ppt/slides/slide22.xml><?xml version="1.0" encoding="utf-8"?>
+<p:sld xmlns:a="http://schemas.openxmlformats.org/drawingml/2006/main" xmlns:r="http://schemas.openxmlformats.org/officeDocument/2006/relationships" xmlns:p="http://schemas.openxmlformats.org/presentationml/2006/main">
+  <p:cSld>
+    <p:spTree>
+      <p:nvGrpSpPr>
+        <p:cNvPr id="1" name=""/>
+        <p:cNvGrpSpPr/>
+        <p:nvPr/>
+      </p:nvGrpSpPr>
+      <p:grpSpPr>
+        <a:xfrm>
+          <a:off x="0" y="0"/>
+          <a:ext cx="0" cy="0"/>
+          <a:chOff x="0" y="0"/>
+          <a:chExt cx="0" cy="0"/>
+        </a:xfrm>
+      </p:grpSpPr>
+      <p:sp>
+        <p:nvSpPr>
+          <p:cNvPr id="2" name="Title 1"/>
+          <p:cNvSpPr>
+            <a:spLocks noGrp="1"/>
+          </p:cNvSpPr>
+          <p:nvPr>
+            <p:ph type="title"/>
+          </p:nvPr>
+        </p:nvSpPr>
+        <p:spPr/>
+        <p:txBody>
+          <a:bodyPr/>
+          <a:lstStyle/>
+          <a:p>
+            <a:r>
+              <a:rPr lang="en-US" dirty="0" smtClean="0"/>
               <a:t>Conclusions</a:t>
             </a:r>
             <a:endParaRPr lang="nl-BE" dirty="0"/>
@@ -9772,7 +11289,7 @@
           <a:p>
             <a:fld id="{AFF690EF-DE1B-4F48-8935-D551336ADF29}" type="slidenum">
               <a:rPr lang="nl-BE" smtClean="0"/>
-              <a:t>20</a:t>
+              <a:t>22</a:t>
             </a:fld>
             <a:endParaRPr lang="nl-BE"/>
           </a:p>

</xml_diff>